<commit_message>
Add More UI video link html file.
</commit_message>
<xml_diff>
--- a/CPSC-24500/Week04/2017SpringW04Slides.pptx
+++ b/CPSC-24500/Week04/2017SpringW04Slides.pptx
@@ -5,7 +5,7 @@
     <p:sldMasterId id="2147483648" r:id="rId4"/>
   </p:sldMasterIdLst>
   <p:notesMasterIdLst>
-    <p:notesMasterId r:id="rId22"/>
+    <p:notesMasterId r:id="rId29"/>
   </p:notesMasterIdLst>
   <p:sldIdLst>
     <p:sldId id="381" r:id="rId5"/>
@@ -25,6 +25,13 @@
     <p:sldId id="422" r:id="rId19"/>
     <p:sldId id="423" r:id="rId20"/>
     <p:sldId id="357" r:id="rId21"/>
+    <p:sldId id="424" r:id="rId22"/>
+    <p:sldId id="425" r:id="rId23"/>
+    <p:sldId id="429" r:id="rId24"/>
+    <p:sldId id="428" r:id="rId25"/>
+    <p:sldId id="430" r:id="rId26"/>
+    <p:sldId id="431" r:id="rId27"/>
+    <p:sldId id="432" r:id="rId28"/>
   </p:sldIdLst>
   <p:sldSz cx="12192000" cy="6858000"/>
   <p:notesSz cx="7315200" cy="9601200"/>
@@ -216,7 +223,7 @@
           <a:p>
             <a:fld id="{91ED72D7-FE6F-4B82-8D31-76BC00B06094}" type="datetimeFigureOut">
               <a:rPr lang="en-US" smtClean="0"/>
-              <a:t>4/6/2017</a:t>
+              <a:t>4/7/2017</a:t>
             </a:fld>
             <a:endParaRPr lang="en-US" dirty="0"/>
           </a:p>
@@ -1263,6 +1270,180 @@
 </p:notes>
 </file>
 
+<file path=ppt/notesSlides/notesSlide18.xml><?xml version="1.0" encoding="utf-8"?>
+<p:notes xmlns:a="http://schemas.openxmlformats.org/drawingml/2006/main" xmlns:r="http://schemas.openxmlformats.org/officeDocument/2006/relationships" xmlns:p="http://schemas.openxmlformats.org/presentationml/2006/main">
+  <p:cSld>
+    <p:spTree>
+      <p:nvGrpSpPr>
+        <p:cNvPr id="1" name=""/>
+        <p:cNvGrpSpPr/>
+        <p:nvPr/>
+      </p:nvGrpSpPr>
+      <p:grpSpPr>
+        <a:xfrm>
+          <a:off x="0" y="0"/>
+          <a:ext cx="0" cy="0"/>
+          <a:chOff x="0" y="0"/>
+          <a:chExt cx="0" cy="0"/>
+        </a:xfrm>
+      </p:grpSpPr>
+      <p:sp>
+        <p:nvSpPr>
+          <p:cNvPr id="2" name="Slide Image Placeholder 1"/>
+          <p:cNvSpPr>
+            <a:spLocks noGrp="1" noRot="1" noChangeAspect="1"/>
+          </p:cNvSpPr>
+          <p:nvPr>
+            <p:ph type="sldImg"/>
+          </p:nvPr>
+        </p:nvSpPr>
+        <p:spPr/>
+      </p:sp>
+      <p:sp>
+        <p:nvSpPr>
+          <p:cNvPr id="3" name="Notes Placeholder 2"/>
+          <p:cNvSpPr>
+            <a:spLocks noGrp="1"/>
+          </p:cNvSpPr>
+          <p:nvPr>
+            <p:ph type="body" idx="1"/>
+          </p:nvPr>
+        </p:nvSpPr>
+        <p:spPr/>
+        <p:txBody>
+          <a:bodyPr/>
+          <a:lstStyle/>
+          <a:p>
+            <a:r>
+              <a:rPr lang="en-US" sz="1000" dirty="0"/>
+              <a:t>Quick note: I have changed the resolution of our videos starting with this  session. I was using 1366x768 which made for more manageable video downloads, etc. As we head toward using Visual Studio and C#, I would like to move toward 1920x1080 to better allow us to see the integrated development environment (IDE). Let me know if the increased resolution causes difficulty in accessing or viewing the videos. </a:t>
+            </a:r>
+          </a:p>
+        </p:txBody>
+      </p:sp>
+      <p:sp>
+        <p:nvSpPr>
+          <p:cNvPr id="4" name="Slide Number Placeholder 3"/>
+          <p:cNvSpPr>
+            <a:spLocks noGrp="1"/>
+          </p:cNvSpPr>
+          <p:nvPr>
+            <p:ph type="sldNum" sz="quarter" idx="10"/>
+          </p:nvPr>
+        </p:nvSpPr>
+        <p:spPr/>
+        <p:txBody>
+          <a:bodyPr/>
+          <a:lstStyle/>
+          <a:p>
+            <a:fld id="{5394DE12-7B9B-46AA-AC19-C30A49928B9B}" type="slidenum">
+              <a:rPr lang="en-US" smtClean="0"/>
+              <a:t>18</a:t>
+            </a:fld>
+            <a:endParaRPr lang="en-US" dirty="0"/>
+          </a:p>
+        </p:txBody>
+      </p:sp>
+    </p:spTree>
+    <p:extLst>
+      <p:ext uri="{BB962C8B-B14F-4D97-AF65-F5344CB8AC3E}">
+        <p14:creationId xmlns:p14="http://schemas.microsoft.com/office/powerpoint/2010/main" val="271357420"/>
+      </p:ext>
+    </p:extLst>
+  </p:cSld>
+  <p:clrMapOvr>
+    <a:masterClrMapping/>
+  </p:clrMapOvr>
+</p:notes>
+</file>
+
+<file path=ppt/notesSlides/notesSlide19.xml><?xml version="1.0" encoding="utf-8"?>
+<p:notes xmlns:a="http://schemas.openxmlformats.org/drawingml/2006/main" xmlns:r="http://schemas.openxmlformats.org/officeDocument/2006/relationships" xmlns:p="http://schemas.openxmlformats.org/presentationml/2006/main">
+  <p:cSld>
+    <p:spTree>
+      <p:nvGrpSpPr>
+        <p:cNvPr id="1" name=""/>
+        <p:cNvGrpSpPr/>
+        <p:nvPr/>
+      </p:nvGrpSpPr>
+      <p:grpSpPr>
+        <a:xfrm>
+          <a:off x="0" y="0"/>
+          <a:ext cx="0" cy="0"/>
+          <a:chOff x="0" y="0"/>
+          <a:chExt cx="0" cy="0"/>
+        </a:xfrm>
+      </p:grpSpPr>
+      <p:sp>
+        <p:nvSpPr>
+          <p:cNvPr id="2" name="Slide Image Placeholder 1"/>
+          <p:cNvSpPr>
+            <a:spLocks noGrp="1" noRot="1" noChangeAspect="1"/>
+          </p:cNvSpPr>
+          <p:nvPr>
+            <p:ph type="sldImg"/>
+          </p:nvPr>
+        </p:nvSpPr>
+        <p:spPr/>
+      </p:sp>
+      <p:sp>
+        <p:nvSpPr>
+          <p:cNvPr id="3" name="Notes Placeholder 2"/>
+          <p:cNvSpPr>
+            <a:spLocks noGrp="1"/>
+          </p:cNvSpPr>
+          <p:nvPr>
+            <p:ph type="body" idx="1"/>
+          </p:nvPr>
+        </p:nvSpPr>
+        <p:spPr/>
+        <p:txBody>
+          <a:bodyPr/>
+          <a:lstStyle/>
+          <a:p>
+            <a:r>
+              <a:rPr lang="en-US" sz="1000" dirty="0"/>
+              <a:t>Any of these items would be a good candidate for your “interesting and unique” feature to add to your Mosaic assignment. </a:t>
+            </a:r>
+          </a:p>
+        </p:txBody>
+      </p:sp>
+      <p:sp>
+        <p:nvSpPr>
+          <p:cNvPr id="4" name="Slide Number Placeholder 3"/>
+          <p:cNvSpPr>
+            <a:spLocks noGrp="1"/>
+          </p:cNvSpPr>
+          <p:nvPr>
+            <p:ph type="sldNum" sz="quarter" idx="10"/>
+          </p:nvPr>
+        </p:nvSpPr>
+        <p:spPr/>
+        <p:txBody>
+          <a:bodyPr/>
+          <a:lstStyle/>
+          <a:p>
+            <a:fld id="{5394DE12-7B9B-46AA-AC19-C30A49928B9B}" type="slidenum">
+              <a:rPr lang="en-US" smtClean="0"/>
+              <a:t>19</a:t>
+            </a:fld>
+            <a:endParaRPr lang="en-US" dirty="0"/>
+          </a:p>
+        </p:txBody>
+      </p:sp>
+    </p:spTree>
+    <p:extLst>
+      <p:ext uri="{BB962C8B-B14F-4D97-AF65-F5344CB8AC3E}">
+        <p14:creationId xmlns:p14="http://schemas.microsoft.com/office/powerpoint/2010/main" val="3774864099"/>
+      </p:ext>
+    </p:extLst>
+  </p:cSld>
+  <p:clrMapOvr>
+    <a:masterClrMapping/>
+  </p:clrMapOvr>
+</p:notes>
+</file>
+
 <file path=ppt/notesSlides/notesSlide2.xml><?xml version="1.0" encoding="utf-8"?>
 <p:notes xmlns:a="http://schemas.openxmlformats.org/drawingml/2006/main" xmlns:r="http://schemas.openxmlformats.org/officeDocument/2006/relationships" xmlns:p="http://schemas.openxmlformats.org/presentationml/2006/main">
   <p:cSld>
@@ -1344,6 +1525,444 @@
     <p:extLst>
       <p:ext uri="{BB962C8B-B14F-4D97-AF65-F5344CB8AC3E}">
         <p14:creationId xmlns:p14="http://schemas.microsoft.com/office/powerpoint/2010/main" val="4056386234"/>
+      </p:ext>
+    </p:extLst>
+  </p:cSld>
+  <p:clrMapOvr>
+    <a:masterClrMapping/>
+  </p:clrMapOvr>
+</p:notes>
+</file>
+
+<file path=ppt/notesSlides/notesSlide20.xml><?xml version="1.0" encoding="utf-8"?>
+<p:notes xmlns:a="http://schemas.openxmlformats.org/drawingml/2006/main" xmlns:r="http://schemas.openxmlformats.org/officeDocument/2006/relationships" xmlns:p="http://schemas.openxmlformats.org/presentationml/2006/main">
+  <p:cSld>
+    <p:spTree>
+      <p:nvGrpSpPr>
+        <p:cNvPr id="1" name=""/>
+        <p:cNvGrpSpPr/>
+        <p:nvPr/>
+      </p:nvGrpSpPr>
+      <p:grpSpPr>
+        <a:xfrm>
+          <a:off x="0" y="0"/>
+          <a:ext cx="0" cy="0"/>
+          <a:chOff x="0" y="0"/>
+          <a:chExt cx="0" cy="0"/>
+        </a:xfrm>
+      </p:grpSpPr>
+      <p:sp>
+        <p:nvSpPr>
+          <p:cNvPr id="2" name="Slide Image Placeholder 1"/>
+          <p:cNvSpPr>
+            <a:spLocks noGrp="1" noRot="1" noChangeAspect="1"/>
+          </p:cNvSpPr>
+          <p:nvPr>
+            <p:ph type="sldImg"/>
+          </p:nvPr>
+        </p:nvSpPr>
+        <p:spPr/>
+      </p:sp>
+      <p:sp>
+        <p:nvSpPr>
+          <p:cNvPr id="3" name="Notes Placeholder 2"/>
+          <p:cNvSpPr>
+            <a:spLocks noGrp="1"/>
+          </p:cNvSpPr>
+          <p:nvPr>
+            <p:ph type="body" idx="1"/>
+          </p:nvPr>
+        </p:nvSpPr>
+        <p:spPr/>
+        <p:txBody>
+          <a:bodyPr/>
+          <a:lstStyle/>
+          <a:p>
+            <a:r>
+              <a:rPr lang="en-US" sz="1000" dirty="0"/>
+              <a:t>Any of these items would be a good candidate for your “interesting and unique” feature to add to your Mosaic assignment. </a:t>
+            </a:r>
+          </a:p>
+        </p:txBody>
+      </p:sp>
+      <p:sp>
+        <p:nvSpPr>
+          <p:cNvPr id="4" name="Slide Number Placeholder 3"/>
+          <p:cNvSpPr>
+            <a:spLocks noGrp="1"/>
+          </p:cNvSpPr>
+          <p:nvPr>
+            <p:ph type="sldNum" sz="quarter" idx="10"/>
+          </p:nvPr>
+        </p:nvSpPr>
+        <p:spPr/>
+        <p:txBody>
+          <a:bodyPr/>
+          <a:lstStyle/>
+          <a:p>
+            <a:fld id="{5394DE12-7B9B-46AA-AC19-C30A49928B9B}" type="slidenum">
+              <a:rPr lang="en-US" smtClean="0"/>
+              <a:t>20</a:t>
+            </a:fld>
+            <a:endParaRPr lang="en-US" dirty="0"/>
+          </a:p>
+        </p:txBody>
+      </p:sp>
+    </p:spTree>
+    <p:extLst>
+      <p:ext uri="{BB962C8B-B14F-4D97-AF65-F5344CB8AC3E}">
+        <p14:creationId xmlns:p14="http://schemas.microsoft.com/office/powerpoint/2010/main" val="326699934"/>
+      </p:ext>
+    </p:extLst>
+  </p:cSld>
+  <p:clrMapOvr>
+    <a:masterClrMapping/>
+  </p:clrMapOvr>
+</p:notes>
+</file>
+
+<file path=ppt/notesSlides/notesSlide21.xml><?xml version="1.0" encoding="utf-8"?>
+<p:notes xmlns:a="http://schemas.openxmlformats.org/drawingml/2006/main" xmlns:r="http://schemas.openxmlformats.org/officeDocument/2006/relationships" xmlns:p="http://schemas.openxmlformats.org/presentationml/2006/main">
+  <p:cSld>
+    <p:spTree>
+      <p:nvGrpSpPr>
+        <p:cNvPr id="1" name=""/>
+        <p:cNvGrpSpPr/>
+        <p:nvPr/>
+      </p:nvGrpSpPr>
+      <p:grpSpPr>
+        <a:xfrm>
+          <a:off x="0" y="0"/>
+          <a:ext cx="0" cy="0"/>
+          <a:chOff x="0" y="0"/>
+          <a:chExt cx="0" cy="0"/>
+        </a:xfrm>
+      </p:grpSpPr>
+      <p:sp>
+        <p:nvSpPr>
+          <p:cNvPr id="2" name="Slide Image Placeholder 1"/>
+          <p:cNvSpPr>
+            <a:spLocks noGrp="1" noRot="1" noChangeAspect="1"/>
+          </p:cNvSpPr>
+          <p:nvPr>
+            <p:ph type="sldImg"/>
+          </p:nvPr>
+        </p:nvSpPr>
+        <p:spPr/>
+      </p:sp>
+      <p:sp>
+        <p:nvSpPr>
+          <p:cNvPr id="3" name="Notes Placeholder 2"/>
+          <p:cNvSpPr>
+            <a:spLocks noGrp="1"/>
+          </p:cNvSpPr>
+          <p:nvPr>
+            <p:ph type="body" idx="1"/>
+          </p:nvPr>
+        </p:nvSpPr>
+        <p:spPr/>
+        <p:txBody>
+          <a:bodyPr/>
+          <a:lstStyle/>
+          <a:p>
+            <a:r>
+              <a:rPr lang="en-US" sz="1000" dirty="0"/>
+              <a:t>Yes, this is often what a UI design looks like. In our first coding example this week, we are going to enhance the OvalDraw application to include menu elements to OvalDraw File|Exit and Edit|Clear. In addition, we will implement adding new random ovals with either a line color or a line weight. Finally, we will add file saving and opening and add the related Open and Save menu items to the application… more on that later. </a:t>
+            </a:r>
+          </a:p>
+          <a:p>
+            <a:endParaRPr lang="en-US" sz="1000" dirty="0"/>
+          </a:p>
+          <a:p>
+            <a:r>
+              <a:rPr lang="en-US" sz="1000" dirty="0"/>
+              <a:t>I anticipate that we will also implement something with mouse clicking, mouse dragging, and timer also, but am uncertain what form that may take. </a:t>
+            </a:r>
+          </a:p>
+        </p:txBody>
+      </p:sp>
+      <p:sp>
+        <p:nvSpPr>
+          <p:cNvPr id="4" name="Slide Number Placeholder 3"/>
+          <p:cNvSpPr>
+            <a:spLocks noGrp="1"/>
+          </p:cNvSpPr>
+          <p:nvPr>
+            <p:ph type="sldNum" sz="quarter" idx="10"/>
+          </p:nvPr>
+        </p:nvSpPr>
+        <p:spPr/>
+        <p:txBody>
+          <a:bodyPr/>
+          <a:lstStyle/>
+          <a:p>
+            <a:fld id="{5394DE12-7B9B-46AA-AC19-C30A49928B9B}" type="slidenum">
+              <a:rPr lang="en-US" smtClean="0"/>
+              <a:t>21</a:t>
+            </a:fld>
+            <a:endParaRPr lang="en-US" dirty="0"/>
+          </a:p>
+        </p:txBody>
+      </p:sp>
+    </p:spTree>
+    <p:extLst>
+      <p:ext uri="{BB962C8B-B14F-4D97-AF65-F5344CB8AC3E}">
+        <p14:creationId xmlns:p14="http://schemas.microsoft.com/office/powerpoint/2010/main" val="3445731023"/>
+      </p:ext>
+    </p:extLst>
+  </p:cSld>
+  <p:clrMapOvr>
+    <a:masterClrMapping/>
+  </p:clrMapOvr>
+</p:notes>
+</file>
+
+<file path=ppt/notesSlides/notesSlide22.xml><?xml version="1.0" encoding="utf-8"?>
+<p:notes xmlns:a="http://schemas.openxmlformats.org/drawingml/2006/main" xmlns:r="http://schemas.openxmlformats.org/officeDocument/2006/relationships" xmlns:p="http://schemas.openxmlformats.org/presentationml/2006/main">
+  <p:cSld>
+    <p:spTree>
+      <p:nvGrpSpPr>
+        <p:cNvPr id="1" name=""/>
+        <p:cNvGrpSpPr/>
+        <p:nvPr/>
+      </p:nvGrpSpPr>
+      <p:grpSpPr>
+        <a:xfrm>
+          <a:off x="0" y="0"/>
+          <a:ext cx="0" cy="0"/>
+          <a:chOff x="0" y="0"/>
+          <a:chExt cx="0" cy="0"/>
+        </a:xfrm>
+      </p:grpSpPr>
+      <p:sp>
+        <p:nvSpPr>
+          <p:cNvPr id="2" name="Slide Image Placeholder 1"/>
+          <p:cNvSpPr>
+            <a:spLocks noGrp="1" noRot="1" noChangeAspect="1"/>
+          </p:cNvSpPr>
+          <p:nvPr>
+            <p:ph type="sldImg"/>
+          </p:nvPr>
+        </p:nvSpPr>
+        <p:spPr/>
+      </p:sp>
+      <p:sp>
+        <p:nvSpPr>
+          <p:cNvPr id="3" name="Notes Placeholder 2"/>
+          <p:cNvSpPr>
+            <a:spLocks noGrp="1"/>
+          </p:cNvSpPr>
+          <p:nvPr>
+            <p:ph type="body" idx="1"/>
+          </p:nvPr>
+        </p:nvSpPr>
+        <p:spPr/>
+        <p:txBody>
+          <a:bodyPr/>
+          <a:lstStyle/>
+          <a:p>
+            <a:r>
+              <a:rPr lang="en-US" sz="1000" dirty="0"/>
+              <a:t>Any of these items would be a good candidate for your “interesting and unique” feature to add to your Mosaic assignment. </a:t>
+            </a:r>
+          </a:p>
+        </p:txBody>
+      </p:sp>
+      <p:sp>
+        <p:nvSpPr>
+          <p:cNvPr id="4" name="Slide Number Placeholder 3"/>
+          <p:cNvSpPr>
+            <a:spLocks noGrp="1"/>
+          </p:cNvSpPr>
+          <p:nvPr>
+            <p:ph type="sldNum" sz="quarter" idx="10"/>
+          </p:nvPr>
+        </p:nvSpPr>
+        <p:spPr/>
+        <p:txBody>
+          <a:bodyPr/>
+          <a:lstStyle/>
+          <a:p>
+            <a:fld id="{5394DE12-7B9B-46AA-AC19-C30A49928B9B}" type="slidenum">
+              <a:rPr lang="en-US" smtClean="0"/>
+              <a:t>22</a:t>
+            </a:fld>
+            <a:endParaRPr lang="en-US" dirty="0"/>
+          </a:p>
+        </p:txBody>
+      </p:sp>
+    </p:spTree>
+    <p:extLst>
+      <p:ext uri="{BB962C8B-B14F-4D97-AF65-F5344CB8AC3E}">
+        <p14:creationId xmlns:p14="http://schemas.microsoft.com/office/powerpoint/2010/main" val="2933664275"/>
+      </p:ext>
+    </p:extLst>
+  </p:cSld>
+  <p:clrMapOvr>
+    <a:masterClrMapping/>
+  </p:clrMapOvr>
+</p:notes>
+</file>
+
+<file path=ppt/notesSlides/notesSlide23.xml><?xml version="1.0" encoding="utf-8"?>
+<p:notes xmlns:a="http://schemas.openxmlformats.org/drawingml/2006/main" xmlns:r="http://schemas.openxmlformats.org/officeDocument/2006/relationships" xmlns:p="http://schemas.openxmlformats.org/presentationml/2006/main">
+  <p:cSld>
+    <p:spTree>
+      <p:nvGrpSpPr>
+        <p:cNvPr id="1" name=""/>
+        <p:cNvGrpSpPr/>
+        <p:nvPr/>
+      </p:nvGrpSpPr>
+      <p:grpSpPr>
+        <a:xfrm>
+          <a:off x="0" y="0"/>
+          <a:ext cx="0" cy="0"/>
+          <a:chOff x="0" y="0"/>
+          <a:chExt cx="0" cy="0"/>
+        </a:xfrm>
+      </p:grpSpPr>
+      <p:sp>
+        <p:nvSpPr>
+          <p:cNvPr id="2" name="Slide Image Placeholder 1"/>
+          <p:cNvSpPr>
+            <a:spLocks noGrp="1" noRot="1" noChangeAspect="1"/>
+          </p:cNvSpPr>
+          <p:nvPr>
+            <p:ph type="sldImg"/>
+          </p:nvPr>
+        </p:nvSpPr>
+        <p:spPr/>
+      </p:sp>
+      <p:sp>
+        <p:nvSpPr>
+          <p:cNvPr id="3" name="Notes Placeholder 2"/>
+          <p:cNvSpPr>
+            <a:spLocks noGrp="1"/>
+          </p:cNvSpPr>
+          <p:nvPr>
+            <p:ph type="body" idx="1"/>
+          </p:nvPr>
+        </p:nvSpPr>
+        <p:spPr/>
+        <p:txBody>
+          <a:bodyPr/>
+          <a:lstStyle/>
+          <a:p>
+            <a:endParaRPr lang="en-US" sz="1000" dirty="0"/>
+          </a:p>
+        </p:txBody>
+      </p:sp>
+      <p:sp>
+        <p:nvSpPr>
+          <p:cNvPr id="4" name="Slide Number Placeholder 3"/>
+          <p:cNvSpPr>
+            <a:spLocks noGrp="1"/>
+          </p:cNvSpPr>
+          <p:nvPr>
+            <p:ph type="sldNum" sz="quarter" idx="10"/>
+          </p:nvPr>
+        </p:nvSpPr>
+        <p:spPr/>
+        <p:txBody>
+          <a:bodyPr/>
+          <a:lstStyle/>
+          <a:p>
+            <a:fld id="{5394DE12-7B9B-46AA-AC19-C30A49928B9B}" type="slidenum">
+              <a:rPr lang="en-US" smtClean="0"/>
+              <a:t>23</a:t>
+            </a:fld>
+            <a:endParaRPr lang="en-US" dirty="0"/>
+          </a:p>
+        </p:txBody>
+      </p:sp>
+    </p:spTree>
+    <p:extLst>
+      <p:ext uri="{BB962C8B-B14F-4D97-AF65-F5344CB8AC3E}">
+        <p14:creationId xmlns:p14="http://schemas.microsoft.com/office/powerpoint/2010/main" val="2350450356"/>
+      </p:ext>
+    </p:extLst>
+  </p:cSld>
+  <p:clrMapOvr>
+    <a:masterClrMapping/>
+  </p:clrMapOvr>
+</p:notes>
+</file>
+
+<file path=ppt/notesSlides/notesSlide24.xml><?xml version="1.0" encoding="utf-8"?>
+<p:notes xmlns:a="http://schemas.openxmlformats.org/drawingml/2006/main" xmlns:r="http://schemas.openxmlformats.org/officeDocument/2006/relationships" xmlns:p="http://schemas.openxmlformats.org/presentationml/2006/main">
+  <p:cSld>
+    <p:spTree>
+      <p:nvGrpSpPr>
+        <p:cNvPr id="1" name=""/>
+        <p:cNvGrpSpPr/>
+        <p:nvPr/>
+      </p:nvGrpSpPr>
+      <p:grpSpPr>
+        <a:xfrm>
+          <a:off x="0" y="0"/>
+          <a:ext cx="0" cy="0"/>
+          <a:chOff x="0" y="0"/>
+          <a:chExt cx="0" cy="0"/>
+        </a:xfrm>
+      </p:grpSpPr>
+      <p:sp>
+        <p:nvSpPr>
+          <p:cNvPr id="2" name="Slide Image Placeholder 1"/>
+          <p:cNvSpPr>
+            <a:spLocks noGrp="1" noRot="1" noChangeAspect="1"/>
+          </p:cNvSpPr>
+          <p:nvPr>
+            <p:ph type="sldImg"/>
+          </p:nvPr>
+        </p:nvSpPr>
+        <p:spPr/>
+      </p:sp>
+      <p:sp>
+        <p:nvSpPr>
+          <p:cNvPr id="3" name="Notes Placeholder 2"/>
+          <p:cNvSpPr>
+            <a:spLocks noGrp="1"/>
+          </p:cNvSpPr>
+          <p:nvPr>
+            <p:ph type="body" idx="1"/>
+          </p:nvPr>
+        </p:nvSpPr>
+        <p:spPr/>
+        <p:txBody>
+          <a:bodyPr/>
+          <a:lstStyle/>
+          <a:p>
+            <a:endParaRPr lang="en-US" dirty="0"/>
+          </a:p>
+        </p:txBody>
+      </p:sp>
+      <p:sp>
+        <p:nvSpPr>
+          <p:cNvPr id="4" name="Slide Number Placeholder 3"/>
+          <p:cNvSpPr>
+            <a:spLocks noGrp="1"/>
+          </p:cNvSpPr>
+          <p:nvPr>
+            <p:ph type="sldNum" sz="quarter" idx="10"/>
+          </p:nvPr>
+        </p:nvSpPr>
+        <p:spPr/>
+        <p:txBody>
+          <a:bodyPr/>
+          <a:lstStyle/>
+          <a:p>
+            <a:fld id="{5394DE12-7B9B-46AA-AC19-C30A49928B9B}" type="slidenum">
+              <a:rPr lang="en-US" smtClean="0"/>
+              <a:t>24</a:t>
+            </a:fld>
+            <a:endParaRPr lang="en-US" dirty="0"/>
+          </a:p>
+        </p:txBody>
+      </p:sp>
+    </p:spTree>
+    <p:extLst>
+      <p:ext uri="{BB962C8B-B14F-4D97-AF65-F5344CB8AC3E}">
+        <p14:creationId xmlns:p14="http://schemas.microsoft.com/office/powerpoint/2010/main" val="1955383"/>
       </p:ext>
     </p:extLst>
   </p:cSld>
@@ -2106,7 +2725,7 @@
           <a:p>
             <a:fld id="{969F32F5-AB1C-41B2-AE79-C9DE1D1745A4}" type="datetimeFigureOut">
               <a:rPr lang="en-US" smtClean="0"/>
-              <a:t>4/6/2017</a:t>
+              <a:t>4/7/2017</a:t>
             </a:fld>
             <a:endParaRPr lang="en-US" dirty="0"/>
           </a:p>
@@ -2274,7 +2893,7 @@
           <a:p>
             <a:fld id="{969F32F5-AB1C-41B2-AE79-C9DE1D1745A4}" type="datetimeFigureOut">
               <a:rPr lang="en-US" smtClean="0"/>
-              <a:t>4/6/2017</a:t>
+              <a:t>4/7/2017</a:t>
             </a:fld>
             <a:endParaRPr lang="en-US" dirty="0"/>
           </a:p>
@@ -2452,7 +3071,7 @@
           <a:p>
             <a:fld id="{969F32F5-AB1C-41B2-AE79-C9DE1D1745A4}" type="datetimeFigureOut">
               <a:rPr lang="en-US" smtClean="0"/>
-              <a:t>4/6/2017</a:t>
+              <a:t>4/7/2017</a:t>
             </a:fld>
             <a:endParaRPr lang="en-US" dirty="0"/>
           </a:p>
@@ -2620,7 +3239,7 @@
           <a:p>
             <a:fld id="{969F32F5-AB1C-41B2-AE79-C9DE1D1745A4}" type="datetimeFigureOut">
               <a:rPr lang="en-US" smtClean="0"/>
-              <a:t>4/6/2017</a:t>
+              <a:t>4/7/2017</a:t>
             </a:fld>
             <a:endParaRPr lang="en-US" dirty="0"/>
           </a:p>
@@ -2865,7 +3484,7 @@
           <a:p>
             <a:fld id="{969F32F5-AB1C-41B2-AE79-C9DE1D1745A4}" type="datetimeFigureOut">
               <a:rPr lang="en-US" smtClean="0"/>
-              <a:t>4/6/2017</a:t>
+              <a:t>4/7/2017</a:t>
             </a:fld>
             <a:endParaRPr lang="en-US" dirty="0"/>
           </a:p>
@@ -3094,7 +3713,7 @@
           <a:p>
             <a:fld id="{969F32F5-AB1C-41B2-AE79-C9DE1D1745A4}" type="datetimeFigureOut">
               <a:rPr lang="en-US" smtClean="0"/>
-              <a:t>4/6/2017</a:t>
+              <a:t>4/7/2017</a:t>
             </a:fld>
             <a:endParaRPr lang="en-US" dirty="0"/>
           </a:p>
@@ -3458,7 +4077,7 @@
           <a:p>
             <a:fld id="{969F32F5-AB1C-41B2-AE79-C9DE1D1745A4}" type="datetimeFigureOut">
               <a:rPr lang="en-US" smtClean="0"/>
-              <a:t>4/6/2017</a:t>
+              <a:t>4/7/2017</a:t>
             </a:fld>
             <a:endParaRPr lang="en-US" dirty="0"/>
           </a:p>
@@ -3575,7 +4194,7 @@
           <a:p>
             <a:fld id="{969F32F5-AB1C-41B2-AE79-C9DE1D1745A4}" type="datetimeFigureOut">
               <a:rPr lang="en-US" smtClean="0"/>
-              <a:t>4/6/2017</a:t>
+              <a:t>4/7/2017</a:t>
             </a:fld>
             <a:endParaRPr lang="en-US" dirty="0"/>
           </a:p>
@@ -3670,7 +4289,7 @@
           <a:p>
             <a:fld id="{969F32F5-AB1C-41B2-AE79-C9DE1D1745A4}" type="datetimeFigureOut">
               <a:rPr lang="en-US" smtClean="0"/>
-              <a:t>4/6/2017</a:t>
+              <a:t>4/7/2017</a:t>
             </a:fld>
             <a:endParaRPr lang="en-US" dirty="0"/>
           </a:p>
@@ -3945,7 +4564,7 @@
           <a:p>
             <a:fld id="{969F32F5-AB1C-41B2-AE79-C9DE1D1745A4}" type="datetimeFigureOut">
               <a:rPr lang="en-US" smtClean="0"/>
-              <a:t>4/6/2017</a:t>
+              <a:t>4/7/2017</a:t>
             </a:fld>
             <a:endParaRPr lang="en-US" dirty="0"/>
           </a:p>
@@ -4197,7 +4816,7 @@
           <a:p>
             <a:fld id="{969F32F5-AB1C-41B2-AE79-C9DE1D1745A4}" type="datetimeFigureOut">
               <a:rPr lang="en-US" smtClean="0"/>
-              <a:t>4/6/2017</a:t>
+              <a:t>4/7/2017</a:t>
             </a:fld>
             <a:endParaRPr lang="en-US" dirty="0"/>
           </a:p>
@@ -4408,7 +5027,7 @@
           <a:p>
             <a:fld id="{969F32F5-AB1C-41B2-AE79-C9DE1D1745A4}" type="datetimeFigureOut">
               <a:rPr lang="en-US" smtClean="0"/>
-              <a:t>4/6/2017</a:t>
+              <a:t>4/7/2017</a:t>
             </a:fld>
             <a:endParaRPr lang="en-US" dirty="0"/>
           </a:p>
@@ -5014,7 +5633,6 @@
               <a:rPr lang="en-US" sz="3600" dirty="0"/>
               <a:t>OvalDraw Plus User Interface Design</a:t>
             </a:r>
-            <a:endParaRPr lang="en-US" sz="3600" dirty="0"/>
           </a:p>
         </p:txBody>
       </p:sp>
@@ -5123,7 +5741,6 @@
               <a:rPr lang="en-US" sz="3600" dirty="0"/>
               <a:t>Timers</a:t>
             </a:r>
-            <a:endParaRPr lang="en-US" sz="3600" dirty="0"/>
           </a:p>
         </p:txBody>
       </p:sp>
@@ -5247,7 +5864,6 @@
               <a:rPr lang="en-US" sz="3600" dirty="0"/>
               <a:t>Model-View-Controller</a:t>
             </a:r>
-            <a:endParaRPr lang="en-US" sz="3600" dirty="0"/>
           </a:p>
         </p:txBody>
       </p:sp>
@@ -5545,7 +6161,6 @@
               <a:rPr lang="en-US" sz="3600" dirty="0"/>
               <a:t>Serialization and Reading/Writing Text Files</a:t>
             </a:r>
-            <a:endParaRPr lang="en-US" sz="3600" dirty="0"/>
           </a:p>
         </p:txBody>
       </p:sp>
@@ -5704,7 +6319,6 @@
               <a:rPr lang="en-US" sz="3600" dirty="0"/>
               <a:t>OvalDraw Plus User Interface Design</a:t>
             </a:r>
-            <a:endParaRPr lang="en-US" sz="3600" dirty="0"/>
           </a:p>
         </p:txBody>
       </p:sp>
@@ -5813,7 +6427,6 @@
               <a:rPr lang="en-US" sz="3600" dirty="0"/>
               <a:t>Closing Comments &amp; Next Steps</a:t>
             </a:r>
-            <a:endParaRPr lang="en-US" sz="3600" dirty="0"/>
           </a:p>
         </p:txBody>
       </p:sp>
@@ -6006,6 +6619,356 @@
 </p:sld>
 </file>
 
+<file path=ppt/slides/slide18.xml><?xml version="1.0" encoding="utf-8"?>
+<p:sld xmlns:a="http://schemas.openxmlformats.org/drawingml/2006/main" xmlns:r="http://schemas.openxmlformats.org/officeDocument/2006/relationships" xmlns:p="http://schemas.openxmlformats.org/presentationml/2006/main">
+  <p:cSld>
+    <p:spTree>
+      <p:nvGrpSpPr>
+        <p:cNvPr id="1" name=""/>
+        <p:cNvGrpSpPr/>
+        <p:nvPr/>
+      </p:nvGrpSpPr>
+      <p:grpSpPr>
+        <a:xfrm>
+          <a:off x="0" y="0"/>
+          <a:ext cx="0" cy="0"/>
+          <a:chOff x="0" y="0"/>
+          <a:chExt cx="0" cy="0"/>
+        </a:xfrm>
+      </p:grpSpPr>
+      <p:sp>
+        <p:nvSpPr>
+          <p:cNvPr id="2" name="Title 1"/>
+          <p:cNvSpPr>
+            <a:spLocks noGrp="1"/>
+          </p:cNvSpPr>
+          <p:nvPr>
+            <p:ph type="title"/>
+          </p:nvPr>
+        </p:nvSpPr>
+        <p:spPr>
+          <a:xfrm>
+            <a:off x="838200" y="365126"/>
+            <a:ext cx="6113662" cy="1409174"/>
+          </a:xfrm>
+        </p:spPr>
+        <p:txBody>
+          <a:bodyPr>
+            <a:normAutofit/>
+          </a:bodyPr>
+          <a:lstStyle/>
+          <a:p>
+            <a:r>
+              <a:rPr lang="en-US" sz="3600" dirty="0"/>
+              <a:t>Object-Oriented Programming</a:t>
+            </a:r>
+            <a:br>
+              <a:rPr lang="en-US" sz="3600" dirty="0"/>
+            </a:br>
+            <a:r>
+              <a:rPr lang="en-US" sz="1600" dirty="0"/>
+              <a:t>Session: Week 4 Session 2 </a:t>
+            </a:r>
+            <a:br>
+              <a:rPr lang="en-US" sz="1600" dirty="0"/>
+            </a:br>
+            <a:r>
+              <a:rPr lang="en-US" sz="1600" dirty="0"/>
+              <a:t>Subject: More Interactive User Interfaces</a:t>
+            </a:r>
+            <a:br>
+              <a:rPr lang="en-US" sz="1600" dirty="0"/>
+            </a:br>
+            <a:r>
+              <a:rPr lang="en-US" sz="1600" dirty="0"/>
+              <a:t>Instructor: Eric Pogue</a:t>
+            </a:r>
+            <a:endParaRPr lang="en-US" sz="1600" b="1" i="1" u="sng" dirty="0"/>
+          </a:p>
+        </p:txBody>
+      </p:sp>
+      <p:sp>
+        <p:nvSpPr>
+          <p:cNvPr id="3" name="Content Placeholder 2"/>
+          <p:cNvSpPr>
+            <a:spLocks noGrp="1"/>
+          </p:cNvSpPr>
+          <p:nvPr>
+            <p:ph idx="1"/>
+          </p:nvPr>
+        </p:nvSpPr>
+        <p:spPr>
+          <a:xfrm>
+            <a:off x="838200" y="1943857"/>
+            <a:ext cx="10718950" cy="4571242"/>
+          </a:xfrm>
+        </p:spPr>
+        <p:txBody>
+          <a:bodyPr>
+            <a:noAutofit/>
+          </a:bodyPr>
+          <a:lstStyle/>
+          <a:p>
+            <a:pPr marL="0" indent="0">
+              <a:buNone/>
+            </a:pPr>
+            <a:r>
+              <a:rPr lang="en-US" sz="2000" u="sng" dirty="0"/>
+              <a:t>Agenda:</a:t>
+            </a:r>
+          </a:p>
+          <a:p>
+            <a:pPr marL="457200" indent="-457200">
+              <a:buFont typeface="+mj-lt"/>
+              <a:buAutoNum type="arabicPeriod"/>
+            </a:pPr>
+            <a:r>
+              <a:rPr lang="en-US" sz="2000" dirty="0"/>
+              <a:t>Quick Review Learning Objectives we covered in Session 1</a:t>
+            </a:r>
+          </a:p>
+          <a:p>
+            <a:pPr marL="457200" indent="-457200">
+              <a:buFont typeface="+mj-lt"/>
+              <a:buAutoNum type="arabicPeriod"/>
+            </a:pPr>
+            <a:r>
+              <a:rPr lang="en-US" sz="2000" dirty="0"/>
+              <a:t>Overview of Session 2 Live Coding example and related Learning Objectives</a:t>
+            </a:r>
+          </a:p>
+          <a:p>
+            <a:pPr marL="457200" indent="-457200">
+              <a:buFont typeface="+mj-lt"/>
+              <a:buAutoNum type="arabicPeriod"/>
+            </a:pPr>
+            <a:r>
+              <a:rPr lang="en-US" sz="2000" dirty="0"/>
+              <a:t>Live User Interface Coding example</a:t>
+            </a:r>
+          </a:p>
+          <a:p>
+            <a:pPr marL="457200" indent="-457200">
+              <a:buFont typeface="+mj-lt"/>
+              <a:buAutoNum type="arabicPeriod"/>
+            </a:pPr>
+            <a:r>
+              <a:rPr lang="en-US" sz="2000" dirty="0"/>
+              <a:t>Review what we learned</a:t>
+            </a:r>
+          </a:p>
+          <a:p>
+            <a:pPr marL="457200" indent="-457200">
+              <a:buFont typeface="+mj-lt"/>
+              <a:buAutoNum type="arabicPeriod"/>
+            </a:pPr>
+            <a:r>
+              <a:rPr lang="en-US" sz="2000" dirty="0"/>
+              <a:t>Closing comments and next steps</a:t>
+            </a:r>
+          </a:p>
+        </p:txBody>
+      </p:sp>
+      <p:pic>
+        <p:nvPicPr>
+          <p:cNvPr id="4" name="Content Placeholder 4"/>
+          <p:cNvPicPr>
+            <a:picLocks noChangeAspect="1"/>
+          </p:cNvPicPr>
+          <p:nvPr/>
+        </p:nvPicPr>
+        <p:blipFill>
+          <a:blip r:embed="rId3"/>
+          <a:stretch>
+            <a:fillRect/>
+          </a:stretch>
+        </p:blipFill>
+        <p:spPr>
+          <a:xfrm>
+            <a:off x="9072894" y="182925"/>
+            <a:ext cx="2656367" cy="1366321"/>
+          </a:xfrm>
+          <a:prstGeom prst="rect">
+            <a:avLst/>
+          </a:prstGeom>
+        </p:spPr>
+      </p:pic>
+    </p:spTree>
+    <p:extLst>
+      <p:ext uri="{BB962C8B-B14F-4D97-AF65-F5344CB8AC3E}">
+        <p14:creationId xmlns:p14="http://schemas.microsoft.com/office/powerpoint/2010/main" val="1411330556"/>
+      </p:ext>
+    </p:extLst>
+  </p:cSld>
+  <p:clrMapOvr>
+    <a:masterClrMapping/>
+  </p:clrMapOvr>
+</p:sld>
+</file>
+
+<file path=ppt/slides/slide19.xml><?xml version="1.0" encoding="utf-8"?>
+<p:sld xmlns:a="http://schemas.openxmlformats.org/drawingml/2006/main" xmlns:r="http://schemas.openxmlformats.org/officeDocument/2006/relationships" xmlns:p="http://schemas.openxmlformats.org/presentationml/2006/main">
+  <p:cSld>
+    <p:spTree>
+      <p:nvGrpSpPr>
+        <p:cNvPr id="1" name=""/>
+        <p:cNvGrpSpPr/>
+        <p:nvPr/>
+      </p:nvGrpSpPr>
+      <p:grpSpPr>
+        <a:xfrm>
+          <a:off x="0" y="0"/>
+          <a:ext cx="0" cy="0"/>
+          <a:chOff x="0" y="0"/>
+          <a:chExt cx="0" cy="0"/>
+        </a:xfrm>
+      </p:grpSpPr>
+      <p:sp>
+        <p:nvSpPr>
+          <p:cNvPr id="2" name="Title 1"/>
+          <p:cNvSpPr>
+            <a:spLocks noGrp="1"/>
+          </p:cNvSpPr>
+          <p:nvPr>
+            <p:ph type="title"/>
+          </p:nvPr>
+        </p:nvSpPr>
+        <p:spPr>
+          <a:xfrm>
+            <a:off x="838200" y="365126"/>
+            <a:ext cx="10515600" cy="757272"/>
+          </a:xfrm>
+        </p:spPr>
+        <p:txBody>
+          <a:bodyPr>
+            <a:normAutofit/>
+          </a:bodyPr>
+          <a:lstStyle/>
+          <a:p>
+            <a:r>
+              <a:rPr lang="en-US" sz="3600" dirty="0"/>
+              <a:t>Learning Objectives – Week 4</a:t>
+            </a:r>
+            <a:endParaRPr lang="en-US" sz="3600" b="1" i="1" u="sng" dirty="0"/>
+          </a:p>
+        </p:txBody>
+      </p:sp>
+      <p:sp>
+        <p:nvSpPr>
+          <p:cNvPr id="3" name="Content Placeholder 2"/>
+          <p:cNvSpPr>
+            <a:spLocks noGrp="1"/>
+          </p:cNvSpPr>
+          <p:nvPr>
+            <p:ph idx="1"/>
+          </p:nvPr>
+        </p:nvSpPr>
+        <p:spPr>
+          <a:xfrm>
+            <a:off x="838200" y="1122398"/>
+            <a:ext cx="10718950" cy="5463343"/>
+          </a:xfrm>
+        </p:spPr>
+        <p:txBody>
+          <a:bodyPr>
+            <a:normAutofit/>
+          </a:bodyPr>
+          <a:lstStyle/>
+          <a:p>
+            <a:pPr marL="457200" indent="-457200">
+              <a:buFont typeface="+mj-lt"/>
+              <a:buAutoNum type="arabicPeriod"/>
+            </a:pPr>
+            <a:r>
+              <a:rPr lang="en-US" sz="2000" dirty="0"/>
+              <a:t>Implement a menu system that enables the user to trigger a variety of actions in a familiar way</a:t>
+            </a:r>
+          </a:p>
+          <a:p>
+            <a:pPr marL="457200" indent="-457200">
+              <a:buFont typeface="+mj-lt"/>
+              <a:buAutoNum type="arabicPeriod"/>
+            </a:pPr>
+            <a:r>
+              <a:rPr lang="en-US" sz="2000" dirty="0"/>
+              <a:t>Implement code that responds to of events including: clicking the mouse, moving or dragging the mouse, and typing a key on the keyboard</a:t>
+            </a:r>
+          </a:p>
+          <a:p>
+            <a:pPr marL="457200" indent="-457200">
+              <a:buFont typeface="+mj-lt"/>
+              <a:buAutoNum type="arabicPeriod"/>
+            </a:pPr>
+            <a:r>
+              <a:rPr lang="en-US" sz="2000" dirty="0"/>
+              <a:t>Design multiple intuitive ways for a user to perform a particular task</a:t>
+            </a:r>
+          </a:p>
+          <a:p>
+            <a:pPr marL="457200" indent="-457200">
+              <a:buFont typeface="+mj-lt"/>
+              <a:buAutoNum type="arabicPeriod"/>
+            </a:pPr>
+            <a:r>
+              <a:rPr lang="en-US" sz="2000" dirty="0"/>
+              <a:t>Implement animation using a timer and a corresponding event handler</a:t>
+            </a:r>
+          </a:p>
+          <a:p>
+            <a:pPr marL="457200" indent="-457200">
+              <a:buFont typeface="+mj-lt"/>
+              <a:buAutoNum type="arabicPeriod"/>
+            </a:pPr>
+            <a:r>
+              <a:rPr lang="en-US" sz="2000" dirty="0"/>
+              <a:t>Create interactive applications that adhere to the Model-View-Controller pattern</a:t>
+            </a:r>
+          </a:p>
+          <a:p>
+            <a:pPr marL="457200" indent="-457200">
+              <a:buFont typeface="+mj-lt"/>
+              <a:buAutoNum type="arabicPeriod"/>
+            </a:pPr>
+            <a:r>
+              <a:rPr lang="en-US" sz="2000" dirty="0"/>
+              <a:t>Understand how Java achieves speedier input and output (IO) through a hierarchy file IO classes</a:t>
+            </a:r>
+          </a:p>
+          <a:p>
+            <a:pPr marL="457200" indent="-457200">
+              <a:buFont typeface="+mj-lt"/>
+              <a:buAutoNum type="arabicPeriod"/>
+            </a:pPr>
+            <a:r>
+              <a:rPr lang="en-US" sz="2000" dirty="0"/>
+              <a:t>Design and implement a controller class that outputs data to a text file</a:t>
+            </a:r>
+          </a:p>
+          <a:p>
+            <a:pPr marL="457200" indent="-457200">
+              <a:buFont typeface="+mj-lt"/>
+              <a:buAutoNum type="arabicPeriod"/>
+            </a:pPr>
+            <a:r>
+              <a:rPr lang="en-US" sz="2000" dirty="0"/>
+              <a:t>Design and implement a controller class that inputs data from a text file and builds a collection of objects from the data read data</a:t>
+            </a:r>
+          </a:p>
+        </p:txBody>
+      </p:sp>
+    </p:spTree>
+    <p:extLst>
+      <p:ext uri="{BB962C8B-B14F-4D97-AF65-F5344CB8AC3E}">
+        <p14:creationId xmlns:p14="http://schemas.microsoft.com/office/powerpoint/2010/main" val="2962045905"/>
+      </p:ext>
+    </p:extLst>
+  </p:cSld>
+  <p:clrMapOvr>
+    <a:masterClrMapping/>
+  </p:clrMapOvr>
+</p:sld>
+</file>
+
 <file path=ppt/slides/slide2.xml><?xml version="1.0" encoding="utf-8"?>
 <p:sld xmlns:a="http://schemas.openxmlformats.org/drawingml/2006/main" xmlns:r="http://schemas.openxmlformats.org/officeDocument/2006/relationships" xmlns:p="http://schemas.openxmlformats.org/presentationml/2006/main">
   <p:cSld>
@@ -6204,6 +7167,739 @@
 </p:sld>
 </file>
 
+<file path=ppt/slides/slide20.xml><?xml version="1.0" encoding="utf-8"?>
+<p:sld xmlns:a="http://schemas.openxmlformats.org/drawingml/2006/main" xmlns:r="http://schemas.openxmlformats.org/officeDocument/2006/relationships" xmlns:p="http://schemas.openxmlformats.org/presentationml/2006/main">
+  <p:cSld>
+    <p:spTree>
+      <p:nvGrpSpPr>
+        <p:cNvPr id="1" name=""/>
+        <p:cNvGrpSpPr/>
+        <p:nvPr/>
+      </p:nvGrpSpPr>
+      <p:grpSpPr>
+        <a:xfrm>
+          <a:off x="0" y="0"/>
+          <a:ext cx="0" cy="0"/>
+          <a:chOff x="0" y="0"/>
+          <a:chExt cx="0" cy="0"/>
+        </a:xfrm>
+      </p:grpSpPr>
+      <p:sp>
+        <p:nvSpPr>
+          <p:cNvPr id="2" name="Title 1"/>
+          <p:cNvSpPr>
+            <a:spLocks noGrp="1"/>
+          </p:cNvSpPr>
+          <p:nvPr>
+            <p:ph type="title"/>
+          </p:nvPr>
+        </p:nvSpPr>
+        <p:spPr>
+          <a:xfrm>
+            <a:off x="838200" y="365126"/>
+            <a:ext cx="10515600" cy="757272"/>
+          </a:xfrm>
+        </p:spPr>
+        <p:txBody>
+          <a:bodyPr>
+            <a:normAutofit/>
+          </a:bodyPr>
+          <a:lstStyle/>
+          <a:p>
+            <a:r>
+              <a:rPr lang="en-US" sz="3600" dirty="0"/>
+              <a:t>Learning Objectives – Week 4</a:t>
+            </a:r>
+            <a:endParaRPr lang="en-US" sz="3600" b="1" i="1" u="sng" dirty="0"/>
+          </a:p>
+        </p:txBody>
+      </p:sp>
+      <p:sp>
+        <p:nvSpPr>
+          <p:cNvPr id="3" name="Content Placeholder 2"/>
+          <p:cNvSpPr>
+            <a:spLocks noGrp="1"/>
+          </p:cNvSpPr>
+          <p:nvPr>
+            <p:ph idx="1"/>
+          </p:nvPr>
+        </p:nvSpPr>
+        <p:spPr>
+          <a:xfrm>
+            <a:off x="838200" y="1122398"/>
+            <a:ext cx="10718950" cy="5463343"/>
+          </a:xfrm>
+        </p:spPr>
+        <p:txBody>
+          <a:bodyPr>
+            <a:normAutofit/>
+          </a:bodyPr>
+          <a:lstStyle/>
+          <a:p>
+            <a:pPr marL="457200" indent="-457200">
+              <a:buFont typeface="+mj-lt"/>
+              <a:buAutoNum type="arabicPeriod"/>
+            </a:pPr>
+            <a:r>
+              <a:rPr lang="en-US" sz="2000" dirty="0"/>
+              <a:t>Implement a menu system that enables the user to trigger a variety of actions in a familiar way</a:t>
+            </a:r>
+          </a:p>
+          <a:p>
+            <a:pPr marL="457200" indent="-457200">
+              <a:buFont typeface="+mj-lt"/>
+              <a:buAutoNum type="arabicPeriod"/>
+            </a:pPr>
+            <a:r>
+              <a:rPr lang="en-US" sz="2000" dirty="0"/>
+              <a:t>Implement code that responds to of events including: clicking the mouse, moving or dragging the mouse, and typing a key on the keyboard</a:t>
+            </a:r>
+          </a:p>
+          <a:p>
+            <a:pPr marL="457200" indent="-457200">
+              <a:buFont typeface="+mj-lt"/>
+              <a:buAutoNum type="arabicPeriod"/>
+            </a:pPr>
+            <a:r>
+              <a:rPr lang="en-US" sz="2000" dirty="0"/>
+              <a:t>Design multiple intuitive ways for a user to perform a particular task</a:t>
+            </a:r>
+          </a:p>
+          <a:p>
+            <a:pPr marL="457200" indent="-457200">
+              <a:buFont typeface="+mj-lt"/>
+              <a:buAutoNum type="arabicPeriod"/>
+            </a:pPr>
+            <a:r>
+              <a:rPr lang="en-US" sz="2000" dirty="0">
+                <a:solidFill>
+                  <a:schemeClr val="bg1">
+                    <a:lumMod val="65000"/>
+                  </a:schemeClr>
+                </a:solidFill>
+              </a:rPr>
+              <a:t>Implement animation using a timer and a corresponding event handler</a:t>
+            </a:r>
+          </a:p>
+          <a:p>
+            <a:pPr marL="457200" indent="-457200">
+              <a:buFont typeface="+mj-lt"/>
+              <a:buAutoNum type="arabicPeriod"/>
+            </a:pPr>
+            <a:r>
+              <a:rPr lang="en-US" sz="2000" dirty="0">
+                <a:solidFill>
+                  <a:schemeClr val="bg1">
+                    <a:lumMod val="65000"/>
+                  </a:schemeClr>
+                </a:solidFill>
+              </a:rPr>
+              <a:t>Create interactive applications that adhere to the Model-View-Controller pattern</a:t>
+            </a:r>
+          </a:p>
+          <a:p>
+            <a:pPr marL="457200" indent="-457200">
+              <a:buFont typeface="+mj-lt"/>
+              <a:buAutoNum type="arabicPeriod"/>
+            </a:pPr>
+            <a:r>
+              <a:rPr lang="en-US" sz="2000" dirty="0">
+                <a:solidFill>
+                  <a:schemeClr val="bg1">
+                    <a:lumMod val="65000"/>
+                  </a:schemeClr>
+                </a:solidFill>
+              </a:rPr>
+              <a:t>Understand how Java achieves speedier input and output (IO) through a hierarchy file IO classes</a:t>
+            </a:r>
+          </a:p>
+          <a:p>
+            <a:pPr marL="457200" indent="-457200">
+              <a:buFont typeface="+mj-lt"/>
+              <a:buAutoNum type="arabicPeriod"/>
+            </a:pPr>
+            <a:r>
+              <a:rPr lang="en-US" sz="2000" dirty="0">
+                <a:solidFill>
+                  <a:schemeClr val="bg1">
+                    <a:lumMod val="65000"/>
+                  </a:schemeClr>
+                </a:solidFill>
+              </a:rPr>
+              <a:t>Design and implement a controller class that outputs data to a text file</a:t>
+            </a:r>
+          </a:p>
+          <a:p>
+            <a:pPr marL="457200" indent="-457200">
+              <a:buFont typeface="+mj-lt"/>
+              <a:buAutoNum type="arabicPeriod"/>
+            </a:pPr>
+            <a:r>
+              <a:rPr lang="en-US" sz="2000" dirty="0">
+                <a:solidFill>
+                  <a:schemeClr val="bg1">
+                    <a:lumMod val="65000"/>
+                  </a:schemeClr>
+                </a:solidFill>
+              </a:rPr>
+              <a:t>Design and implement a controller class that inputs data from a text file and builds a collection of objects from the data read data</a:t>
+            </a:r>
+          </a:p>
+        </p:txBody>
+      </p:sp>
+    </p:spTree>
+    <p:extLst>
+      <p:ext uri="{BB962C8B-B14F-4D97-AF65-F5344CB8AC3E}">
+        <p14:creationId xmlns:p14="http://schemas.microsoft.com/office/powerpoint/2010/main" val="3555772913"/>
+      </p:ext>
+    </p:extLst>
+  </p:cSld>
+  <p:clrMapOvr>
+    <a:masterClrMapping/>
+  </p:clrMapOvr>
+</p:sld>
+</file>
+
+<file path=ppt/slides/slide21.xml><?xml version="1.0" encoding="utf-8"?>
+<p:sld xmlns:a="http://schemas.openxmlformats.org/drawingml/2006/main" xmlns:r="http://schemas.openxmlformats.org/officeDocument/2006/relationships" xmlns:p="http://schemas.openxmlformats.org/presentationml/2006/main">
+  <p:cSld>
+    <p:spTree>
+      <p:nvGrpSpPr>
+        <p:cNvPr id="1" name=""/>
+        <p:cNvGrpSpPr/>
+        <p:nvPr/>
+      </p:nvGrpSpPr>
+      <p:grpSpPr>
+        <a:xfrm>
+          <a:off x="0" y="0"/>
+          <a:ext cx="0" cy="0"/>
+          <a:chOff x="0" y="0"/>
+          <a:chExt cx="0" cy="0"/>
+        </a:xfrm>
+      </p:grpSpPr>
+      <p:sp>
+        <p:nvSpPr>
+          <p:cNvPr id="2" name="Title 1"/>
+          <p:cNvSpPr>
+            <a:spLocks noGrp="1"/>
+          </p:cNvSpPr>
+          <p:nvPr>
+            <p:ph type="title"/>
+          </p:nvPr>
+        </p:nvSpPr>
+        <p:spPr/>
+        <p:txBody>
+          <a:bodyPr>
+            <a:normAutofit/>
+          </a:bodyPr>
+          <a:lstStyle/>
+          <a:p>
+            <a:r>
+              <a:rPr lang="en-US" sz="3600" dirty="0"/>
+              <a:t>OvalDraw Plus User Interface Design</a:t>
+            </a:r>
+          </a:p>
+        </p:txBody>
+      </p:sp>
+      <p:pic>
+        <p:nvPicPr>
+          <p:cNvPr id="6" name="Picture 5"/>
+          <p:cNvPicPr>
+            <a:picLocks noChangeAspect="1"/>
+          </p:cNvPicPr>
+          <p:nvPr/>
+        </p:nvPicPr>
+        <p:blipFill>
+          <a:blip r:embed="rId3"/>
+          <a:stretch>
+            <a:fillRect/>
+          </a:stretch>
+        </p:blipFill>
+        <p:spPr>
+          <a:xfrm>
+            <a:off x="838200" y="1441487"/>
+            <a:ext cx="5562600" cy="3762375"/>
+          </a:xfrm>
+          <a:prstGeom prst="rect">
+            <a:avLst/>
+          </a:prstGeom>
+        </p:spPr>
+      </p:pic>
+      <p:pic>
+        <p:nvPicPr>
+          <p:cNvPr id="8" name="Picture 7"/>
+          <p:cNvPicPr>
+            <a:picLocks noChangeAspect="1"/>
+          </p:cNvPicPr>
+          <p:nvPr/>
+        </p:nvPicPr>
+        <p:blipFill>
+          <a:blip r:embed="rId4" cstate="print">
+            <a:extLst>
+              <a:ext uri="{28A0092B-C50C-407E-A947-70E740481C1C}">
+                <a14:useLocalDpi xmlns:a14="http://schemas.microsoft.com/office/drawing/2010/main" val="0"/>
+              </a:ext>
+            </a:extLst>
+          </a:blip>
+          <a:stretch>
+            <a:fillRect/>
+          </a:stretch>
+        </p:blipFill>
+        <p:spPr>
+          <a:xfrm>
+            <a:off x="6521303" y="2392326"/>
+            <a:ext cx="5472223" cy="4104167"/>
+          </a:xfrm>
+          <a:prstGeom prst="rect">
+            <a:avLst/>
+          </a:prstGeom>
+        </p:spPr>
+      </p:pic>
+    </p:spTree>
+    <p:extLst>
+      <p:ext uri="{BB962C8B-B14F-4D97-AF65-F5344CB8AC3E}">
+        <p14:creationId xmlns:p14="http://schemas.microsoft.com/office/powerpoint/2010/main" val="2315987148"/>
+      </p:ext>
+    </p:extLst>
+  </p:cSld>
+  <p:clrMapOvr>
+    <a:masterClrMapping/>
+  </p:clrMapOvr>
+</p:sld>
+</file>
+
+<file path=ppt/slides/slide22.xml><?xml version="1.0" encoding="utf-8"?>
+<p:sld xmlns:a="http://schemas.openxmlformats.org/drawingml/2006/main" xmlns:r="http://schemas.openxmlformats.org/officeDocument/2006/relationships" xmlns:p="http://schemas.openxmlformats.org/presentationml/2006/main">
+  <p:cSld>
+    <p:spTree>
+      <p:nvGrpSpPr>
+        <p:cNvPr id="1" name=""/>
+        <p:cNvGrpSpPr/>
+        <p:nvPr/>
+      </p:nvGrpSpPr>
+      <p:grpSpPr>
+        <a:xfrm>
+          <a:off x="0" y="0"/>
+          <a:ext cx="0" cy="0"/>
+          <a:chOff x="0" y="0"/>
+          <a:chExt cx="0" cy="0"/>
+        </a:xfrm>
+      </p:grpSpPr>
+      <p:sp>
+        <p:nvSpPr>
+          <p:cNvPr id="2" name="Title 1"/>
+          <p:cNvSpPr>
+            <a:spLocks noGrp="1"/>
+          </p:cNvSpPr>
+          <p:nvPr>
+            <p:ph type="title"/>
+          </p:nvPr>
+        </p:nvSpPr>
+        <p:spPr>
+          <a:xfrm>
+            <a:off x="838200" y="365126"/>
+            <a:ext cx="10515600" cy="757272"/>
+          </a:xfrm>
+        </p:spPr>
+        <p:txBody>
+          <a:bodyPr>
+            <a:normAutofit/>
+          </a:bodyPr>
+          <a:lstStyle/>
+          <a:p>
+            <a:r>
+              <a:rPr lang="en-US" sz="3600" dirty="0"/>
+              <a:t>Learning Objectives – Week 4</a:t>
+            </a:r>
+            <a:endParaRPr lang="en-US" sz="3600" b="1" i="1" u="sng" dirty="0"/>
+          </a:p>
+        </p:txBody>
+      </p:sp>
+      <p:sp>
+        <p:nvSpPr>
+          <p:cNvPr id="3" name="Content Placeholder 2"/>
+          <p:cNvSpPr>
+            <a:spLocks noGrp="1"/>
+          </p:cNvSpPr>
+          <p:nvPr>
+            <p:ph idx="1"/>
+          </p:nvPr>
+        </p:nvSpPr>
+        <p:spPr>
+          <a:xfrm>
+            <a:off x="838200" y="1122398"/>
+            <a:ext cx="10718950" cy="5463343"/>
+          </a:xfrm>
+        </p:spPr>
+        <p:txBody>
+          <a:bodyPr>
+            <a:normAutofit/>
+          </a:bodyPr>
+          <a:lstStyle/>
+          <a:p>
+            <a:pPr marL="457200" indent="-457200">
+              <a:buFont typeface="+mj-lt"/>
+              <a:buAutoNum type="arabicPeriod"/>
+            </a:pPr>
+            <a:r>
+              <a:rPr lang="en-US" sz="2000" dirty="0"/>
+              <a:t>Implement a menu system that enables the user to trigger a variety of actions in a familiar way</a:t>
+            </a:r>
+          </a:p>
+          <a:p>
+            <a:pPr marL="457200" indent="-457200">
+              <a:buFont typeface="+mj-lt"/>
+              <a:buAutoNum type="arabicPeriod"/>
+            </a:pPr>
+            <a:r>
+              <a:rPr lang="en-US" sz="2000" dirty="0"/>
+              <a:t>Implement code that responds to of events including: clicking the mouse, moving or dragging the mouse, and typing a key on the keyboard</a:t>
+            </a:r>
+          </a:p>
+          <a:p>
+            <a:pPr marL="457200" indent="-457200">
+              <a:buFont typeface="+mj-lt"/>
+              <a:buAutoNum type="arabicPeriod"/>
+            </a:pPr>
+            <a:r>
+              <a:rPr lang="en-US" sz="2000" dirty="0"/>
+              <a:t>Design multiple intuitive ways for a user to perform a particular task</a:t>
+            </a:r>
+          </a:p>
+          <a:p>
+            <a:pPr marL="457200" indent="-457200">
+              <a:buFont typeface="+mj-lt"/>
+              <a:buAutoNum type="arabicPeriod"/>
+            </a:pPr>
+            <a:r>
+              <a:rPr lang="en-US" sz="2000" dirty="0">
+                <a:solidFill>
+                  <a:schemeClr val="bg1">
+                    <a:lumMod val="65000"/>
+                  </a:schemeClr>
+                </a:solidFill>
+              </a:rPr>
+              <a:t>Implement animation using a timer and a corresponding event handler</a:t>
+            </a:r>
+          </a:p>
+          <a:p>
+            <a:pPr marL="457200" indent="-457200">
+              <a:buFont typeface="+mj-lt"/>
+              <a:buAutoNum type="arabicPeriod"/>
+            </a:pPr>
+            <a:r>
+              <a:rPr lang="en-US" sz="2000" dirty="0">
+                <a:solidFill>
+                  <a:schemeClr val="bg1">
+                    <a:lumMod val="65000"/>
+                  </a:schemeClr>
+                </a:solidFill>
+              </a:rPr>
+              <a:t>Create interactive applications that adhere to the Model-View-Controller pattern</a:t>
+            </a:r>
+          </a:p>
+          <a:p>
+            <a:pPr marL="457200" indent="-457200">
+              <a:buFont typeface="+mj-lt"/>
+              <a:buAutoNum type="arabicPeriod"/>
+            </a:pPr>
+            <a:r>
+              <a:rPr lang="en-US" sz="2000" dirty="0">
+                <a:solidFill>
+                  <a:schemeClr val="bg1">
+                    <a:lumMod val="65000"/>
+                  </a:schemeClr>
+                </a:solidFill>
+              </a:rPr>
+              <a:t>Understand how Java achieves speedier input and output (IO) through a hierarchy file IO classes</a:t>
+            </a:r>
+          </a:p>
+          <a:p>
+            <a:pPr marL="457200" indent="-457200">
+              <a:buFont typeface="+mj-lt"/>
+              <a:buAutoNum type="arabicPeriod"/>
+            </a:pPr>
+            <a:r>
+              <a:rPr lang="en-US" sz="2000" dirty="0">
+                <a:solidFill>
+                  <a:schemeClr val="bg1">
+                    <a:lumMod val="65000"/>
+                  </a:schemeClr>
+                </a:solidFill>
+              </a:rPr>
+              <a:t>Design and implement a controller class that outputs data to a text file</a:t>
+            </a:r>
+          </a:p>
+          <a:p>
+            <a:pPr marL="457200" indent="-457200">
+              <a:buFont typeface="+mj-lt"/>
+              <a:buAutoNum type="arabicPeriod"/>
+            </a:pPr>
+            <a:r>
+              <a:rPr lang="en-US" sz="2000" dirty="0">
+                <a:solidFill>
+                  <a:schemeClr val="bg1">
+                    <a:lumMod val="65000"/>
+                  </a:schemeClr>
+                </a:solidFill>
+              </a:rPr>
+              <a:t>Design and implement a controller class that inputs data from a text file and builds a collection of objects from the data read data</a:t>
+            </a:r>
+          </a:p>
+        </p:txBody>
+      </p:sp>
+    </p:spTree>
+    <p:extLst>
+      <p:ext uri="{BB962C8B-B14F-4D97-AF65-F5344CB8AC3E}">
+        <p14:creationId xmlns:p14="http://schemas.microsoft.com/office/powerpoint/2010/main" val="3489667079"/>
+      </p:ext>
+    </p:extLst>
+  </p:cSld>
+  <p:clrMapOvr>
+    <a:masterClrMapping/>
+  </p:clrMapOvr>
+</p:sld>
+</file>
+
+<file path=ppt/slides/slide23.xml><?xml version="1.0" encoding="utf-8"?>
+<p:sld xmlns:a="http://schemas.openxmlformats.org/drawingml/2006/main" xmlns:r="http://schemas.openxmlformats.org/officeDocument/2006/relationships" xmlns:p="http://schemas.openxmlformats.org/presentationml/2006/main">
+  <p:cSld>
+    <p:spTree>
+      <p:nvGrpSpPr>
+        <p:cNvPr id="1" name=""/>
+        <p:cNvGrpSpPr/>
+        <p:nvPr/>
+      </p:nvGrpSpPr>
+      <p:grpSpPr>
+        <a:xfrm>
+          <a:off x="0" y="0"/>
+          <a:ext cx="0" cy="0"/>
+          <a:chOff x="0" y="0"/>
+          <a:chExt cx="0" cy="0"/>
+        </a:xfrm>
+      </p:grpSpPr>
+      <p:sp>
+        <p:nvSpPr>
+          <p:cNvPr id="2" name="Title 1"/>
+          <p:cNvSpPr>
+            <a:spLocks noGrp="1"/>
+          </p:cNvSpPr>
+          <p:nvPr>
+            <p:ph type="title"/>
+          </p:nvPr>
+        </p:nvSpPr>
+        <p:spPr/>
+        <p:txBody>
+          <a:bodyPr>
+            <a:normAutofit/>
+          </a:bodyPr>
+          <a:lstStyle/>
+          <a:p>
+            <a:r>
+              <a:rPr lang="en-US" sz="3600" dirty="0"/>
+              <a:t>Closing Comments &amp; Next Steps</a:t>
+            </a:r>
+          </a:p>
+        </p:txBody>
+      </p:sp>
+      <p:sp>
+        <p:nvSpPr>
+          <p:cNvPr id="3" name="Content Placeholder 2"/>
+          <p:cNvSpPr>
+            <a:spLocks noGrp="1"/>
+          </p:cNvSpPr>
+          <p:nvPr>
+            <p:ph idx="1"/>
+          </p:nvPr>
+        </p:nvSpPr>
+        <p:spPr>
+          <a:xfrm>
+            <a:off x="838198" y="1525772"/>
+            <a:ext cx="10515601" cy="4651191"/>
+          </a:xfrm>
+        </p:spPr>
+        <p:txBody>
+          <a:bodyPr>
+            <a:normAutofit/>
+          </a:bodyPr>
+          <a:lstStyle/>
+          <a:p>
+            <a:r>
+              <a:rPr lang="en-US" sz="2000" dirty="0"/>
+              <a:t>I’m trying to get ups in a learning pattern where we:</a:t>
+            </a:r>
+          </a:p>
+          <a:p>
+            <a:pPr marL="800100" lvl="1" indent="-342900">
+              <a:buFont typeface="+mj-lt"/>
+              <a:buAutoNum type="arabicPeriod"/>
+            </a:pPr>
+            <a:r>
+              <a:rPr lang="en-US" sz="1600" dirty="0"/>
+              <a:t>See the concepts and patterns (theory)</a:t>
+            </a:r>
+          </a:p>
+          <a:p>
+            <a:pPr marL="800100" lvl="1" indent="-342900">
+              <a:buFont typeface="+mj-lt"/>
+              <a:buAutoNum type="arabicPeriod"/>
+            </a:pPr>
+            <a:r>
+              <a:rPr lang="en-US" sz="1600" dirty="0"/>
+              <a:t>Watch them being used in a “real-life” example</a:t>
+            </a:r>
+          </a:p>
+          <a:p>
+            <a:pPr marL="800100" lvl="1" indent="-342900">
+              <a:buFont typeface="+mj-lt"/>
+              <a:buAutoNum type="arabicPeriod"/>
+            </a:pPr>
+            <a:r>
+              <a:rPr lang="en-US" sz="1600" dirty="0"/>
+              <a:t>Implement a solution using what we have learned</a:t>
+            </a:r>
+          </a:p>
+          <a:p>
+            <a:r>
+              <a:rPr lang="en-US" sz="2000" dirty="0"/>
+              <a:t>Let me know how this is working, and how we can continue to improve</a:t>
+            </a:r>
+          </a:p>
+        </p:txBody>
+      </p:sp>
+    </p:spTree>
+    <p:extLst>
+      <p:ext uri="{BB962C8B-B14F-4D97-AF65-F5344CB8AC3E}">
+        <p14:creationId xmlns:p14="http://schemas.microsoft.com/office/powerpoint/2010/main" val="3313788454"/>
+      </p:ext>
+    </p:extLst>
+  </p:cSld>
+  <p:clrMapOvr>
+    <a:masterClrMapping/>
+  </p:clrMapOvr>
+</p:sld>
+</file>
+
+<file path=ppt/slides/slide24.xml><?xml version="1.0" encoding="utf-8"?>
+<p:sld xmlns:a="http://schemas.openxmlformats.org/drawingml/2006/main" xmlns:r="http://schemas.openxmlformats.org/officeDocument/2006/relationships" xmlns:p="http://schemas.openxmlformats.org/presentationml/2006/main">
+  <p:cSld>
+    <p:bg>
+      <p:bgPr>
+        <a:solidFill>
+          <a:schemeClr val="bg1">
+            <a:lumMod val="75000"/>
+          </a:schemeClr>
+        </a:solidFill>
+        <a:effectLst/>
+      </p:bgPr>
+    </p:bg>
+    <p:spTree>
+      <p:nvGrpSpPr>
+        <p:cNvPr id="1" name=""/>
+        <p:cNvGrpSpPr/>
+        <p:nvPr/>
+      </p:nvGrpSpPr>
+      <p:grpSpPr>
+        <a:xfrm>
+          <a:off x="0" y="0"/>
+          <a:ext cx="0" cy="0"/>
+          <a:chOff x="0" y="0"/>
+          <a:chExt cx="0" cy="0"/>
+        </a:xfrm>
+      </p:grpSpPr>
+      <p:sp>
+        <p:nvSpPr>
+          <p:cNvPr id="2" name="Title 1"/>
+          <p:cNvSpPr>
+            <a:spLocks noGrp="1"/>
+          </p:cNvSpPr>
+          <p:nvPr>
+            <p:ph type="ctrTitle"/>
+          </p:nvPr>
+        </p:nvSpPr>
+        <p:spPr>
+          <a:xfrm>
+            <a:off x="1524000" y="1122363"/>
+            <a:ext cx="9144000" cy="2387600"/>
+          </a:xfrm>
+        </p:spPr>
+        <p:txBody>
+          <a:bodyPr>
+            <a:normAutofit/>
+          </a:bodyPr>
+          <a:lstStyle/>
+          <a:p>
+            <a:r>
+              <a:rPr lang="en-US" sz="4800" dirty="0"/>
+              <a:t>End of Session</a:t>
+            </a:r>
+          </a:p>
+        </p:txBody>
+      </p:sp>
+      <p:sp>
+        <p:nvSpPr>
+          <p:cNvPr id="3" name="Subtitle 2"/>
+          <p:cNvSpPr>
+            <a:spLocks noGrp="1"/>
+          </p:cNvSpPr>
+          <p:nvPr>
+            <p:ph type="subTitle" idx="1"/>
+          </p:nvPr>
+        </p:nvSpPr>
+        <p:spPr>
+          <a:xfrm>
+            <a:off x="1524000" y="3602038"/>
+            <a:ext cx="9144000" cy="2198022"/>
+          </a:xfrm>
+        </p:spPr>
+        <p:txBody>
+          <a:bodyPr>
+            <a:normAutofit/>
+          </a:bodyPr>
+          <a:lstStyle/>
+          <a:p>
+            <a:pPr algn="l"/>
+            <a:r>
+              <a:rPr lang="en-US" dirty="0"/>
+              <a:t>Course Number: CPSC-24500</a:t>
+            </a:r>
+          </a:p>
+          <a:p>
+            <a:pPr algn="l"/>
+            <a:r>
+              <a:rPr lang="en-US" dirty="0"/>
+              <a:t>Week: 4</a:t>
+            </a:r>
+          </a:p>
+          <a:p>
+            <a:pPr algn="l"/>
+            <a:r>
+              <a:rPr lang="en-US" dirty="0"/>
+              <a:t>Session: 2</a:t>
+            </a:r>
+          </a:p>
+          <a:p>
+            <a:pPr algn="l"/>
+            <a:r>
+              <a:rPr lang="en-US" dirty="0"/>
+              <a:t>Instructor: Eric Pogue</a:t>
+            </a:r>
+          </a:p>
+        </p:txBody>
+      </p:sp>
+    </p:spTree>
+    <p:extLst>
+      <p:ext uri="{BB962C8B-B14F-4D97-AF65-F5344CB8AC3E}">
+        <p14:creationId xmlns:p14="http://schemas.microsoft.com/office/powerpoint/2010/main" val="317146145"/>
+      </p:ext>
+    </p:extLst>
+  </p:cSld>
+  <p:clrMapOvr>
+    <a:masterClrMapping/>
+  </p:clrMapOvr>
+</p:sld>
+</file>
+
 <file path=ppt/slides/slide3.xml><?xml version="1.0" encoding="utf-8"?>
 <p:sld xmlns:a="http://schemas.openxmlformats.org/drawingml/2006/main" xmlns:r="http://schemas.openxmlformats.org/officeDocument/2006/relationships" xmlns:p="http://schemas.openxmlformats.org/presentationml/2006/main">
   <p:cSld>
@@ -6277,11 +7973,7 @@
             </a:pPr>
             <a:r>
               <a:rPr lang="en-US" sz="2000" u="sng" dirty="0"/>
-              <a:t>Mosaic</a:t>
-            </a:r>
-            <a:r>
-              <a:rPr lang="en-US" sz="2000" u="sng" dirty="0"/>
-              <a:t> and Learning Objectives</a:t>
+              <a:t>Mosaic and Learning Objectives</a:t>
             </a:r>
             <a:r>
               <a:rPr lang="en-US" sz="2000" dirty="0"/>
@@ -6985,15 +8677,7 @@
           <a:p>
             <a:r>
               <a:rPr lang="en-US" sz="2000" dirty="0"/>
-              <a:t>mouseReleased(MouseEvent e): </a:t>
-            </a:r>
-            <a:r>
-              <a:rPr lang="en-US" sz="2000" dirty="0"/>
-              <a:t>I</a:t>
-            </a:r>
-            <a:r>
-              <a:rPr lang="en-US" sz="2000" dirty="0"/>
-              <a:t>nvoked when a mouse button has been released on a component</a:t>
+              <a:t>mouseReleased(MouseEvent e): Invoked when a mouse button has been released on a component</a:t>
             </a:r>
           </a:p>
         </p:txBody>
@@ -7047,11 +8731,7 @@
           <a:p>
             <a:r>
               <a:rPr lang="en-US" sz="3600" dirty="0"/>
-              <a:t>MouseMotionListener </a:t>
-            </a:r>
-            <a:r>
-              <a:rPr lang="en-US" sz="3600" dirty="0"/>
-              <a:t>Interface</a:t>
+              <a:t>MouseMotionListener Interface</a:t>
             </a:r>
           </a:p>
         </p:txBody>
@@ -7083,15 +8763,7 @@
             </a:pPr>
             <a:r>
               <a:rPr lang="en-US" sz="2000" dirty="0"/>
-              <a:t>The </a:t>
-            </a:r>
-            <a:r>
-              <a:rPr lang="en-US" sz="2000" dirty="0"/>
-              <a:t>MouseMotionListener interface includes the following </a:t>
-            </a:r>
-            <a:r>
-              <a:rPr lang="en-US" sz="2000" dirty="0"/>
-              <a:t>methods:</a:t>
+              <a:t>The MouseMotionListener interface includes the following methods:</a:t>
             </a:r>
             <a:endParaRPr lang="en-US" sz="2000" b="1" dirty="0"/>
           </a:p>
@@ -7158,11 +8830,7 @@
           <a:p>
             <a:r>
               <a:rPr lang="en-US" sz="3600" dirty="0"/>
-              <a:t>KeyListener </a:t>
-            </a:r>
-            <a:r>
-              <a:rPr lang="en-US" sz="3600" dirty="0"/>
-              <a:t>Interface</a:t>
+              <a:t>KeyListener Interface</a:t>
             </a:r>
           </a:p>
         </p:txBody>
@@ -7194,15 +8862,7 @@
             </a:pPr>
             <a:r>
               <a:rPr lang="en-US" sz="2000" dirty="0"/>
-              <a:t>The Key</a:t>
-            </a:r>
-            <a:r>
-              <a:rPr lang="en-US" sz="2000" dirty="0"/>
-              <a:t>Listener interface includes the following </a:t>
-            </a:r>
-            <a:r>
-              <a:rPr lang="en-US" sz="2000" dirty="0"/>
-              <a:t>methods:</a:t>
+              <a:t>The KeyListener interface includes the following methods:</a:t>
             </a:r>
             <a:endParaRPr lang="en-US" sz="2000" b="1" dirty="0"/>
           </a:p>
@@ -7762,21 +9422,6 @@
 </file>
 
 <file path=customXml/item1.xml><?xml version="1.0" encoding="utf-8"?>
-<?mso-contentType ?>
-<FormTemplates xmlns="http://schemas.microsoft.com/sharepoint/v3/contenttype/forms">
-  <Display>DocumentLibraryForm</Display>
-  <Edit>DocumentLibraryForm</Edit>
-  <New>DocumentLibraryForm</New>
-</FormTemplates>
-</file>
-
-<file path=customXml/item2.xml><?xml version="1.0" encoding="utf-8"?>
-<p:properties xmlns:p="http://schemas.microsoft.com/office/2006/metadata/properties" xmlns:xsi="http://www.w3.org/2001/XMLSchema-instance" xmlns:pc="http://schemas.microsoft.com/office/infopath/2007/PartnerControls">
-  <documentManagement/>
-</p:properties>
-</file>
-
-<file path=customXml/item3.xml><?xml version="1.0" encoding="utf-8"?>
 <ct:contentTypeSchema xmlns:ct="http://schemas.microsoft.com/office/2006/metadata/contentType" xmlns:ma="http://schemas.microsoft.com/office/2006/metadata/properties/metaAttributes" ct:_="" ma:_="" ma:contentTypeName="Document" ma:contentTypeID="0x0101004E7FF26E314236448B954F3A97640002" ma:contentTypeVersion="0" ma:contentTypeDescription="Create a new document." ma:contentTypeScope="" ma:versionID="dcd134f7ef3b1aa8a267b1d1a9f0b332">
   <xsd:schema xmlns:xsd="http://www.w3.org/2001/XMLSchema" xmlns:xs="http://www.w3.org/2001/XMLSchema" xmlns:p="http://schemas.microsoft.com/office/2006/metadata/properties" targetNamespace="http://schemas.microsoft.com/office/2006/metadata/properties" ma:root="true" ma:fieldsID="fad425956ca267ea5e6d723b3f3bd6f1">
     <xsd:element name="properties">
@@ -7890,30 +9535,22 @@
 </ct:contentTypeSchema>
 </file>
 
-<file path=customXml/itemProps1.xml><?xml version="1.0" encoding="utf-8"?>
-<ds:datastoreItem xmlns:ds="http://schemas.openxmlformats.org/officeDocument/2006/customXml" ds:itemID="{87FD8B20-B89A-4B23-9329-175195DD4D8A}">
-  <ds:schemaRefs>
-    <ds:schemaRef ds:uri="http://schemas.microsoft.com/sharepoint/v3/contenttype/forms"/>
-  </ds:schemaRefs>
-</ds:datastoreItem>
+<file path=customXml/item2.xml><?xml version="1.0" encoding="utf-8"?>
+<p:properties xmlns:p="http://schemas.microsoft.com/office/2006/metadata/properties" xmlns:xsi="http://www.w3.org/2001/XMLSchema-instance" xmlns:pc="http://schemas.microsoft.com/office/infopath/2007/PartnerControls">
+  <documentManagement/>
+</p:properties>
 </file>
 
-<file path=customXml/itemProps2.xml><?xml version="1.0" encoding="utf-8"?>
-<ds:datastoreItem xmlns:ds="http://schemas.openxmlformats.org/officeDocument/2006/customXml" ds:itemID="{3473EA1A-2744-48E8-B2A3-4F89C0FC849C}">
-  <ds:schemaRefs>
-    <ds:schemaRef ds:uri="http://schemas.microsoft.com/office/2006/documentManagement/types"/>
-    <ds:schemaRef ds:uri="http://purl.org/dc/elements/1.1/"/>
-    <ds:schemaRef ds:uri="http://schemas.microsoft.com/office/2006/metadata/properties"/>
-    <ds:schemaRef ds:uri="http://schemas.microsoft.com/office/infopath/2007/PartnerControls"/>
-    <ds:schemaRef ds:uri="http://purl.org/dc/terms/"/>
-    <ds:schemaRef ds:uri="http://schemas.openxmlformats.org/package/2006/metadata/core-properties"/>
-    <ds:schemaRef ds:uri="http://www.w3.org/XML/1998/namespace"/>
-    <ds:schemaRef ds:uri="http://purl.org/dc/dcmitype/"/>
-  </ds:schemaRefs>
-</ds:datastoreItem>
+<file path=customXml/item3.xml><?xml version="1.0" encoding="utf-8"?>
+<?mso-contentType ?>
+<FormTemplates xmlns="http://schemas.microsoft.com/sharepoint/v3/contenttype/forms">
+  <Display>DocumentLibraryForm</Display>
+  <Edit>DocumentLibraryForm</Edit>
+  <New>DocumentLibraryForm</New>
+</FormTemplates>
 </file>
 
-<file path=customXml/itemProps3.xml><?xml version="1.0" encoding="utf-8"?>
+<file path=customXml/itemProps1.xml><?xml version="1.0" encoding="utf-8"?>
 <ds:datastoreItem xmlns:ds="http://schemas.openxmlformats.org/officeDocument/2006/customXml" ds:itemID="{A906A71E-D2C6-4CAA-8E79-10C504BC5F58}">
   <ds:schemaRefs>
     <ds:schemaRef ds:uri="http://schemas.microsoft.com/office/2006/metadata/contentType"/>
@@ -7927,4 +9564,27 @@
     <ds:schemaRef ds:uri="http://schemas.microsoft.com/office/infopath/2007/PartnerControls"/>
   </ds:schemaRefs>
 </ds:datastoreItem>
+</file>
+
+<file path=customXml/itemProps2.xml><?xml version="1.0" encoding="utf-8"?>
+<ds:datastoreItem xmlns:ds="http://schemas.openxmlformats.org/officeDocument/2006/customXml" ds:itemID="{3473EA1A-2744-48E8-B2A3-4F89C0FC849C}">
+  <ds:schemaRefs>
+    <ds:schemaRef ds:uri="http://purl.org/dc/terms/"/>
+    <ds:schemaRef ds:uri="http://schemas.openxmlformats.org/package/2006/metadata/core-properties"/>
+    <ds:schemaRef ds:uri="http://purl.org/dc/dcmitype/"/>
+    <ds:schemaRef ds:uri="http://schemas.microsoft.com/office/infopath/2007/PartnerControls"/>
+    <ds:schemaRef ds:uri="http://schemas.microsoft.com/office/2006/documentManagement/types"/>
+    <ds:schemaRef ds:uri="http://schemas.microsoft.com/office/2006/metadata/properties"/>
+    <ds:schemaRef ds:uri="http://www.w3.org/XML/1998/namespace"/>
+    <ds:schemaRef ds:uri="http://purl.org/dc/elements/1.1/"/>
+  </ds:schemaRefs>
+</ds:datastoreItem>
+</file>
+
+<file path=customXml/itemProps3.xml><?xml version="1.0" encoding="utf-8"?>
+<ds:datastoreItem xmlns:ds="http://schemas.openxmlformats.org/officeDocument/2006/customXml" ds:itemID="{87FD8B20-B89A-4B23-9329-175195DD4D8A}">
+  <ds:schemaRefs>
+    <ds:schemaRef ds:uri="http://schemas.microsoft.com/sharepoint/v3/contenttype/forms"/>
+  </ds:schemaRefs>
+</ds:datastoreItem>
 </file>
</xml_diff>

<commit_message>
Update documents and add lecture html file.
</commit_message>
<xml_diff>
--- a/CPSC-24500/Week04/2017SpringW04Slides.pptx
+++ b/CPSC-24500/Week04/2017SpringW04Slides.pptx
@@ -5,7 +5,7 @@
     <p:sldMasterId id="2147483648" r:id="rId4"/>
   </p:sldMasterIdLst>
   <p:notesMasterIdLst>
-    <p:notesMasterId r:id="rId29"/>
+    <p:notesMasterId r:id="rId42"/>
   </p:notesMasterIdLst>
   <p:sldIdLst>
     <p:sldId id="381" r:id="rId5"/>
@@ -32,6 +32,19 @@
     <p:sldId id="430" r:id="rId26"/>
     <p:sldId id="431" r:id="rId27"/>
     <p:sldId id="432" r:id="rId28"/>
+    <p:sldId id="433" r:id="rId29"/>
+    <p:sldId id="434" r:id="rId30"/>
+    <p:sldId id="435" r:id="rId31"/>
+    <p:sldId id="436" r:id="rId32"/>
+    <p:sldId id="437" r:id="rId33"/>
+    <p:sldId id="438" r:id="rId34"/>
+    <p:sldId id="439" r:id="rId35"/>
+    <p:sldId id="441" r:id="rId36"/>
+    <p:sldId id="447" r:id="rId37"/>
+    <p:sldId id="442" r:id="rId38"/>
+    <p:sldId id="443" r:id="rId39"/>
+    <p:sldId id="446" r:id="rId40"/>
+    <p:sldId id="444" r:id="rId41"/>
   </p:sldIdLst>
   <p:sldSz cx="12192000" cy="6858000"/>
   <p:notesSz cx="7315200" cy="9601200"/>
@@ -223,7 +236,7 @@
           <a:p>
             <a:fld id="{91ED72D7-FE6F-4B82-8D31-76BC00B06094}" type="datetimeFigureOut">
               <a:rPr lang="en-US" smtClean="0"/>
-              <a:t>4/7/2017</a:t>
+              <a:t>4/11/2017</a:t>
             </a:fld>
             <a:endParaRPr lang="en-US" dirty="0"/>
           </a:p>
@@ -1972,6 +1985,1032 @@
 </p:notes>
 </file>
 
+<file path=ppt/notesSlides/notesSlide25.xml><?xml version="1.0" encoding="utf-8"?>
+<p:notes xmlns:a="http://schemas.openxmlformats.org/drawingml/2006/main" xmlns:r="http://schemas.openxmlformats.org/officeDocument/2006/relationships" xmlns:p="http://schemas.openxmlformats.org/presentationml/2006/main">
+  <p:cSld>
+    <p:spTree>
+      <p:nvGrpSpPr>
+        <p:cNvPr id="1" name=""/>
+        <p:cNvGrpSpPr/>
+        <p:nvPr/>
+      </p:nvGrpSpPr>
+      <p:grpSpPr>
+        <a:xfrm>
+          <a:off x="0" y="0"/>
+          <a:ext cx="0" cy="0"/>
+          <a:chOff x="0" y="0"/>
+          <a:chExt cx="0" cy="0"/>
+        </a:xfrm>
+      </p:grpSpPr>
+      <p:sp>
+        <p:nvSpPr>
+          <p:cNvPr id="2" name="Slide Image Placeholder 1"/>
+          <p:cNvSpPr>
+            <a:spLocks noGrp="1" noRot="1" noChangeAspect="1"/>
+          </p:cNvSpPr>
+          <p:nvPr>
+            <p:ph type="sldImg"/>
+          </p:nvPr>
+        </p:nvSpPr>
+        <p:spPr/>
+      </p:sp>
+      <p:sp>
+        <p:nvSpPr>
+          <p:cNvPr id="3" name="Notes Placeholder 2"/>
+          <p:cNvSpPr>
+            <a:spLocks noGrp="1"/>
+          </p:cNvSpPr>
+          <p:nvPr>
+            <p:ph type="body" idx="1"/>
+          </p:nvPr>
+        </p:nvSpPr>
+        <p:spPr/>
+        <p:txBody>
+          <a:bodyPr/>
+          <a:lstStyle/>
+          <a:p>
+            <a:r>
+              <a:rPr lang="en-US" sz="1000" dirty="0"/>
+              <a:t> Start Recording!</a:t>
+            </a:r>
+          </a:p>
+        </p:txBody>
+      </p:sp>
+      <p:sp>
+        <p:nvSpPr>
+          <p:cNvPr id="4" name="Slide Number Placeholder 3"/>
+          <p:cNvSpPr>
+            <a:spLocks noGrp="1"/>
+          </p:cNvSpPr>
+          <p:nvPr>
+            <p:ph type="sldNum" sz="quarter" idx="10"/>
+          </p:nvPr>
+        </p:nvSpPr>
+        <p:spPr/>
+        <p:txBody>
+          <a:bodyPr/>
+          <a:lstStyle/>
+          <a:p>
+            <a:fld id="{5394DE12-7B9B-46AA-AC19-C30A49928B9B}" type="slidenum">
+              <a:rPr lang="en-US" smtClean="0"/>
+              <a:t>25</a:t>
+            </a:fld>
+            <a:endParaRPr lang="en-US" dirty="0"/>
+          </a:p>
+        </p:txBody>
+      </p:sp>
+    </p:spTree>
+    <p:extLst>
+      <p:ext uri="{BB962C8B-B14F-4D97-AF65-F5344CB8AC3E}">
+        <p14:creationId xmlns:p14="http://schemas.microsoft.com/office/powerpoint/2010/main" val="2868501579"/>
+      </p:ext>
+    </p:extLst>
+  </p:cSld>
+  <p:clrMapOvr>
+    <a:masterClrMapping/>
+  </p:clrMapOvr>
+</p:notes>
+</file>
+
+<file path=ppt/notesSlides/notesSlide26.xml><?xml version="1.0" encoding="utf-8"?>
+<p:notes xmlns:a="http://schemas.openxmlformats.org/drawingml/2006/main" xmlns:r="http://schemas.openxmlformats.org/officeDocument/2006/relationships" xmlns:p="http://schemas.openxmlformats.org/presentationml/2006/main">
+  <p:cSld>
+    <p:spTree>
+      <p:nvGrpSpPr>
+        <p:cNvPr id="1" name=""/>
+        <p:cNvGrpSpPr/>
+        <p:nvPr/>
+      </p:nvGrpSpPr>
+      <p:grpSpPr>
+        <a:xfrm>
+          <a:off x="0" y="0"/>
+          <a:ext cx="0" cy="0"/>
+          <a:chOff x="0" y="0"/>
+          <a:chExt cx="0" cy="0"/>
+        </a:xfrm>
+      </p:grpSpPr>
+      <p:sp>
+        <p:nvSpPr>
+          <p:cNvPr id="2" name="Slide Image Placeholder 1"/>
+          <p:cNvSpPr>
+            <a:spLocks noGrp="1" noRot="1" noChangeAspect="1"/>
+          </p:cNvSpPr>
+          <p:nvPr>
+            <p:ph type="sldImg"/>
+          </p:nvPr>
+        </p:nvSpPr>
+        <p:spPr/>
+      </p:sp>
+      <p:sp>
+        <p:nvSpPr>
+          <p:cNvPr id="3" name="Notes Placeholder 2"/>
+          <p:cNvSpPr>
+            <a:spLocks noGrp="1"/>
+          </p:cNvSpPr>
+          <p:nvPr>
+            <p:ph type="body" idx="1"/>
+          </p:nvPr>
+        </p:nvSpPr>
+        <p:spPr/>
+        <p:txBody>
+          <a:bodyPr/>
+          <a:lstStyle/>
+          <a:p>
+            <a:r>
+              <a:rPr lang="en-US" sz="1000" dirty="0"/>
+              <a:t>Any of these items would be a good candidate for your “interesting and unique” feature to add to your Mosaic assignment. </a:t>
+            </a:r>
+          </a:p>
+        </p:txBody>
+      </p:sp>
+      <p:sp>
+        <p:nvSpPr>
+          <p:cNvPr id="4" name="Slide Number Placeholder 3"/>
+          <p:cNvSpPr>
+            <a:spLocks noGrp="1"/>
+          </p:cNvSpPr>
+          <p:nvPr>
+            <p:ph type="sldNum" sz="quarter" idx="10"/>
+          </p:nvPr>
+        </p:nvSpPr>
+        <p:spPr/>
+        <p:txBody>
+          <a:bodyPr/>
+          <a:lstStyle/>
+          <a:p>
+            <a:fld id="{5394DE12-7B9B-46AA-AC19-C30A49928B9B}" type="slidenum">
+              <a:rPr lang="en-US" smtClean="0"/>
+              <a:t>26</a:t>
+            </a:fld>
+            <a:endParaRPr lang="en-US" dirty="0"/>
+          </a:p>
+        </p:txBody>
+      </p:sp>
+    </p:spTree>
+    <p:extLst>
+      <p:ext uri="{BB962C8B-B14F-4D97-AF65-F5344CB8AC3E}">
+        <p14:creationId xmlns:p14="http://schemas.microsoft.com/office/powerpoint/2010/main" val="1886048523"/>
+      </p:ext>
+    </p:extLst>
+  </p:cSld>
+  <p:clrMapOvr>
+    <a:masterClrMapping/>
+  </p:clrMapOvr>
+</p:notes>
+</file>
+
+<file path=ppt/notesSlides/notesSlide27.xml><?xml version="1.0" encoding="utf-8"?>
+<p:notes xmlns:a="http://schemas.openxmlformats.org/drawingml/2006/main" xmlns:r="http://schemas.openxmlformats.org/officeDocument/2006/relationships" xmlns:p="http://schemas.openxmlformats.org/presentationml/2006/main">
+  <p:cSld>
+    <p:spTree>
+      <p:nvGrpSpPr>
+        <p:cNvPr id="1" name=""/>
+        <p:cNvGrpSpPr/>
+        <p:nvPr/>
+      </p:nvGrpSpPr>
+      <p:grpSpPr>
+        <a:xfrm>
+          <a:off x="0" y="0"/>
+          <a:ext cx="0" cy="0"/>
+          <a:chOff x="0" y="0"/>
+          <a:chExt cx="0" cy="0"/>
+        </a:xfrm>
+      </p:grpSpPr>
+      <p:sp>
+        <p:nvSpPr>
+          <p:cNvPr id="2" name="Slide Image Placeholder 1"/>
+          <p:cNvSpPr>
+            <a:spLocks noGrp="1" noRot="1" noChangeAspect="1"/>
+          </p:cNvSpPr>
+          <p:nvPr>
+            <p:ph type="sldImg"/>
+          </p:nvPr>
+        </p:nvSpPr>
+        <p:spPr/>
+      </p:sp>
+      <p:sp>
+        <p:nvSpPr>
+          <p:cNvPr id="3" name="Notes Placeholder 2"/>
+          <p:cNvSpPr>
+            <a:spLocks noGrp="1"/>
+          </p:cNvSpPr>
+          <p:nvPr>
+            <p:ph type="body" idx="1"/>
+          </p:nvPr>
+        </p:nvSpPr>
+        <p:spPr/>
+        <p:txBody>
+          <a:bodyPr/>
+          <a:lstStyle/>
+          <a:p>
+            <a:endParaRPr lang="en-US" sz="1000" dirty="0"/>
+          </a:p>
+        </p:txBody>
+      </p:sp>
+      <p:sp>
+        <p:nvSpPr>
+          <p:cNvPr id="4" name="Slide Number Placeholder 3"/>
+          <p:cNvSpPr>
+            <a:spLocks noGrp="1"/>
+          </p:cNvSpPr>
+          <p:nvPr>
+            <p:ph type="sldNum" sz="quarter" idx="10"/>
+          </p:nvPr>
+        </p:nvSpPr>
+        <p:spPr/>
+        <p:txBody>
+          <a:bodyPr/>
+          <a:lstStyle/>
+          <a:p>
+            <a:fld id="{5394DE12-7B9B-46AA-AC19-C30A49928B9B}" type="slidenum">
+              <a:rPr lang="en-US" smtClean="0"/>
+              <a:t>27</a:t>
+            </a:fld>
+            <a:endParaRPr lang="en-US" dirty="0"/>
+          </a:p>
+        </p:txBody>
+      </p:sp>
+    </p:spTree>
+    <p:extLst>
+      <p:ext uri="{BB962C8B-B14F-4D97-AF65-F5344CB8AC3E}">
+        <p14:creationId xmlns:p14="http://schemas.microsoft.com/office/powerpoint/2010/main" val="789987424"/>
+      </p:ext>
+    </p:extLst>
+  </p:cSld>
+  <p:clrMapOvr>
+    <a:masterClrMapping/>
+  </p:clrMapOvr>
+</p:notes>
+</file>
+
+<file path=ppt/notesSlides/notesSlide28.xml><?xml version="1.0" encoding="utf-8"?>
+<p:notes xmlns:a="http://schemas.openxmlformats.org/drawingml/2006/main" xmlns:r="http://schemas.openxmlformats.org/officeDocument/2006/relationships" xmlns:p="http://schemas.openxmlformats.org/presentationml/2006/main">
+  <p:cSld>
+    <p:spTree>
+      <p:nvGrpSpPr>
+        <p:cNvPr id="1" name=""/>
+        <p:cNvGrpSpPr/>
+        <p:nvPr/>
+      </p:nvGrpSpPr>
+      <p:grpSpPr>
+        <a:xfrm>
+          <a:off x="0" y="0"/>
+          <a:ext cx="0" cy="0"/>
+          <a:chOff x="0" y="0"/>
+          <a:chExt cx="0" cy="0"/>
+        </a:xfrm>
+      </p:grpSpPr>
+      <p:sp>
+        <p:nvSpPr>
+          <p:cNvPr id="2" name="Slide Image Placeholder 1"/>
+          <p:cNvSpPr>
+            <a:spLocks noGrp="1" noRot="1" noChangeAspect="1"/>
+          </p:cNvSpPr>
+          <p:nvPr>
+            <p:ph type="sldImg"/>
+          </p:nvPr>
+        </p:nvSpPr>
+        <p:spPr/>
+      </p:sp>
+      <p:sp>
+        <p:nvSpPr>
+          <p:cNvPr id="3" name="Notes Placeholder 2"/>
+          <p:cNvSpPr>
+            <a:spLocks noGrp="1"/>
+          </p:cNvSpPr>
+          <p:nvPr>
+            <p:ph type="body" idx="1"/>
+          </p:nvPr>
+        </p:nvSpPr>
+        <p:spPr/>
+        <p:txBody>
+          <a:bodyPr/>
+          <a:lstStyle/>
+          <a:p>
+            <a:endParaRPr lang="en-US" sz="1000" dirty="0"/>
+          </a:p>
+        </p:txBody>
+      </p:sp>
+      <p:sp>
+        <p:nvSpPr>
+          <p:cNvPr id="4" name="Slide Number Placeholder 3"/>
+          <p:cNvSpPr>
+            <a:spLocks noGrp="1"/>
+          </p:cNvSpPr>
+          <p:nvPr>
+            <p:ph type="sldNum" sz="quarter" idx="10"/>
+          </p:nvPr>
+        </p:nvSpPr>
+        <p:spPr/>
+        <p:txBody>
+          <a:bodyPr/>
+          <a:lstStyle/>
+          <a:p>
+            <a:fld id="{5394DE12-7B9B-46AA-AC19-C30A49928B9B}" type="slidenum">
+              <a:rPr lang="en-US" smtClean="0"/>
+              <a:t>28</a:t>
+            </a:fld>
+            <a:endParaRPr lang="en-US" dirty="0"/>
+          </a:p>
+        </p:txBody>
+      </p:sp>
+    </p:spTree>
+    <p:extLst>
+      <p:ext uri="{BB962C8B-B14F-4D97-AF65-F5344CB8AC3E}">
+        <p14:creationId xmlns:p14="http://schemas.microsoft.com/office/powerpoint/2010/main" val="2343279292"/>
+      </p:ext>
+    </p:extLst>
+  </p:cSld>
+  <p:clrMapOvr>
+    <a:masterClrMapping/>
+  </p:clrMapOvr>
+</p:notes>
+</file>
+
+<file path=ppt/notesSlides/notesSlide29.xml><?xml version="1.0" encoding="utf-8"?>
+<p:notes xmlns:a="http://schemas.openxmlformats.org/drawingml/2006/main" xmlns:r="http://schemas.openxmlformats.org/officeDocument/2006/relationships" xmlns:p="http://schemas.openxmlformats.org/presentationml/2006/main">
+  <p:cSld>
+    <p:spTree>
+      <p:nvGrpSpPr>
+        <p:cNvPr id="1" name=""/>
+        <p:cNvGrpSpPr/>
+        <p:nvPr/>
+      </p:nvGrpSpPr>
+      <p:grpSpPr>
+        <a:xfrm>
+          <a:off x="0" y="0"/>
+          <a:ext cx="0" cy="0"/>
+          <a:chOff x="0" y="0"/>
+          <a:chExt cx="0" cy="0"/>
+        </a:xfrm>
+      </p:grpSpPr>
+      <p:sp>
+        <p:nvSpPr>
+          <p:cNvPr id="2" name="Slide Image Placeholder 1"/>
+          <p:cNvSpPr>
+            <a:spLocks noGrp="1" noRot="1" noChangeAspect="1"/>
+          </p:cNvSpPr>
+          <p:nvPr>
+            <p:ph type="sldImg"/>
+          </p:nvPr>
+        </p:nvSpPr>
+        <p:spPr/>
+      </p:sp>
+      <p:sp>
+        <p:nvSpPr>
+          <p:cNvPr id="3" name="Notes Placeholder 2"/>
+          <p:cNvSpPr>
+            <a:spLocks noGrp="1"/>
+          </p:cNvSpPr>
+          <p:nvPr>
+            <p:ph type="body" idx="1"/>
+          </p:nvPr>
+        </p:nvSpPr>
+        <p:spPr/>
+        <p:txBody>
+          <a:bodyPr/>
+          <a:lstStyle/>
+          <a:p>
+            <a:r>
+              <a:rPr lang="en-US" sz="1000" dirty="0"/>
+              <a:t>Adapter Classes are an alternative to implementing all five methods. For our examples, I will be implementing all five, even if some of them seem unnecessary. You ware welcome to use Adapters in your assignments if you prefer. </a:t>
+            </a:r>
+          </a:p>
+          <a:p>
+            <a:endParaRPr lang="en-US" sz="1000" dirty="0"/>
+          </a:p>
+          <a:p>
+            <a:r>
+              <a:rPr lang="en-US" sz="1000" dirty="0"/>
+              <a:t>The </a:t>
+            </a:r>
+            <a:r>
+              <a:rPr lang="en-US" sz="1000" dirty="0" err="1"/>
+              <a:t>mouseClicked</a:t>
+            </a:r>
+            <a:r>
+              <a:rPr lang="en-US" sz="1000" dirty="0"/>
+              <a:t> method is the most often overridden. The </a:t>
+            </a:r>
+            <a:r>
+              <a:rPr lang="en-US" sz="1000" dirty="0" err="1"/>
+              <a:t>mousePressed</a:t>
+            </a:r>
+            <a:r>
+              <a:rPr lang="en-US" sz="1000" dirty="0"/>
+              <a:t> and </a:t>
+            </a:r>
+            <a:r>
+              <a:rPr lang="en-US" sz="1000" dirty="0" err="1"/>
+              <a:t>mouseReleased</a:t>
+            </a:r>
+            <a:r>
+              <a:rPr lang="en-US" sz="1000" dirty="0"/>
+              <a:t> are most often used with dragging. </a:t>
+            </a:r>
+          </a:p>
+          <a:p>
+            <a:endParaRPr lang="en-US" sz="1000" dirty="0"/>
+          </a:p>
+          <a:p>
+            <a:r>
+              <a:rPr lang="en-US" sz="1000" b="0" kern="1200" dirty="0">
+                <a:solidFill>
+                  <a:schemeClr val="tx1"/>
+                </a:solidFill>
+                <a:effectLst/>
+                <a:latin typeface="+mn-lt"/>
+                <a:ea typeface="+mn-ea"/>
+                <a:cs typeface="+mn-cs"/>
+              </a:rPr>
+              <a:t>import </a:t>
+            </a:r>
+            <a:r>
+              <a:rPr lang="en-US" sz="1000" b="0" kern="1200" dirty="0" err="1">
+                <a:solidFill>
+                  <a:schemeClr val="tx1"/>
+                </a:solidFill>
+                <a:effectLst/>
+                <a:latin typeface="+mn-lt"/>
+                <a:ea typeface="+mn-ea"/>
+                <a:cs typeface="+mn-cs"/>
+              </a:rPr>
+              <a:t>java.awt.event.MouseListener</a:t>
+            </a:r>
+            <a:r>
+              <a:rPr lang="en-US" sz="1000" b="0" kern="1200" dirty="0">
+                <a:solidFill>
+                  <a:schemeClr val="tx1"/>
+                </a:solidFill>
+                <a:effectLst/>
+                <a:latin typeface="+mn-lt"/>
+                <a:ea typeface="+mn-ea"/>
+                <a:cs typeface="+mn-cs"/>
+              </a:rPr>
+              <a:t>;</a:t>
+            </a:r>
+          </a:p>
+          <a:p>
+            <a:r>
+              <a:rPr lang="en-US" sz="1000" b="0" kern="1200" dirty="0">
+                <a:solidFill>
+                  <a:schemeClr val="tx1"/>
+                </a:solidFill>
+                <a:effectLst/>
+                <a:latin typeface="+mn-lt"/>
+                <a:ea typeface="+mn-ea"/>
+                <a:cs typeface="+mn-cs"/>
+              </a:rPr>
+              <a:t>import </a:t>
+            </a:r>
+            <a:r>
+              <a:rPr lang="en-US" sz="1000" b="0" kern="1200" dirty="0" err="1">
+                <a:solidFill>
+                  <a:schemeClr val="tx1"/>
+                </a:solidFill>
+                <a:effectLst/>
+                <a:latin typeface="+mn-lt"/>
+                <a:ea typeface="+mn-ea"/>
+                <a:cs typeface="+mn-cs"/>
+              </a:rPr>
+              <a:t>java.awt.event.MouseEvent</a:t>
+            </a:r>
+            <a:r>
+              <a:rPr lang="en-US" sz="1000" b="0" kern="1200" dirty="0">
+                <a:solidFill>
+                  <a:schemeClr val="tx1"/>
+                </a:solidFill>
+                <a:effectLst/>
+                <a:latin typeface="+mn-lt"/>
+                <a:ea typeface="+mn-ea"/>
+                <a:cs typeface="+mn-cs"/>
+              </a:rPr>
+              <a:t>;</a:t>
+            </a:r>
+          </a:p>
+          <a:p>
+            <a:endParaRPr lang="en-US" sz="1000" b="0" kern="1200" dirty="0">
+              <a:solidFill>
+                <a:schemeClr val="tx1"/>
+              </a:solidFill>
+              <a:effectLst/>
+              <a:latin typeface="+mn-lt"/>
+              <a:ea typeface="+mn-ea"/>
+              <a:cs typeface="+mn-cs"/>
+            </a:endParaRPr>
+          </a:p>
+          <a:p>
+            <a:r>
+              <a:rPr lang="en-US" sz="1000" b="0" kern="1200" dirty="0">
+                <a:solidFill>
+                  <a:schemeClr val="tx1"/>
+                </a:solidFill>
+                <a:effectLst/>
+                <a:latin typeface="+mn-lt"/>
+                <a:ea typeface="+mn-ea"/>
+                <a:cs typeface="+mn-cs"/>
+              </a:rPr>
+              <a:t>public void </a:t>
+            </a:r>
+            <a:r>
+              <a:rPr lang="en-US" sz="1000" b="0" kern="1200" dirty="0" err="1">
+                <a:solidFill>
+                  <a:schemeClr val="tx1"/>
+                </a:solidFill>
+                <a:effectLst/>
+                <a:latin typeface="+mn-lt"/>
+                <a:ea typeface="+mn-ea"/>
+                <a:cs typeface="+mn-cs"/>
+              </a:rPr>
+              <a:t>mousePressed</a:t>
+            </a:r>
+            <a:r>
+              <a:rPr lang="en-US" sz="1000" b="0" kern="1200" dirty="0">
+                <a:solidFill>
+                  <a:schemeClr val="tx1"/>
+                </a:solidFill>
+                <a:effectLst/>
+                <a:latin typeface="+mn-lt"/>
+                <a:ea typeface="+mn-ea"/>
+                <a:cs typeface="+mn-cs"/>
+              </a:rPr>
+              <a:t>(</a:t>
+            </a:r>
+            <a:r>
+              <a:rPr lang="en-US" sz="1000" b="0" kern="1200" dirty="0" err="1">
+                <a:solidFill>
+                  <a:schemeClr val="tx1"/>
+                </a:solidFill>
+                <a:effectLst/>
+                <a:latin typeface="+mn-lt"/>
+                <a:ea typeface="+mn-ea"/>
+                <a:cs typeface="+mn-cs"/>
+              </a:rPr>
+              <a:t>MouseEvent</a:t>
+            </a:r>
+            <a:r>
+              <a:rPr lang="en-US" sz="1000" b="0" kern="1200" dirty="0">
+                <a:solidFill>
+                  <a:schemeClr val="tx1"/>
+                </a:solidFill>
+                <a:effectLst/>
+                <a:latin typeface="+mn-lt"/>
+                <a:ea typeface="+mn-ea"/>
+                <a:cs typeface="+mn-cs"/>
+              </a:rPr>
+              <a:t> e) {}</a:t>
+            </a:r>
+          </a:p>
+          <a:p>
+            <a:r>
+              <a:rPr lang="en-US" sz="1000" b="0" kern="1200" dirty="0">
+                <a:solidFill>
+                  <a:schemeClr val="tx1"/>
+                </a:solidFill>
+                <a:effectLst/>
+                <a:latin typeface="+mn-lt"/>
+                <a:ea typeface="+mn-ea"/>
+                <a:cs typeface="+mn-cs"/>
+              </a:rPr>
+              <a:t>public void </a:t>
+            </a:r>
+            <a:r>
+              <a:rPr lang="en-US" sz="1000" b="0" kern="1200" dirty="0" err="1">
+                <a:solidFill>
+                  <a:schemeClr val="tx1"/>
+                </a:solidFill>
+                <a:effectLst/>
+                <a:latin typeface="+mn-lt"/>
+                <a:ea typeface="+mn-ea"/>
+                <a:cs typeface="+mn-cs"/>
+              </a:rPr>
+              <a:t>mouseReleased</a:t>
+            </a:r>
+            <a:r>
+              <a:rPr lang="en-US" sz="1000" b="0" kern="1200" dirty="0">
+                <a:solidFill>
+                  <a:schemeClr val="tx1"/>
+                </a:solidFill>
+                <a:effectLst/>
+                <a:latin typeface="+mn-lt"/>
+                <a:ea typeface="+mn-ea"/>
+                <a:cs typeface="+mn-cs"/>
+              </a:rPr>
+              <a:t>(</a:t>
+            </a:r>
+            <a:r>
+              <a:rPr lang="en-US" sz="1000" b="0" kern="1200" dirty="0" err="1">
+                <a:solidFill>
+                  <a:schemeClr val="tx1"/>
+                </a:solidFill>
+                <a:effectLst/>
+                <a:latin typeface="+mn-lt"/>
+                <a:ea typeface="+mn-ea"/>
+                <a:cs typeface="+mn-cs"/>
+              </a:rPr>
+              <a:t>MouseEvent</a:t>
+            </a:r>
+            <a:r>
+              <a:rPr lang="en-US" sz="1000" b="0" kern="1200" dirty="0">
+                <a:solidFill>
+                  <a:schemeClr val="tx1"/>
+                </a:solidFill>
+                <a:effectLst/>
+                <a:latin typeface="+mn-lt"/>
+                <a:ea typeface="+mn-ea"/>
+                <a:cs typeface="+mn-cs"/>
+              </a:rPr>
+              <a:t> e) {}</a:t>
+            </a:r>
+          </a:p>
+          <a:p>
+            <a:r>
+              <a:rPr lang="en-US" sz="1000" b="0" kern="1200" dirty="0">
+                <a:solidFill>
+                  <a:schemeClr val="tx1"/>
+                </a:solidFill>
+                <a:effectLst/>
+                <a:latin typeface="+mn-lt"/>
+                <a:ea typeface="+mn-ea"/>
+                <a:cs typeface="+mn-cs"/>
+              </a:rPr>
+              <a:t>public void </a:t>
+            </a:r>
+            <a:r>
+              <a:rPr lang="en-US" sz="1000" b="0" kern="1200" dirty="0" err="1">
+                <a:solidFill>
+                  <a:schemeClr val="tx1"/>
+                </a:solidFill>
+                <a:effectLst/>
+                <a:latin typeface="+mn-lt"/>
+                <a:ea typeface="+mn-ea"/>
+                <a:cs typeface="+mn-cs"/>
+              </a:rPr>
+              <a:t>mouseEntered</a:t>
+            </a:r>
+            <a:r>
+              <a:rPr lang="en-US" sz="1000" b="0" kern="1200" dirty="0">
+                <a:solidFill>
+                  <a:schemeClr val="tx1"/>
+                </a:solidFill>
+                <a:effectLst/>
+                <a:latin typeface="+mn-lt"/>
+                <a:ea typeface="+mn-ea"/>
+                <a:cs typeface="+mn-cs"/>
+              </a:rPr>
+              <a:t>(</a:t>
+            </a:r>
+            <a:r>
+              <a:rPr lang="en-US" sz="1000" b="0" kern="1200" dirty="0" err="1">
+                <a:solidFill>
+                  <a:schemeClr val="tx1"/>
+                </a:solidFill>
+                <a:effectLst/>
+                <a:latin typeface="+mn-lt"/>
+                <a:ea typeface="+mn-ea"/>
+                <a:cs typeface="+mn-cs"/>
+              </a:rPr>
+              <a:t>MouseEvent</a:t>
+            </a:r>
+            <a:r>
+              <a:rPr lang="en-US" sz="1000" b="0" kern="1200" dirty="0">
+                <a:solidFill>
+                  <a:schemeClr val="tx1"/>
+                </a:solidFill>
+                <a:effectLst/>
+                <a:latin typeface="+mn-lt"/>
+                <a:ea typeface="+mn-ea"/>
+                <a:cs typeface="+mn-cs"/>
+              </a:rPr>
+              <a:t> e) {}</a:t>
+            </a:r>
+          </a:p>
+          <a:p>
+            <a:r>
+              <a:rPr lang="en-US" sz="1000" b="0" kern="1200" dirty="0">
+                <a:solidFill>
+                  <a:schemeClr val="tx1"/>
+                </a:solidFill>
+                <a:effectLst/>
+                <a:latin typeface="+mn-lt"/>
+                <a:ea typeface="+mn-ea"/>
+                <a:cs typeface="+mn-cs"/>
+              </a:rPr>
+              <a:t>public void </a:t>
+            </a:r>
+            <a:r>
+              <a:rPr lang="en-US" sz="1000" b="0" kern="1200" dirty="0" err="1">
+                <a:solidFill>
+                  <a:schemeClr val="tx1"/>
+                </a:solidFill>
+                <a:effectLst/>
+                <a:latin typeface="+mn-lt"/>
+                <a:ea typeface="+mn-ea"/>
+                <a:cs typeface="+mn-cs"/>
+              </a:rPr>
+              <a:t>mouseExited</a:t>
+            </a:r>
+            <a:r>
+              <a:rPr lang="en-US" sz="1000" b="0" kern="1200" dirty="0">
+                <a:solidFill>
+                  <a:schemeClr val="tx1"/>
+                </a:solidFill>
+                <a:effectLst/>
+                <a:latin typeface="+mn-lt"/>
+                <a:ea typeface="+mn-ea"/>
+                <a:cs typeface="+mn-cs"/>
+              </a:rPr>
+              <a:t>(</a:t>
+            </a:r>
+            <a:r>
+              <a:rPr lang="en-US" sz="1000" b="0" kern="1200" dirty="0" err="1">
+                <a:solidFill>
+                  <a:schemeClr val="tx1"/>
+                </a:solidFill>
+                <a:effectLst/>
+                <a:latin typeface="+mn-lt"/>
+                <a:ea typeface="+mn-ea"/>
+                <a:cs typeface="+mn-cs"/>
+              </a:rPr>
+              <a:t>MouseEvent</a:t>
+            </a:r>
+            <a:r>
+              <a:rPr lang="en-US" sz="1000" b="0" kern="1200" dirty="0">
+                <a:solidFill>
+                  <a:schemeClr val="tx1"/>
+                </a:solidFill>
+                <a:effectLst/>
+                <a:latin typeface="+mn-lt"/>
+                <a:ea typeface="+mn-ea"/>
+                <a:cs typeface="+mn-cs"/>
+              </a:rPr>
+              <a:t> e) {}</a:t>
+            </a:r>
+          </a:p>
+          <a:p>
+            <a:r>
+              <a:rPr lang="en-US" sz="1000" b="0" kern="1200" dirty="0">
+                <a:solidFill>
+                  <a:schemeClr val="tx1"/>
+                </a:solidFill>
+                <a:effectLst/>
+                <a:latin typeface="+mn-lt"/>
+                <a:ea typeface="+mn-ea"/>
+                <a:cs typeface="+mn-cs"/>
+              </a:rPr>
+              <a:t>public void </a:t>
+            </a:r>
+            <a:r>
+              <a:rPr lang="en-US" sz="1000" b="0" kern="1200" dirty="0" err="1">
+                <a:solidFill>
+                  <a:schemeClr val="tx1"/>
+                </a:solidFill>
+                <a:effectLst/>
+                <a:latin typeface="+mn-lt"/>
+                <a:ea typeface="+mn-ea"/>
+                <a:cs typeface="+mn-cs"/>
+              </a:rPr>
+              <a:t>mouseClicked</a:t>
+            </a:r>
+            <a:r>
+              <a:rPr lang="en-US" sz="1000" b="0" kern="1200" dirty="0">
+                <a:solidFill>
+                  <a:schemeClr val="tx1"/>
+                </a:solidFill>
+                <a:effectLst/>
+                <a:latin typeface="+mn-lt"/>
+                <a:ea typeface="+mn-ea"/>
+                <a:cs typeface="+mn-cs"/>
+              </a:rPr>
+              <a:t>(</a:t>
+            </a:r>
+            <a:r>
+              <a:rPr lang="en-US" sz="1000" b="0" kern="1200" dirty="0" err="1">
+                <a:solidFill>
+                  <a:schemeClr val="tx1"/>
+                </a:solidFill>
+                <a:effectLst/>
+                <a:latin typeface="+mn-lt"/>
+                <a:ea typeface="+mn-ea"/>
+                <a:cs typeface="+mn-cs"/>
+              </a:rPr>
+              <a:t>MouseEvent</a:t>
+            </a:r>
+            <a:r>
+              <a:rPr lang="en-US" sz="1000" b="0" kern="1200" dirty="0">
+                <a:solidFill>
+                  <a:schemeClr val="tx1"/>
+                </a:solidFill>
+                <a:effectLst/>
+                <a:latin typeface="+mn-lt"/>
+                <a:ea typeface="+mn-ea"/>
+                <a:cs typeface="+mn-cs"/>
+              </a:rPr>
+              <a:t> e) {}</a:t>
+            </a:r>
+          </a:p>
+          <a:p>
+            <a:endParaRPr lang="en-US" sz="1000" b="0" kern="1200" dirty="0">
+              <a:solidFill>
+                <a:schemeClr val="tx1"/>
+              </a:solidFill>
+              <a:effectLst/>
+              <a:latin typeface="+mn-lt"/>
+              <a:ea typeface="+mn-ea"/>
+              <a:cs typeface="+mn-cs"/>
+            </a:endParaRPr>
+          </a:p>
+          <a:p>
+            <a:r>
+              <a:rPr lang="en-US" sz="1000" dirty="0" err="1"/>
+              <a:t>addMouseListener</a:t>
+            </a:r>
+            <a:r>
+              <a:rPr lang="en-US" sz="1000" dirty="0"/>
+              <a:t>(this);</a:t>
+            </a:r>
+          </a:p>
+          <a:p>
+            <a:endParaRPr lang="en-US" sz="1000" b="0" kern="1200" dirty="0">
+              <a:solidFill>
+                <a:schemeClr val="tx1"/>
+              </a:solidFill>
+              <a:effectLst/>
+              <a:latin typeface="+mn-lt"/>
+              <a:ea typeface="+mn-ea"/>
+              <a:cs typeface="+mn-cs"/>
+            </a:endParaRPr>
+          </a:p>
+          <a:p>
+            <a:r>
+              <a:rPr lang="en-US" sz="1000" b="0" kern="1200" dirty="0" err="1">
+                <a:solidFill>
+                  <a:schemeClr val="tx1"/>
+                </a:solidFill>
+                <a:effectLst/>
+                <a:latin typeface="+mn-lt"/>
+                <a:ea typeface="+mn-ea"/>
+                <a:cs typeface="+mn-cs"/>
+              </a:rPr>
+              <a:t>MouseEvent</a:t>
+            </a:r>
+            <a:r>
+              <a:rPr lang="en-US" sz="1000" b="0" kern="1200" dirty="0">
+                <a:solidFill>
+                  <a:schemeClr val="tx1"/>
+                </a:solidFill>
+                <a:effectLst/>
+                <a:latin typeface="+mn-lt"/>
+                <a:ea typeface="+mn-ea"/>
+                <a:cs typeface="+mn-cs"/>
+              </a:rPr>
+              <a:t>:</a:t>
+            </a:r>
+          </a:p>
+          <a:p>
+            <a:r>
+              <a:rPr lang="en-US" sz="1000" b="0" kern="1200" dirty="0" err="1">
+                <a:solidFill>
+                  <a:schemeClr val="tx1"/>
+                </a:solidFill>
+                <a:effectLst/>
+                <a:latin typeface="+mn-lt"/>
+                <a:ea typeface="+mn-ea"/>
+                <a:cs typeface="+mn-cs"/>
+              </a:rPr>
+              <a:t>int</a:t>
+            </a:r>
+            <a:r>
+              <a:rPr lang="en-US" sz="1000" b="0" kern="1200" dirty="0">
+                <a:solidFill>
+                  <a:schemeClr val="tx1"/>
+                </a:solidFill>
+                <a:effectLst/>
+                <a:latin typeface="+mn-lt"/>
+                <a:ea typeface="+mn-ea"/>
+                <a:cs typeface="+mn-cs"/>
+              </a:rPr>
+              <a:t> </a:t>
+            </a:r>
+            <a:r>
+              <a:rPr lang="en-US" sz="1000" b="0" kern="1200" dirty="0" err="1">
+                <a:solidFill>
+                  <a:schemeClr val="tx1"/>
+                </a:solidFill>
+                <a:effectLst/>
+                <a:latin typeface="+mn-lt"/>
+                <a:ea typeface="+mn-ea"/>
+                <a:cs typeface="+mn-cs"/>
+              </a:rPr>
+              <a:t>getX</a:t>
+            </a:r>
+            <a:r>
+              <a:rPr lang="en-US" sz="1000" b="0" kern="1200" dirty="0">
+                <a:solidFill>
+                  <a:schemeClr val="tx1"/>
+                </a:solidFill>
+                <a:effectLst/>
+                <a:latin typeface="+mn-lt"/>
+                <a:ea typeface="+mn-ea"/>
+                <a:cs typeface="+mn-cs"/>
+              </a:rPr>
+              <a:t>(); </a:t>
+            </a:r>
+          </a:p>
+          <a:p>
+            <a:r>
+              <a:rPr lang="en-US" sz="1000" b="0" kern="1200" dirty="0" err="1">
+                <a:solidFill>
+                  <a:schemeClr val="tx1"/>
+                </a:solidFill>
+                <a:effectLst/>
+                <a:latin typeface="+mn-lt"/>
+                <a:ea typeface="+mn-ea"/>
+                <a:cs typeface="+mn-cs"/>
+              </a:rPr>
+              <a:t>int</a:t>
+            </a:r>
+            <a:r>
+              <a:rPr lang="en-US" sz="1000" b="0" kern="1200" dirty="0">
+                <a:solidFill>
+                  <a:schemeClr val="tx1"/>
+                </a:solidFill>
+                <a:effectLst/>
+                <a:latin typeface="+mn-lt"/>
+                <a:ea typeface="+mn-ea"/>
+                <a:cs typeface="+mn-cs"/>
+              </a:rPr>
+              <a:t> </a:t>
+            </a:r>
+            <a:r>
+              <a:rPr lang="en-US" sz="1000" b="0" kern="1200" dirty="0" err="1">
+                <a:solidFill>
+                  <a:schemeClr val="tx1"/>
+                </a:solidFill>
+                <a:effectLst/>
+                <a:latin typeface="+mn-lt"/>
+                <a:ea typeface="+mn-ea"/>
+                <a:cs typeface="+mn-cs"/>
+              </a:rPr>
+              <a:t>getY</a:t>
+            </a:r>
+            <a:r>
+              <a:rPr lang="en-US" sz="1000" b="0" kern="1200" dirty="0">
+                <a:solidFill>
+                  <a:schemeClr val="tx1"/>
+                </a:solidFill>
+                <a:effectLst/>
+                <a:latin typeface="+mn-lt"/>
+                <a:ea typeface="+mn-ea"/>
+                <a:cs typeface="+mn-cs"/>
+              </a:rPr>
+              <a:t>();</a:t>
+            </a:r>
+          </a:p>
+          <a:p>
+            <a:endParaRPr lang="en-US" sz="1000" dirty="0"/>
+          </a:p>
+          <a:p>
+            <a:endParaRPr lang="en-US" sz="1000" dirty="0"/>
+          </a:p>
+        </p:txBody>
+      </p:sp>
+      <p:sp>
+        <p:nvSpPr>
+          <p:cNvPr id="4" name="Slide Number Placeholder 3"/>
+          <p:cNvSpPr>
+            <a:spLocks noGrp="1"/>
+          </p:cNvSpPr>
+          <p:nvPr>
+            <p:ph type="sldNum" sz="quarter" idx="10"/>
+          </p:nvPr>
+        </p:nvSpPr>
+        <p:spPr/>
+        <p:txBody>
+          <a:bodyPr/>
+          <a:lstStyle/>
+          <a:p>
+            <a:fld id="{5394DE12-7B9B-46AA-AC19-C30A49928B9B}" type="slidenum">
+              <a:rPr lang="en-US" smtClean="0"/>
+              <a:t>29</a:t>
+            </a:fld>
+            <a:endParaRPr lang="en-US" dirty="0"/>
+          </a:p>
+        </p:txBody>
+      </p:sp>
+    </p:spTree>
+    <p:extLst>
+      <p:ext uri="{BB962C8B-B14F-4D97-AF65-F5344CB8AC3E}">
+        <p14:creationId xmlns:p14="http://schemas.microsoft.com/office/powerpoint/2010/main" val="3785397715"/>
+      </p:ext>
+    </p:extLst>
+  </p:cSld>
+  <p:clrMapOvr>
+    <a:masterClrMapping/>
+  </p:clrMapOvr>
+</p:notes>
+</file>
+
 <file path=ppt/notesSlides/notesSlide3.xml><?xml version="1.0" encoding="utf-8"?>
 <p:notes xmlns:a="http://schemas.openxmlformats.org/drawingml/2006/main" xmlns:r="http://schemas.openxmlformats.org/officeDocument/2006/relationships" xmlns:p="http://schemas.openxmlformats.org/presentationml/2006/main">
   <p:cSld>
@@ -2053,6 +3092,1225 @@
     <p:extLst>
       <p:ext uri="{BB962C8B-B14F-4D97-AF65-F5344CB8AC3E}">
         <p14:creationId xmlns:p14="http://schemas.microsoft.com/office/powerpoint/2010/main" val="3019249087"/>
+      </p:ext>
+    </p:extLst>
+  </p:cSld>
+  <p:clrMapOvr>
+    <a:masterClrMapping/>
+  </p:clrMapOvr>
+</p:notes>
+</file>
+
+<file path=ppt/notesSlides/notesSlide30.xml><?xml version="1.0" encoding="utf-8"?>
+<p:notes xmlns:a="http://schemas.openxmlformats.org/drawingml/2006/main" xmlns:r="http://schemas.openxmlformats.org/officeDocument/2006/relationships" xmlns:p="http://schemas.openxmlformats.org/presentationml/2006/main">
+  <p:cSld>
+    <p:spTree>
+      <p:nvGrpSpPr>
+        <p:cNvPr id="1" name=""/>
+        <p:cNvGrpSpPr/>
+        <p:nvPr/>
+      </p:nvGrpSpPr>
+      <p:grpSpPr>
+        <a:xfrm>
+          <a:off x="0" y="0"/>
+          <a:ext cx="0" cy="0"/>
+          <a:chOff x="0" y="0"/>
+          <a:chExt cx="0" cy="0"/>
+        </a:xfrm>
+      </p:grpSpPr>
+      <p:sp>
+        <p:nvSpPr>
+          <p:cNvPr id="2" name="Slide Image Placeholder 1"/>
+          <p:cNvSpPr>
+            <a:spLocks noGrp="1" noRot="1" noChangeAspect="1"/>
+          </p:cNvSpPr>
+          <p:nvPr>
+            <p:ph type="sldImg"/>
+          </p:nvPr>
+        </p:nvSpPr>
+        <p:spPr/>
+      </p:sp>
+      <p:sp>
+        <p:nvSpPr>
+          <p:cNvPr id="3" name="Notes Placeholder 2"/>
+          <p:cNvSpPr>
+            <a:spLocks noGrp="1"/>
+          </p:cNvSpPr>
+          <p:nvPr>
+            <p:ph type="body" idx="1"/>
+          </p:nvPr>
+        </p:nvSpPr>
+        <p:spPr/>
+        <p:txBody>
+          <a:bodyPr/>
+          <a:lstStyle/>
+          <a:p>
+            <a:pPr marL="0" marR="0" lvl="0" indent="0" algn="l" defTabSz="914400" rtl="0" eaLnBrk="1" fontAlgn="auto" latinLnBrk="0" hangingPunct="1">
+              <a:lnSpc>
+                <a:spcPct val="100000"/>
+              </a:lnSpc>
+              <a:spcBef>
+                <a:spcPts val="0"/>
+              </a:spcBef>
+              <a:spcAft>
+                <a:spcPts val="0"/>
+              </a:spcAft>
+              <a:buClrTx/>
+              <a:buSzTx/>
+              <a:buFontTx/>
+              <a:buNone/>
+              <a:tabLst/>
+              <a:defRPr/>
+            </a:pPr>
+            <a:r>
+              <a:rPr lang="en-US" sz="1200" b="0" kern="1200" dirty="0">
+                <a:solidFill>
+                  <a:schemeClr val="tx1"/>
+                </a:solidFill>
+                <a:effectLst/>
+                <a:latin typeface="+mn-lt"/>
+                <a:ea typeface="+mn-ea"/>
+                <a:cs typeface="+mn-cs"/>
+              </a:rPr>
+              <a:t>Note: Dragging is quite challenging to implement… and not that often utilized. </a:t>
+            </a:r>
+          </a:p>
+          <a:p>
+            <a:pPr marL="0" marR="0" lvl="0" indent="0" algn="l" defTabSz="914400" rtl="0" eaLnBrk="1" fontAlgn="auto" latinLnBrk="0" hangingPunct="1">
+              <a:lnSpc>
+                <a:spcPct val="100000"/>
+              </a:lnSpc>
+              <a:spcBef>
+                <a:spcPts val="0"/>
+              </a:spcBef>
+              <a:spcAft>
+                <a:spcPts val="0"/>
+              </a:spcAft>
+              <a:buClrTx/>
+              <a:buSzTx/>
+              <a:buFontTx/>
+              <a:buNone/>
+              <a:tabLst/>
+              <a:defRPr/>
+            </a:pPr>
+            <a:endParaRPr lang="en-US" sz="1200" b="0" kern="1200" dirty="0">
+              <a:solidFill>
+                <a:schemeClr val="tx1"/>
+              </a:solidFill>
+              <a:effectLst/>
+              <a:latin typeface="+mn-lt"/>
+              <a:ea typeface="+mn-ea"/>
+              <a:cs typeface="+mn-cs"/>
+            </a:endParaRPr>
+          </a:p>
+          <a:p>
+            <a:pPr marL="0" marR="0" lvl="0" indent="0" algn="l" defTabSz="914400" rtl="0" eaLnBrk="1" fontAlgn="auto" latinLnBrk="0" hangingPunct="1">
+              <a:lnSpc>
+                <a:spcPct val="100000"/>
+              </a:lnSpc>
+              <a:spcBef>
+                <a:spcPts val="0"/>
+              </a:spcBef>
+              <a:spcAft>
+                <a:spcPts val="0"/>
+              </a:spcAft>
+              <a:buClrTx/>
+              <a:buSzTx/>
+              <a:buFontTx/>
+              <a:buNone/>
+              <a:tabLst/>
+              <a:defRPr/>
+            </a:pPr>
+            <a:r>
+              <a:rPr lang="en-US" sz="1200" b="0" kern="1200" dirty="0">
+                <a:solidFill>
+                  <a:schemeClr val="tx1"/>
+                </a:solidFill>
+                <a:effectLst/>
+                <a:latin typeface="+mn-lt"/>
+                <a:ea typeface="+mn-ea"/>
+                <a:cs typeface="+mn-cs"/>
+              </a:rPr>
+              <a:t>import </a:t>
+            </a:r>
+            <a:r>
+              <a:rPr lang="en-US" sz="1200" b="0" kern="1200" dirty="0" err="1">
+                <a:solidFill>
+                  <a:schemeClr val="tx1"/>
+                </a:solidFill>
+                <a:effectLst/>
+                <a:latin typeface="+mn-lt"/>
+                <a:ea typeface="+mn-ea"/>
+                <a:cs typeface="+mn-cs"/>
+              </a:rPr>
+              <a:t>java.awt.event.MouseMotionListener</a:t>
+            </a:r>
+            <a:r>
+              <a:rPr lang="en-US" sz="1200" b="0" kern="1200" dirty="0">
+                <a:solidFill>
+                  <a:schemeClr val="tx1"/>
+                </a:solidFill>
+                <a:effectLst/>
+                <a:latin typeface="+mn-lt"/>
+                <a:ea typeface="+mn-ea"/>
+                <a:cs typeface="+mn-cs"/>
+              </a:rPr>
+              <a:t>;</a:t>
+            </a:r>
+          </a:p>
+          <a:p>
+            <a:r>
+              <a:rPr lang="en-US" sz="1200" b="0" kern="1200" dirty="0">
+                <a:solidFill>
+                  <a:schemeClr val="tx1"/>
+                </a:solidFill>
+                <a:effectLst/>
+                <a:latin typeface="+mn-lt"/>
+                <a:ea typeface="+mn-ea"/>
+                <a:cs typeface="+mn-cs"/>
+              </a:rPr>
+              <a:t>import </a:t>
+            </a:r>
+            <a:r>
+              <a:rPr lang="en-US" sz="1200" b="0" kern="1200" dirty="0" err="1">
+                <a:solidFill>
+                  <a:schemeClr val="tx1"/>
+                </a:solidFill>
+                <a:effectLst/>
+                <a:latin typeface="+mn-lt"/>
+                <a:ea typeface="+mn-ea"/>
+                <a:cs typeface="+mn-cs"/>
+              </a:rPr>
+              <a:t>java.awt.event.MouseEvent</a:t>
+            </a:r>
+            <a:r>
+              <a:rPr lang="en-US" sz="1200" b="0" kern="1200" dirty="0">
+                <a:solidFill>
+                  <a:schemeClr val="tx1"/>
+                </a:solidFill>
+                <a:effectLst/>
+                <a:latin typeface="+mn-lt"/>
+                <a:ea typeface="+mn-ea"/>
+                <a:cs typeface="+mn-cs"/>
+              </a:rPr>
+              <a:t>;</a:t>
+            </a:r>
+          </a:p>
+          <a:p>
+            <a:endParaRPr lang="en-US" sz="1000" dirty="0"/>
+          </a:p>
+          <a:p>
+            <a:r>
+              <a:rPr lang="en-US" sz="1000" dirty="0" err="1"/>
+              <a:t>MouseMotionListener</a:t>
+            </a:r>
+            <a:endParaRPr lang="en-US" sz="1000" dirty="0"/>
+          </a:p>
+          <a:p>
+            <a:r>
+              <a:rPr lang="en-US" sz="1000" dirty="0"/>
+              <a:t>public void </a:t>
+            </a:r>
+            <a:r>
+              <a:rPr lang="en-US" sz="1000" dirty="0" err="1"/>
+              <a:t>mouseDragged</a:t>
+            </a:r>
+            <a:r>
+              <a:rPr lang="en-US" sz="1000" dirty="0"/>
+              <a:t>(</a:t>
+            </a:r>
+            <a:r>
+              <a:rPr lang="en-US" sz="1000" dirty="0" err="1"/>
+              <a:t>MouseEvent</a:t>
+            </a:r>
+            <a:r>
+              <a:rPr lang="en-US" sz="1000" dirty="0"/>
+              <a:t> e) {}</a:t>
+            </a:r>
+          </a:p>
+          <a:p>
+            <a:r>
+              <a:rPr lang="en-US" sz="1000" dirty="0"/>
+              <a:t>public void </a:t>
+            </a:r>
+            <a:r>
+              <a:rPr lang="en-US" sz="1000" dirty="0" err="1"/>
+              <a:t>mouseMoved</a:t>
+            </a:r>
+            <a:r>
+              <a:rPr lang="en-US" sz="1000" dirty="0"/>
+              <a:t>(</a:t>
+            </a:r>
+            <a:r>
+              <a:rPr lang="en-US" sz="1000" dirty="0" err="1"/>
+              <a:t>MouseEvent</a:t>
+            </a:r>
+            <a:r>
+              <a:rPr lang="en-US" sz="1000" dirty="0"/>
+              <a:t> e) {}</a:t>
+            </a:r>
+          </a:p>
+          <a:p>
+            <a:endParaRPr lang="en-US" sz="1000" dirty="0"/>
+          </a:p>
+          <a:p>
+            <a:pPr marL="0" marR="0" lvl="0" indent="0" algn="l" defTabSz="914400" rtl="0" eaLnBrk="1" fontAlgn="auto" latinLnBrk="0" hangingPunct="1">
+              <a:lnSpc>
+                <a:spcPct val="100000"/>
+              </a:lnSpc>
+              <a:spcBef>
+                <a:spcPts val="0"/>
+              </a:spcBef>
+              <a:spcAft>
+                <a:spcPts val="0"/>
+              </a:spcAft>
+              <a:buClrTx/>
+              <a:buSzTx/>
+              <a:buFontTx/>
+              <a:buNone/>
+              <a:tabLst/>
+              <a:defRPr/>
+            </a:pPr>
+            <a:r>
+              <a:rPr lang="en-US" sz="1000" dirty="0" err="1"/>
+              <a:t>addMouseMotionListener</a:t>
+            </a:r>
+            <a:r>
+              <a:rPr lang="en-US" sz="1000" dirty="0"/>
+              <a:t>(this);</a:t>
+            </a:r>
+          </a:p>
+          <a:p>
+            <a:endParaRPr lang="en-US" sz="1000" dirty="0"/>
+          </a:p>
+        </p:txBody>
+      </p:sp>
+      <p:sp>
+        <p:nvSpPr>
+          <p:cNvPr id="4" name="Slide Number Placeholder 3"/>
+          <p:cNvSpPr>
+            <a:spLocks noGrp="1"/>
+          </p:cNvSpPr>
+          <p:nvPr>
+            <p:ph type="sldNum" sz="quarter" idx="10"/>
+          </p:nvPr>
+        </p:nvSpPr>
+        <p:spPr/>
+        <p:txBody>
+          <a:bodyPr/>
+          <a:lstStyle/>
+          <a:p>
+            <a:fld id="{5394DE12-7B9B-46AA-AC19-C30A49928B9B}" type="slidenum">
+              <a:rPr lang="en-US" smtClean="0"/>
+              <a:t>30</a:t>
+            </a:fld>
+            <a:endParaRPr lang="en-US" dirty="0"/>
+          </a:p>
+        </p:txBody>
+      </p:sp>
+    </p:spTree>
+    <p:extLst>
+      <p:ext uri="{BB962C8B-B14F-4D97-AF65-F5344CB8AC3E}">
+        <p14:creationId xmlns:p14="http://schemas.microsoft.com/office/powerpoint/2010/main" val="4251516730"/>
+      </p:ext>
+    </p:extLst>
+  </p:cSld>
+  <p:clrMapOvr>
+    <a:masterClrMapping/>
+  </p:clrMapOvr>
+</p:notes>
+</file>
+
+<file path=ppt/notesSlides/notesSlide31.xml><?xml version="1.0" encoding="utf-8"?>
+<p:notes xmlns:a="http://schemas.openxmlformats.org/drawingml/2006/main" xmlns:r="http://schemas.openxmlformats.org/officeDocument/2006/relationships" xmlns:p="http://schemas.openxmlformats.org/presentationml/2006/main">
+  <p:cSld>
+    <p:spTree>
+      <p:nvGrpSpPr>
+        <p:cNvPr id="1" name=""/>
+        <p:cNvGrpSpPr/>
+        <p:nvPr/>
+      </p:nvGrpSpPr>
+      <p:grpSpPr>
+        <a:xfrm>
+          <a:off x="0" y="0"/>
+          <a:ext cx="0" cy="0"/>
+          <a:chOff x="0" y="0"/>
+          <a:chExt cx="0" cy="0"/>
+        </a:xfrm>
+      </p:grpSpPr>
+      <p:sp>
+        <p:nvSpPr>
+          <p:cNvPr id="2" name="Slide Image Placeholder 1"/>
+          <p:cNvSpPr>
+            <a:spLocks noGrp="1" noRot="1" noChangeAspect="1"/>
+          </p:cNvSpPr>
+          <p:nvPr>
+            <p:ph type="sldImg"/>
+          </p:nvPr>
+        </p:nvSpPr>
+        <p:spPr/>
+      </p:sp>
+      <p:sp>
+        <p:nvSpPr>
+          <p:cNvPr id="3" name="Notes Placeholder 2"/>
+          <p:cNvSpPr>
+            <a:spLocks noGrp="1"/>
+          </p:cNvSpPr>
+          <p:nvPr>
+            <p:ph type="body" idx="1"/>
+          </p:nvPr>
+        </p:nvSpPr>
+        <p:spPr/>
+        <p:txBody>
+          <a:bodyPr/>
+          <a:lstStyle/>
+          <a:p>
+            <a:r>
+              <a:rPr lang="en-US" sz="1000" dirty="0"/>
+              <a:t>Enhance </a:t>
+            </a:r>
+            <a:r>
+              <a:rPr lang="en-US" sz="1000" dirty="0" err="1"/>
+              <a:t>OvalDraw</a:t>
+            </a:r>
+            <a:r>
+              <a:rPr lang="en-US" sz="1000" dirty="0"/>
+              <a:t> to include drawing a random face (similar to </a:t>
+            </a:r>
+            <a:r>
+              <a:rPr lang="en-US" sz="1000" dirty="0" err="1"/>
+              <a:t>FaceDraw</a:t>
+            </a:r>
+            <a:r>
+              <a:rPr lang="en-US" sz="1000" dirty="0"/>
+              <a:t>) with clicked and to draw a red circle with a radius of the drag distance when the mouse is dragged.</a:t>
+            </a:r>
+          </a:p>
+        </p:txBody>
+      </p:sp>
+      <p:sp>
+        <p:nvSpPr>
+          <p:cNvPr id="4" name="Slide Number Placeholder 3"/>
+          <p:cNvSpPr>
+            <a:spLocks noGrp="1"/>
+          </p:cNvSpPr>
+          <p:nvPr>
+            <p:ph type="sldNum" sz="quarter" idx="10"/>
+          </p:nvPr>
+        </p:nvSpPr>
+        <p:spPr/>
+        <p:txBody>
+          <a:bodyPr/>
+          <a:lstStyle/>
+          <a:p>
+            <a:fld id="{5394DE12-7B9B-46AA-AC19-C30A49928B9B}" type="slidenum">
+              <a:rPr lang="en-US" smtClean="0"/>
+              <a:t>31</a:t>
+            </a:fld>
+            <a:endParaRPr lang="en-US" dirty="0"/>
+          </a:p>
+        </p:txBody>
+      </p:sp>
+    </p:spTree>
+    <p:extLst>
+      <p:ext uri="{BB962C8B-B14F-4D97-AF65-F5344CB8AC3E}">
+        <p14:creationId xmlns:p14="http://schemas.microsoft.com/office/powerpoint/2010/main" val="692711414"/>
+      </p:ext>
+    </p:extLst>
+  </p:cSld>
+  <p:clrMapOvr>
+    <a:masterClrMapping/>
+  </p:clrMapOvr>
+</p:notes>
+</file>
+
+<file path=ppt/notesSlides/notesSlide32.xml><?xml version="1.0" encoding="utf-8"?>
+<p:notes xmlns:a="http://schemas.openxmlformats.org/drawingml/2006/main" xmlns:r="http://schemas.openxmlformats.org/officeDocument/2006/relationships" xmlns:p="http://schemas.openxmlformats.org/presentationml/2006/main">
+  <p:cSld>
+    <p:spTree>
+      <p:nvGrpSpPr>
+        <p:cNvPr id="1" name=""/>
+        <p:cNvGrpSpPr/>
+        <p:nvPr/>
+      </p:nvGrpSpPr>
+      <p:grpSpPr>
+        <a:xfrm>
+          <a:off x="0" y="0"/>
+          <a:ext cx="0" cy="0"/>
+          <a:chOff x="0" y="0"/>
+          <a:chExt cx="0" cy="0"/>
+        </a:xfrm>
+      </p:grpSpPr>
+      <p:sp>
+        <p:nvSpPr>
+          <p:cNvPr id="2" name="Slide Image Placeholder 1"/>
+          <p:cNvSpPr>
+            <a:spLocks noGrp="1" noRot="1" noChangeAspect="1"/>
+          </p:cNvSpPr>
+          <p:nvPr>
+            <p:ph type="sldImg"/>
+          </p:nvPr>
+        </p:nvSpPr>
+        <p:spPr/>
+      </p:sp>
+      <p:sp>
+        <p:nvSpPr>
+          <p:cNvPr id="3" name="Notes Placeholder 2"/>
+          <p:cNvSpPr>
+            <a:spLocks noGrp="1"/>
+          </p:cNvSpPr>
+          <p:nvPr>
+            <p:ph type="body" idx="1"/>
+          </p:nvPr>
+        </p:nvSpPr>
+        <p:spPr/>
+        <p:txBody>
+          <a:bodyPr/>
+          <a:lstStyle/>
+          <a:p>
+            <a:endParaRPr lang="en-US" sz="1000" dirty="0"/>
+          </a:p>
+        </p:txBody>
+      </p:sp>
+      <p:sp>
+        <p:nvSpPr>
+          <p:cNvPr id="4" name="Slide Number Placeholder 3"/>
+          <p:cNvSpPr>
+            <a:spLocks noGrp="1"/>
+          </p:cNvSpPr>
+          <p:nvPr>
+            <p:ph type="sldNum" sz="quarter" idx="10"/>
+          </p:nvPr>
+        </p:nvSpPr>
+        <p:spPr/>
+        <p:txBody>
+          <a:bodyPr/>
+          <a:lstStyle/>
+          <a:p>
+            <a:fld id="{5394DE12-7B9B-46AA-AC19-C30A49928B9B}" type="slidenum">
+              <a:rPr lang="en-US" smtClean="0"/>
+              <a:t>32</a:t>
+            </a:fld>
+            <a:endParaRPr lang="en-US" dirty="0"/>
+          </a:p>
+        </p:txBody>
+      </p:sp>
+    </p:spTree>
+    <p:extLst>
+      <p:ext uri="{BB962C8B-B14F-4D97-AF65-F5344CB8AC3E}">
+        <p14:creationId xmlns:p14="http://schemas.microsoft.com/office/powerpoint/2010/main" val="2671443363"/>
+      </p:ext>
+    </p:extLst>
+  </p:cSld>
+  <p:clrMapOvr>
+    <a:masterClrMapping/>
+  </p:clrMapOvr>
+</p:notes>
+</file>
+
+<file path=ppt/notesSlides/notesSlide33.xml><?xml version="1.0" encoding="utf-8"?>
+<p:notes xmlns:a="http://schemas.openxmlformats.org/drawingml/2006/main" xmlns:r="http://schemas.openxmlformats.org/officeDocument/2006/relationships" xmlns:p="http://schemas.openxmlformats.org/presentationml/2006/main">
+  <p:cSld>
+    <p:spTree>
+      <p:nvGrpSpPr>
+        <p:cNvPr id="1" name=""/>
+        <p:cNvGrpSpPr/>
+        <p:nvPr/>
+      </p:nvGrpSpPr>
+      <p:grpSpPr>
+        <a:xfrm>
+          <a:off x="0" y="0"/>
+          <a:ext cx="0" cy="0"/>
+          <a:chOff x="0" y="0"/>
+          <a:chExt cx="0" cy="0"/>
+        </a:xfrm>
+      </p:grpSpPr>
+      <p:sp>
+        <p:nvSpPr>
+          <p:cNvPr id="2" name="Slide Image Placeholder 1"/>
+          <p:cNvSpPr>
+            <a:spLocks noGrp="1" noRot="1" noChangeAspect="1"/>
+          </p:cNvSpPr>
+          <p:nvPr>
+            <p:ph type="sldImg"/>
+          </p:nvPr>
+        </p:nvSpPr>
+        <p:spPr/>
+      </p:sp>
+      <p:sp>
+        <p:nvSpPr>
+          <p:cNvPr id="3" name="Notes Placeholder 2"/>
+          <p:cNvSpPr>
+            <a:spLocks noGrp="1"/>
+          </p:cNvSpPr>
+          <p:nvPr>
+            <p:ph type="body" idx="1"/>
+          </p:nvPr>
+        </p:nvSpPr>
+        <p:spPr/>
+        <p:txBody>
+          <a:bodyPr/>
+          <a:lstStyle/>
+          <a:p>
+            <a:endParaRPr lang="en-US" dirty="0"/>
+          </a:p>
+        </p:txBody>
+      </p:sp>
+      <p:sp>
+        <p:nvSpPr>
+          <p:cNvPr id="4" name="Slide Number Placeholder 3"/>
+          <p:cNvSpPr>
+            <a:spLocks noGrp="1"/>
+          </p:cNvSpPr>
+          <p:nvPr>
+            <p:ph type="sldNum" sz="quarter" idx="10"/>
+          </p:nvPr>
+        </p:nvSpPr>
+        <p:spPr/>
+        <p:txBody>
+          <a:bodyPr/>
+          <a:lstStyle/>
+          <a:p>
+            <a:fld id="{5394DE12-7B9B-46AA-AC19-C30A49928B9B}" type="slidenum">
+              <a:rPr lang="en-US" smtClean="0"/>
+              <a:t>33</a:t>
+            </a:fld>
+            <a:endParaRPr lang="en-US" dirty="0"/>
+          </a:p>
+        </p:txBody>
+      </p:sp>
+    </p:spTree>
+    <p:extLst>
+      <p:ext uri="{BB962C8B-B14F-4D97-AF65-F5344CB8AC3E}">
+        <p14:creationId xmlns:p14="http://schemas.microsoft.com/office/powerpoint/2010/main" val="3615797398"/>
+      </p:ext>
+    </p:extLst>
+  </p:cSld>
+  <p:clrMapOvr>
+    <a:masterClrMapping/>
+  </p:clrMapOvr>
+</p:notes>
+</file>
+
+<file path=ppt/notesSlides/notesSlide34.xml><?xml version="1.0" encoding="utf-8"?>
+<p:notes xmlns:a="http://schemas.openxmlformats.org/drawingml/2006/main" xmlns:r="http://schemas.openxmlformats.org/officeDocument/2006/relationships" xmlns:p="http://schemas.openxmlformats.org/presentationml/2006/main">
+  <p:cSld>
+    <p:spTree>
+      <p:nvGrpSpPr>
+        <p:cNvPr id="1" name=""/>
+        <p:cNvGrpSpPr/>
+        <p:nvPr/>
+      </p:nvGrpSpPr>
+      <p:grpSpPr>
+        <a:xfrm>
+          <a:off x="0" y="0"/>
+          <a:ext cx="0" cy="0"/>
+          <a:chOff x="0" y="0"/>
+          <a:chExt cx="0" cy="0"/>
+        </a:xfrm>
+      </p:grpSpPr>
+      <p:sp>
+        <p:nvSpPr>
+          <p:cNvPr id="2" name="Slide Image Placeholder 1"/>
+          <p:cNvSpPr>
+            <a:spLocks noGrp="1" noRot="1" noChangeAspect="1"/>
+          </p:cNvSpPr>
+          <p:nvPr>
+            <p:ph type="sldImg"/>
+          </p:nvPr>
+        </p:nvSpPr>
+        <p:spPr/>
+      </p:sp>
+      <p:sp>
+        <p:nvSpPr>
+          <p:cNvPr id="3" name="Notes Placeholder 2"/>
+          <p:cNvSpPr>
+            <a:spLocks noGrp="1"/>
+          </p:cNvSpPr>
+          <p:nvPr>
+            <p:ph type="body" idx="1"/>
+          </p:nvPr>
+        </p:nvSpPr>
+        <p:spPr/>
+        <p:txBody>
+          <a:bodyPr/>
+          <a:lstStyle/>
+          <a:p>
+            <a:r>
+              <a:rPr lang="en-US" sz="1000" dirty="0"/>
+              <a:t>We will likely have a final programming example that will show some animation using timers. I’m not sure what form that example will take. </a:t>
+            </a:r>
+          </a:p>
+          <a:p>
+            <a:endParaRPr lang="en-US" sz="1000" dirty="0"/>
+          </a:p>
+          <a:p>
+            <a:pPr marL="0" marR="0" lvl="0" indent="0" algn="l" defTabSz="914400" rtl="0" eaLnBrk="1" fontAlgn="auto" latinLnBrk="0" hangingPunct="1">
+              <a:lnSpc>
+                <a:spcPct val="100000"/>
+              </a:lnSpc>
+              <a:spcBef>
+                <a:spcPts val="0"/>
+              </a:spcBef>
+              <a:spcAft>
+                <a:spcPts val="0"/>
+              </a:spcAft>
+              <a:buClrTx/>
+              <a:buSzTx/>
+              <a:buFontTx/>
+              <a:buNone/>
+              <a:tabLst/>
+              <a:defRPr/>
+            </a:pPr>
+            <a:r>
+              <a:rPr lang="en-US" sz="1200" b="0" kern="1200" dirty="0">
+                <a:solidFill>
+                  <a:schemeClr val="tx1"/>
+                </a:solidFill>
+                <a:effectLst/>
+                <a:latin typeface="+mn-lt"/>
+                <a:ea typeface="+mn-ea"/>
+                <a:cs typeface="+mn-cs"/>
+              </a:rPr>
+              <a:t>import </a:t>
+            </a:r>
+            <a:r>
+              <a:rPr lang="en-US" sz="1200" b="0" kern="1200" dirty="0" err="1">
+                <a:solidFill>
+                  <a:schemeClr val="tx1"/>
+                </a:solidFill>
+                <a:effectLst/>
+                <a:latin typeface="+mn-lt"/>
+                <a:ea typeface="+mn-ea"/>
+                <a:cs typeface="+mn-cs"/>
+              </a:rPr>
+              <a:t>java.util.Timer</a:t>
+            </a:r>
+            <a:r>
+              <a:rPr lang="en-US" sz="1200" b="0" kern="1200" dirty="0">
+                <a:solidFill>
+                  <a:schemeClr val="tx1"/>
+                </a:solidFill>
+                <a:effectLst/>
+                <a:latin typeface="+mn-lt"/>
+                <a:ea typeface="+mn-ea"/>
+                <a:cs typeface="+mn-cs"/>
+              </a:rPr>
+              <a:t>;</a:t>
+            </a:r>
+          </a:p>
+          <a:p>
+            <a:endParaRPr lang="en-US" sz="1000" dirty="0"/>
+          </a:p>
+          <a:p>
+            <a:r>
+              <a:rPr lang="en-US" sz="1000" dirty="0"/>
+              <a:t>private Timer </a:t>
+            </a:r>
+            <a:r>
+              <a:rPr lang="en-US" sz="1000" dirty="0" err="1"/>
+              <a:t>animationTimer</a:t>
+            </a:r>
+            <a:r>
+              <a:rPr lang="en-US" sz="1000" dirty="0"/>
+              <a:t>;</a:t>
+            </a:r>
+          </a:p>
+          <a:p>
+            <a:endParaRPr lang="en-US" sz="1000" dirty="0"/>
+          </a:p>
+          <a:p>
+            <a:pPr marL="0" marR="0" lvl="0" indent="0" algn="l" defTabSz="914400" rtl="0" eaLnBrk="1" fontAlgn="auto" latinLnBrk="0" hangingPunct="1">
+              <a:lnSpc>
+                <a:spcPct val="100000"/>
+              </a:lnSpc>
+              <a:spcBef>
+                <a:spcPts val="0"/>
+              </a:spcBef>
+              <a:spcAft>
+                <a:spcPts val="0"/>
+              </a:spcAft>
+              <a:buClrTx/>
+              <a:buSzTx/>
+              <a:buFontTx/>
+              <a:buNone/>
+              <a:tabLst/>
+              <a:defRPr/>
+            </a:pPr>
+            <a:r>
+              <a:rPr lang="en-US" sz="1200" b="0" kern="1200" dirty="0" err="1">
+                <a:solidFill>
+                  <a:schemeClr val="tx1"/>
+                </a:solidFill>
+                <a:effectLst/>
+                <a:latin typeface="+mn-lt"/>
+                <a:ea typeface="+mn-ea"/>
+                <a:cs typeface="+mn-cs"/>
+              </a:rPr>
+              <a:t>animationTimer</a:t>
+            </a:r>
+            <a:r>
+              <a:rPr lang="en-US" sz="1200" b="0" kern="1200" dirty="0">
+                <a:solidFill>
+                  <a:schemeClr val="tx1"/>
+                </a:solidFill>
+                <a:effectLst/>
+                <a:latin typeface="+mn-lt"/>
+                <a:ea typeface="+mn-ea"/>
+                <a:cs typeface="+mn-cs"/>
+              </a:rPr>
+              <a:t> = new Timer(1000,this);</a:t>
+            </a:r>
+          </a:p>
+          <a:p>
+            <a:endParaRPr lang="en-US" sz="1000" dirty="0"/>
+          </a:p>
+          <a:p>
+            <a:r>
+              <a:rPr lang="en-US" sz="1200" b="0" kern="1200" dirty="0">
+                <a:solidFill>
+                  <a:schemeClr val="tx1"/>
+                </a:solidFill>
+                <a:effectLst/>
+                <a:latin typeface="+mn-lt"/>
+                <a:ea typeface="+mn-ea"/>
+                <a:cs typeface="+mn-cs"/>
+              </a:rPr>
+              <a:t>public void </a:t>
+            </a:r>
+            <a:r>
+              <a:rPr lang="en-US" sz="1200" b="0" kern="1200" dirty="0" err="1">
+                <a:solidFill>
+                  <a:schemeClr val="tx1"/>
+                </a:solidFill>
+                <a:effectLst/>
+                <a:latin typeface="+mn-lt"/>
+                <a:ea typeface="+mn-ea"/>
+                <a:cs typeface="+mn-cs"/>
+              </a:rPr>
+              <a:t>actionPerformed</a:t>
+            </a:r>
+            <a:r>
+              <a:rPr lang="en-US" sz="1200" b="0" kern="1200" dirty="0">
+                <a:solidFill>
+                  <a:schemeClr val="tx1"/>
+                </a:solidFill>
+                <a:effectLst/>
+                <a:latin typeface="+mn-lt"/>
+                <a:ea typeface="+mn-ea"/>
+                <a:cs typeface="+mn-cs"/>
+              </a:rPr>
+              <a:t>(</a:t>
+            </a:r>
+            <a:r>
+              <a:rPr lang="en-US" sz="1200" b="0" kern="1200" dirty="0" err="1">
+                <a:solidFill>
+                  <a:schemeClr val="tx1"/>
+                </a:solidFill>
+                <a:effectLst/>
+                <a:latin typeface="+mn-lt"/>
+                <a:ea typeface="+mn-ea"/>
+                <a:cs typeface="+mn-cs"/>
+              </a:rPr>
+              <a:t>ActionEvent</a:t>
+            </a:r>
+            <a:r>
+              <a:rPr lang="en-US" sz="1200" b="0" kern="1200" dirty="0">
+                <a:solidFill>
+                  <a:schemeClr val="tx1"/>
+                </a:solidFill>
+                <a:effectLst/>
+                <a:latin typeface="+mn-lt"/>
+                <a:ea typeface="+mn-ea"/>
+                <a:cs typeface="+mn-cs"/>
+              </a:rPr>
+              <a:t> e) {</a:t>
+            </a:r>
+          </a:p>
+          <a:p>
+            <a:r>
+              <a:rPr lang="en-US" sz="1200" b="0" kern="1200" dirty="0">
+                <a:solidFill>
+                  <a:schemeClr val="tx1"/>
+                </a:solidFill>
+                <a:effectLst/>
+                <a:latin typeface="+mn-lt"/>
+                <a:ea typeface="+mn-ea"/>
+                <a:cs typeface="+mn-cs"/>
+              </a:rPr>
+              <a:t>    </a:t>
+            </a:r>
+            <a:r>
+              <a:rPr lang="en-US" sz="1200" b="0" kern="1200" dirty="0" err="1">
+                <a:solidFill>
+                  <a:schemeClr val="tx1"/>
+                </a:solidFill>
+                <a:effectLst/>
+                <a:latin typeface="+mn-lt"/>
+                <a:ea typeface="+mn-ea"/>
+                <a:cs typeface="+mn-cs"/>
+              </a:rPr>
+              <a:t>System.out.println</a:t>
+            </a:r>
+            <a:r>
+              <a:rPr lang="en-US" sz="1200" b="0" kern="1200" dirty="0">
+                <a:solidFill>
+                  <a:schemeClr val="tx1"/>
+                </a:solidFill>
+                <a:effectLst/>
+                <a:latin typeface="+mn-lt"/>
+                <a:ea typeface="+mn-ea"/>
+                <a:cs typeface="+mn-cs"/>
+              </a:rPr>
+              <a:t>("</a:t>
+            </a:r>
+            <a:r>
+              <a:rPr lang="en-US" sz="1200" b="0" kern="1200" dirty="0" err="1">
+                <a:solidFill>
+                  <a:schemeClr val="tx1"/>
+                </a:solidFill>
+                <a:effectLst/>
+                <a:latin typeface="+mn-lt"/>
+                <a:ea typeface="+mn-ea"/>
+                <a:cs typeface="+mn-cs"/>
+              </a:rPr>
+              <a:t>actionPerformed</a:t>
+            </a:r>
+            <a:r>
+              <a:rPr lang="en-US" sz="1200" b="0" kern="1200" dirty="0">
+                <a:solidFill>
+                  <a:schemeClr val="tx1"/>
+                </a:solidFill>
+                <a:effectLst/>
+                <a:latin typeface="+mn-lt"/>
+                <a:ea typeface="+mn-ea"/>
+                <a:cs typeface="+mn-cs"/>
+              </a:rPr>
+              <a:t>(</a:t>
+            </a:r>
+            <a:r>
+              <a:rPr lang="en-US" sz="1200" b="0" kern="1200" dirty="0" err="1">
+                <a:solidFill>
+                  <a:schemeClr val="tx1"/>
+                </a:solidFill>
+                <a:effectLst/>
+                <a:latin typeface="+mn-lt"/>
+                <a:ea typeface="+mn-ea"/>
+                <a:cs typeface="+mn-cs"/>
+              </a:rPr>
+              <a:t>ActionEvent</a:t>
+            </a:r>
+            <a:r>
+              <a:rPr lang="en-US" sz="1200" b="0" kern="1200" dirty="0">
+                <a:solidFill>
+                  <a:schemeClr val="tx1"/>
+                </a:solidFill>
+                <a:effectLst/>
+                <a:latin typeface="+mn-lt"/>
+                <a:ea typeface="+mn-ea"/>
+                <a:cs typeface="+mn-cs"/>
+              </a:rPr>
+              <a:t> e)"); </a:t>
+            </a:r>
+          </a:p>
+          <a:p>
+            <a:r>
+              <a:rPr lang="en-US" sz="1200" b="0" kern="1200" dirty="0">
+                <a:solidFill>
+                  <a:schemeClr val="tx1"/>
+                </a:solidFill>
+                <a:effectLst/>
+                <a:latin typeface="+mn-lt"/>
+                <a:ea typeface="+mn-ea"/>
+                <a:cs typeface="+mn-cs"/>
+              </a:rPr>
+              <a:t>}</a:t>
+            </a:r>
+          </a:p>
+          <a:p>
+            <a:endParaRPr lang="en-US" sz="1000" dirty="0"/>
+          </a:p>
+        </p:txBody>
+      </p:sp>
+      <p:sp>
+        <p:nvSpPr>
+          <p:cNvPr id="4" name="Slide Number Placeholder 3"/>
+          <p:cNvSpPr>
+            <a:spLocks noGrp="1"/>
+          </p:cNvSpPr>
+          <p:nvPr>
+            <p:ph type="sldNum" sz="quarter" idx="10"/>
+          </p:nvPr>
+        </p:nvSpPr>
+        <p:spPr/>
+        <p:txBody>
+          <a:bodyPr/>
+          <a:lstStyle/>
+          <a:p>
+            <a:fld id="{5394DE12-7B9B-46AA-AC19-C30A49928B9B}" type="slidenum">
+              <a:rPr lang="en-US" smtClean="0"/>
+              <a:t>34</a:t>
+            </a:fld>
+            <a:endParaRPr lang="en-US" dirty="0"/>
+          </a:p>
+        </p:txBody>
+      </p:sp>
+    </p:spTree>
+    <p:extLst>
+      <p:ext uri="{BB962C8B-B14F-4D97-AF65-F5344CB8AC3E}">
+        <p14:creationId xmlns:p14="http://schemas.microsoft.com/office/powerpoint/2010/main" val="1490260793"/>
+      </p:ext>
+    </p:extLst>
+  </p:cSld>
+  <p:clrMapOvr>
+    <a:masterClrMapping/>
+  </p:clrMapOvr>
+</p:notes>
+</file>
+
+<file path=ppt/notesSlides/notesSlide35.xml><?xml version="1.0" encoding="utf-8"?>
+<p:notes xmlns:a="http://schemas.openxmlformats.org/drawingml/2006/main" xmlns:r="http://schemas.openxmlformats.org/officeDocument/2006/relationships" xmlns:p="http://schemas.openxmlformats.org/presentationml/2006/main">
+  <p:cSld>
+    <p:spTree>
+      <p:nvGrpSpPr>
+        <p:cNvPr id="1" name=""/>
+        <p:cNvGrpSpPr/>
+        <p:nvPr/>
+      </p:nvGrpSpPr>
+      <p:grpSpPr>
+        <a:xfrm>
+          <a:off x="0" y="0"/>
+          <a:ext cx="0" cy="0"/>
+          <a:chOff x="0" y="0"/>
+          <a:chExt cx="0" cy="0"/>
+        </a:xfrm>
+      </p:grpSpPr>
+      <p:sp>
+        <p:nvSpPr>
+          <p:cNvPr id="2" name="Slide Image Placeholder 1"/>
+          <p:cNvSpPr>
+            <a:spLocks noGrp="1" noRot="1" noChangeAspect="1"/>
+          </p:cNvSpPr>
+          <p:nvPr>
+            <p:ph type="sldImg"/>
+          </p:nvPr>
+        </p:nvSpPr>
+        <p:spPr/>
+      </p:sp>
+      <p:sp>
+        <p:nvSpPr>
+          <p:cNvPr id="3" name="Notes Placeholder 2"/>
+          <p:cNvSpPr>
+            <a:spLocks noGrp="1"/>
+          </p:cNvSpPr>
+          <p:nvPr>
+            <p:ph type="body" idx="1"/>
+          </p:nvPr>
+        </p:nvSpPr>
+        <p:spPr/>
+        <p:txBody>
+          <a:bodyPr/>
+          <a:lstStyle/>
+          <a:p>
+            <a:endParaRPr lang="en-US" sz="1000" dirty="0"/>
+          </a:p>
+        </p:txBody>
+      </p:sp>
+      <p:sp>
+        <p:nvSpPr>
+          <p:cNvPr id="4" name="Slide Number Placeholder 3"/>
+          <p:cNvSpPr>
+            <a:spLocks noGrp="1"/>
+          </p:cNvSpPr>
+          <p:nvPr>
+            <p:ph type="sldNum" sz="quarter" idx="10"/>
+          </p:nvPr>
+        </p:nvSpPr>
+        <p:spPr/>
+        <p:txBody>
+          <a:bodyPr/>
+          <a:lstStyle/>
+          <a:p>
+            <a:fld id="{5394DE12-7B9B-46AA-AC19-C30A49928B9B}" type="slidenum">
+              <a:rPr lang="en-US" smtClean="0"/>
+              <a:t>35</a:t>
+            </a:fld>
+            <a:endParaRPr lang="en-US" dirty="0"/>
+          </a:p>
+        </p:txBody>
+      </p:sp>
+    </p:spTree>
+    <p:extLst>
+      <p:ext uri="{BB962C8B-B14F-4D97-AF65-F5344CB8AC3E}">
+        <p14:creationId xmlns:p14="http://schemas.microsoft.com/office/powerpoint/2010/main" val="341419140"/>
+      </p:ext>
+    </p:extLst>
+  </p:cSld>
+  <p:clrMapOvr>
+    <a:masterClrMapping/>
+  </p:clrMapOvr>
+</p:notes>
+</file>
+
+<file path=ppt/notesSlides/notesSlide36.xml><?xml version="1.0" encoding="utf-8"?>
+<p:notes xmlns:a="http://schemas.openxmlformats.org/drawingml/2006/main" xmlns:r="http://schemas.openxmlformats.org/officeDocument/2006/relationships" xmlns:p="http://schemas.openxmlformats.org/presentationml/2006/main">
+  <p:cSld>
+    <p:spTree>
+      <p:nvGrpSpPr>
+        <p:cNvPr id="1" name=""/>
+        <p:cNvGrpSpPr/>
+        <p:nvPr/>
+      </p:nvGrpSpPr>
+      <p:grpSpPr>
+        <a:xfrm>
+          <a:off x="0" y="0"/>
+          <a:ext cx="0" cy="0"/>
+          <a:chOff x="0" y="0"/>
+          <a:chExt cx="0" cy="0"/>
+        </a:xfrm>
+      </p:grpSpPr>
+      <p:sp>
+        <p:nvSpPr>
+          <p:cNvPr id="2" name="Slide Image Placeholder 1"/>
+          <p:cNvSpPr>
+            <a:spLocks noGrp="1" noRot="1" noChangeAspect="1"/>
+          </p:cNvSpPr>
+          <p:nvPr>
+            <p:ph type="sldImg"/>
+          </p:nvPr>
+        </p:nvSpPr>
+        <p:spPr/>
+      </p:sp>
+      <p:sp>
+        <p:nvSpPr>
+          <p:cNvPr id="3" name="Notes Placeholder 2"/>
+          <p:cNvSpPr>
+            <a:spLocks noGrp="1"/>
+          </p:cNvSpPr>
+          <p:nvPr>
+            <p:ph type="body" idx="1"/>
+          </p:nvPr>
+        </p:nvSpPr>
+        <p:spPr/>
+        <p:txBody>
+          <a:bodyPr/>
+          <a:lstStyle/>
+          <a:p>
+            <a:endParaRPr lang="en-US" sz="1000" dirty="0"/>
+          </a:p>
+        </p:txBody>
+      </p:sp>
+      <p:sp>
+        <p:nvSpPr>
+          <p:cNvPr id="4" name="Slide Number Placeholder 3"/>
+          <p:cNvSpPr>
+            <a:spLocks noGrp="1"/>
+          </p:cNvSpPr>
+          <p:nvPr>
+            <p:ph type="sldNum" sz="quarter" idx="10"/>
+          </p:nvPr>
+        </p:nvSpPr>
+        <p:spPr/>
+        <p:txBody>
+          <a:bodyPr/>
+          <a:lstStyle/>
+          <a:p>
+            <a:fld id="{5394DE12-7B9B-46AA-AC19-C30A49928B9B}" type="slidenum">
+              <a:rPr lang="en-US" smtClean="0"/>
+              <a:t>36</a:t>
+            </a:fld>
+            <a:endParaRPr lang="en-US" dirty="0"/>
+          </a:p>
+        </p:txBody>
+      </p:sp>
+    </p:spTree>
+    <p:extLst>
+      <p:ext uri="{BB962C8B-B14F-4D97-AF65-F5344CB8AC3E}">
+        <p14:creationId xmlns:p14="http://schemas.microsoft.com/office/powerpoint/2010/main" val="2416317853"/>
+      </p:ext>
+    </p:extLst>
+  </p:cSld>
+  <p:clrMapOvr>
+    <a:masterClrMapping/>
+  </p:clrMapOvr>
+</p:notes>
+</file>
+
+<file path=ppt/notesSlides/notesSlide37.xml><?xml version="1.0" encoding="utf-8"?>
+<p:notes xmlns:a="http://schemas.openxmlformats.org/drawingml/2006/main" xmlns:r="http://schemas.openxmlformats.org/officeDocument/2006/relationships" xmlns:p="http://schemas.openxmlformats.org/presentationml/2006/main">
+  <p:cSld>
+    <p:spTree>
+      <p:nvGrpSpPr>
+        <p:cNvPr id="1" name=""/>
+        <p:cNvGrpSpPr/>
+        <p:nvPr/>
+      </p:nvGrpSpPr>
+      <p:grpSpPr>
+        <a:xfrm>
+          <a:off x="0" y="0"/>
+          <a:ext cx="0" cy="0"/>
+          <a:chOff x="0" y="0"/>
+          <a:chExt cx="0" cy="0"/>
+        </a:xfrm>
+      </p:grpSpPr>
+      <p:sp>
+        <p:nvSpPr>
+          <p:cNvPr id="2" name="Slide Image Placeholder 1"/>
+          <p:cNvSpPr>
+            <a:spLocks noGrp="1" noRot="1" noChangeAspect="1"/>
+          </p:cNvSpPr>
+          <p:nvPr>
+            <p:ph type="sldImg"/>
+          </p:nvPr>
+        </p:nvSpPr>
+        <p:spPr/>
+      </p:sp>
+      <p:sp>
+        <p:nvSpPr>
+          <p:cNvPr id="3" name="Notes Placeholder 2"/>
+          <p:cNvSpPr>
+            <a:spLocks noGrp="1"/>
+          </p:cNvSpPr>
+          <p:nvPr>
+            <p:ph type="body" idx="1"/>
+          </p:nvPr>
+        </p:nvSpPr>
+        <p:spPr/>
+        <p:txBody>
+          <a:bodyPr/>
+          <a:lstStyle/>
+          <a:p>
+            <a:endParaRPr lang="en-US" dirty="0"/>
+          </a:p>
+        </p:txBody>
+      </p:sp>
+      <p:sp>
+        <p:nvSpPr>
+          <p:cNvPr id="4" name="Slide Number Placeholder 3"/>
+          <p:cNvSpPr>
+            <a:spLocks noGrp="1"/>
+          </p:cNvSpPr>
+          <p:nvPr>
+            <p:ph type="sldNum" sz="quarter" idx="10"/>
+          </p:nvPr>
+        </p:nvSpPr>
+        <p:spPr/>
+        <p:txBody>
+          <a:bodyPr/>
+          <a:lstStyle/>
+          <a:p>
+            <a:fld id="{5394DE12-7B9B-46AA-AC19-C30A49928B9B}" type="slidenum">
+              <a:rPr lang="en-US" smtClean="0"/>
+              <a:t>37</a:t>
+            </a:fld>
+            <a:endParaRPr lang="en-US" dirty="0"/>
+          </a:p>
+        </p:txBody>
+      </p:sp>
+    </p:spTree>
+    <p:extLst>
+      <p:ext uri="{BB962C8B-B14F-4D97-AF65-F5344CB8AC3E}">
+        <p14:creationId xmlns:p14="http://schemas.microsoft.com/office/powerpoint/2010/main" val="1664096774"/>
       </p:ext>
     </p:extLst>
   </p:cSld>
@@ -2725,7 +4983,7 @@
           <a:p>
             <a:fld id="{969F32F5-AB1C-41B2-AE79-C9DE1D1745A4}" type="datetimeFigureOut">
               <a:rPr lang="en-US" smtClean="0"/>
-              <a:t>4/7/2017</a:t>
+              <a:t>4/11/2017</a:t>
             </a:fld>
             <a:endParaRPr lang="en-US" dirty="0"/>
           </a:p>
@@ -2893,7 +5151,7 @@
           <a:p>
             <a:fld id="{969F32F5-AB1C-41B2-AE79-C9DE1D1745A4}" type="datetimeFigureOut">
               <a:rPr lang="en-US" smtClean="0"/>
-              <a:t>4/7/2017</a:t>
+              <a:t>4/11/2017</a:t>
             </a:fld>
             <a:endParaRPr lang="en-US" dirty="0"/>
           </a:p>
@@ -3071,7 +5329,7 @@
           <a:p>
             <a:fld id="{969F32F5-AB1C-41B2-AE79-C9DE1D1745A4}" type="datetimeFigureOut">
               <a:rPr lang="en-US" smtClean="0"/>
-              <a:t>4/7/2017</a:t>
+              <a:t>4/11/2017</a:t>
             </a:fld>
             <a:endParaRPr lang="en-US" dirty="0"/>
           </a:p>
@@ -3239,7 +5497,7 @@
           <a:p>
             <a:fld id="{969F32F5-AB1C-41B2-AE79-C9DE1D1745A4}" type="datetimeFigureOut">
               <a:rPr lang="en-US" smtClean="0"/>
-              <a:t>4/7/2017</a:t>
+              <a:t>4/11/2017</a:t>
             </a:fld>
             <a:endParaRPr lang="en-US" dirty="0"/>
           </a:p>
@@ -3484,7 +5742,7 @@
           <a:p>
             <a:fld id="{969F32F5-AB1C-41B2-AE79-C9DE1D1745A4}" type="datetimeFigureOut">
               <a:rPr lang="en-US" smtClean="0"/>
-              <a:t>4/7/2017</a:t>
+              <a:t>4/11/2017</a:t>
             </a:fld>
             <a:endParaRPr lang="en-US" dirty="0"/>
           </a:p>
@@ -3713,7 +5971,7 @@
           <a:p>
             <a:fld id="{969F32F5-AB1C-41B2-AE79-C9DE1D1745A4}" type="datetimeFigureOut">
               <a:rPr lang="en-US" smtClean="0"/>
-              <a:t>4/7/2017</a:t>
+              <a:t>4/11/2017</a:t>
             </a:fld>
             <a:endParaRPr lang="en-US" dirty="0"/>
           </a:p>
@@ -4077,7 +6335,7 @@
           <a:p>
             <a:fld id="{969F32F5-AB1C-41B2-AE79-C9DE1D1745A4}" type="datetimeFigureOut">
               <a:rPr lang="en-US" smtClean="0"/>
-              <a:t>4/7/2017</a:t>
+              <a:t>4/11/2017</a:t>
             </a:fld>
             <a:endParaRPr lang="en-US" dirty="0"/>
           </a:p>
@@ -4194,7 +6452,7 @@
           <a:p>
             <a:fld id="{969F32F5-AB1C-41B2-AE79-C9DE1D1745A4}" type="datetimeFigureOut">
               <a:rPr lang="en-US" smtClean="0"/>
-              <a:t>4/7/2017</a:t>
+              <a:t>4/11/2017</a:t>
             </a:fld>
             <a:endParaRPr lang="en-US" dirty="0"/>
           </a:p>
@@ -4289,7 +6547,7 @@
           <a:p>
             <a:fld id="{969F32F5-AB1C-41B2-AE79-C9DE1D1745A4}" type="datetimeFigureOut">
               <a:rPr lang="en-US" smtClean="0"/>
-              <a:t>4/7/2017</a:t>
+              <a:t>4/11/2017</a:t>
             </a:fld>
             <a:endParaRPr lang="en-US" dirty="0"/>
           </a:p>
@@ -4564,7 +6822,7 @@
           <a:p>
             <a:fld id="{969F32F5-AB1C-41B2-AE79-C9DE1D1745A4}" type="datetimeFigureOut">
               <a:rPr lang="en-US" smtClean="0"/>
-              <a:t>4/7/2017</a:t>
+              <a:t>4/11/2017</a:t>
             </a:fld>
             <a:endParaRPr lang="en-US" dirty="0"/>
           </a:p>
@@ -4816,7 +7074,7 @@
           <a:p>
             <a:fld id="{969F32F5-AB1C-41B2-AE79-C9DE1D1745A4}" type="datetimeFigureOut">
               <a:rPr lang="en-US" smtClean="0"/>
-              <a:t>4/7/2017</a:t>
+              <a:t>4/11/2017</a:t>
             </a:fld>
             <a:endParaRPr lang="en-US" dirty="0"/>
           </a:p>
@@ -5027,7 +7285,7 @@
           <a:p>
             <a:fld id="{969F32F5-AB1C-41B2-AE79-C9DE1D1745A4}" type="datetimeFigureOut">
               <a:rPr lang="en-US" smtClean="0"/>
-              <a:t>4/7/2017</a:t>
+              <a:t>4/11/2017</a:t>
             </a:fld>
             <a:endParaRPr lang="en-US" dirty="0"/>
           </a:p>
@@ -7900,6 +10158,864 @@
 </p:sld>
 </file>
 
+<file path=ppt/slides/slide25.xml><?xml version="1.0" encoding="utf-8"?>
+<p:sld xmlns:a="http://schemas.openxmlformats.org/drawingml/2006/main" xmlns:r="http://schemas.openxmlformats.org/officeDocument/2006/relationships" xmlns:p="http://schemas.openxmlformats.org/presentationml/2006/main">
+  <p:cSld>
+    <p:spTree>
+      <p:nvGrpSpPr>
+        <p:cNvPr id="1" name=""/>
+        <p:cNvGrpSpPr/>
+        <p:nvPr/>
+      </p:nvGrpSpPr>
+      <p:grpSpPr>
+        <a:xfrm>
+          <a:off x="0" y="0"/>
+          <a:ext cx="0" cy="0"/>
+          <a:chOff x="0" y="0"/>
+          <a:chExt cx="0" cy="0"/>
+        </a:xfrm>
+      </p:grpSpPr>
+      <p:sp>
+        <p:nvSpPr>
+          <p:cNvPr id="2" name="Title 1"/>
+          <p:cNvSpPr>
+            <a:spLocks noGrp="1"/>
+          </p:cNvSpPr>
+          <p:nvPr>
+            <p:ph type="title"/>
+          </p:nvPr>
+        </p:nvSpPr>
+        <p:spPr>
+          <a:xfrm>
+            <a:off x="838200" y="365126"/>
+            <a:ext cx="6113662" cy="1409174"/>
+          </a:xfrm>
+        </p:spPr>
+        <p:txBody>
+          <a:bodyPr>
+            <a:normAutofit/>
+          </a:bodyPr>
+          <a:lstStyle/>
+          <a:p>
+            <a:r>
+              <a:rPr lang="en-US" sz="3600" dirty="0"/>
+              <a:t>Object-Oriented Programming</a:t>
+            </a:r>
+            <a:br>
+              <a:rPr lang="en-US" sz="3600" dirty="0"/>
+            </a:br>
+            <a:r>
+              <a:rPr lang="en-US" sz="1600" dirty="0"/>
+              <a:t>Session: Week 4 Session 3 </a:t>
+            </a:r>
+            <a:br>
+              <a:rPr lang="en-US" sz="1600" dirty="0"/>
+            </a:br>
+            <a:r>
+              <a:rPr lang="en-US" sz="1600" dirty="0"/>
+              <a:t>Subject: Clicks, Drags, Timers, and Animations</a:t>
+            </a:r>
+            <a:br>
+              <a:rPr lang="en-US" sz="1600" dirty="0"/>
+            </a:br>
+            <a:r>
+              <a:rPr lang="en-US" sz="1600" dirty="0"/>
+              <a:t>Instructor: Eric Pogue</a:t>
+            </a:r>
+            <a:endParaRPr lang="en-US" sz="1600" b="1" i="1" u="sng" dirty="0"/>
+          </a:p>
+        </p:txBody>
+      </p:sp>
+      <p:sp>
+        <p:nvSpPr>
+          <p:cNvPr id="3" name="Content Placeholder 2"/>
+          <p:cNvSpPr>
+            <a:spLocks noGrp="1"/>
+          </p:cNvSpPr>
+          <p:nvPr>
+            <p:ph idx="1"/>
+          </p:nvPr>
+        </p:nvSpPr>
+        <p:spPr>
+          <a:xfrm>
+            <a:off x="838200" y="1943857"/>
+            <a:ext cx="10718950" cy="4571242"/>
+          </a:xfrm>
+        </p:spPr>
+        <p:txBody>
+          <a:bodyPr>
+            <a:noAutofit/>
+          </a:bodyPr>
+          <a:lstStyle/>
+          <a:p>
+            <a:pPr marL="0" indent="0">
+              <a:buNone/>
+            </a:pPr>
+            <a:r>
+              <a:rPr lang="en-US" sz="2000" u="sng" dirty="0"/>
+              <a:t>Agenda:</a:t>
+            </a:r>
+          </a:p>
+          <a:p>
+            <a:pPr marL="457200" indent="-457200">
+              <a:buFont typeface="+mj-lt"/>
+              <a:buAutoNum type="arabicPeriod"/>
+            </a:pPr>
+            <a:r>
+              <a:rPr lang="en-US" sz="2000" dirty="0"/>
+              <a:t>Quick Review Learning Objectives we covered in Session 1</a:t>
+            </a:r>
+          </a:p>
+          <a:p>
+            <a:pPr marL="457200" indent="-457200">
+              <a:buFont typeface="+mj-lt"/>
+              <a:buAutoNum type="arabicPeriod"/>
+            </a:pPr>
+            <a:r>
+              <a:rPr lang="en-US" sz="2000" dirty="0"/>
+              <a:t>Overview of Session 3 Live Coding example and related Learning Objectives</a:t>
+            </a:r>
+          </a:p>
+          <a:p>
+            <a:pPr marL="457200" indent="-457200">
+              <a:buFont typeface="+mj-lt"/>
+              <a:buAutoNum type="arabicPeriod"/>
+            </a:pPr>
+            <a:r>
+              <a:rPr lang="en-US" sz="2000" dirty="0"/>
+              <a:t>Clicks and drags… with </a:t>
+            </a:r>
+            <a:r>
+              <a:rPr lang="en-US" sz="2000" dirty="0" err="1"/>
+              <a:t>FaceDraw-ish</a:t>
+            </a:r>
+            <a:r>
+              <a:rPr lang="en-US" sz="2000" dirty="0"/>
+              <a:t> solution</a:t>
+            </a:r>
+          </a:p>
+          <a:p>
+            <a:pPr marL="457200" indent="-457200">
+              <a:buFont typeface="+mj-lt"/>
+              <a:buAutoNum type="arabicPeriod"/>
+            </a:pPr>
+            <a:r>
+              <a:rPr lang="en-US" sz="2000" dirty="0"/>
+              <a:t>Short break</a:t>
+            </a:r>
+          </a:p>
+          <a:p>
+            <a:pPr marL="457200" indent="-457200">
+              <a:buFont typeface="+mj-lt"/>
+              <a:buAutoNum type="arabicPeriod"/>
+            </a:pPr>
+            <a:r>
+              <a:rPr lang="en-US" sz="2000" dirty="0"/>
+              <a:t>Timers and animation</a:t>
+            </a:r>
+          </a:p>
+          <a:p>
+            <a:pPr marL="457200" indent="-457200">
+              <a:buFont typeface="+mj-lt"/>
+              <a:buAutoNum type="arabicPeriod"/>
+            </a:pPr>
+            <a:r>
+              <a:rPr lang="en-US" sz="2000" dirty="0"/>
+              <a:t>Review what we learned and week 4 assignment as time allows</a:t>
+            </a:r>
+          </a:p>
+          <a:p>
+            <a:pPr marL="457200" indent="-457200">
+              <a:buFont typeface="+mj-lt"/>
+              <a:buAutoNum type="arabicPeriod"/>
+            </a:pPr>
+            <a:r>
+              <a:rPr lang="en-US" sz="2000" dirty="0"/>
+              <a:t>Final comment &amp; questions</a:t>
+            </a:r>
+          </a:p>
+          <a:p>
+            <a:pPr marL="0" indent="0">
+              <a:buNone/>
+            </a:pPr>
+            <a:endParaRPr lang="en-US" sz="2000" dirty="0"/>
+          </a:p>
+        </p:txBody>
+      </p:sp>
+      <p:pic>
+        <p:nvPicPr>
+          <p:cNvPr id="4" name="Content Placeholder 4"/>
+          <p:cNvPicPr>
+            <a:picLocks noChangeAspect="1"/>
+          </p:cNvPicPr>
+          <p:nvPr/>
+        </p:nvPicPr>
+        <p:blipFill>
+          <a:blip r:embed="rId3"/>
+          <a:stretch>
+            <a:fillRect/>
+          </a:stretch>
+        </p:blipFill>
+        <p:spPr>
+          <a:xfrm>
+            <a:off x="9072894" y="182925"/>
+            <a:ext cx="2656367" cy="1366321"/>
+          </a:xfrm>
+          <a:prstGeom prst="rect">
+            <a:avLst/>
+          </a:prstGeom>
+        </p:spPr>
+      </p:pic>
+    </p:spTree>
+    <p:extLst>
+      <p:ext uri="{BB962C8B-B14F-4D97-AF65-F5344CB8AC3E}">
+        <p14:creationId xmlns:p14="http://schemas.microsoft.com/office/powerpoint/2010/main" val="2320785907"/>
+      </p:ext>
+    </p:extLst>
+  </p:cSld>
+  <p:clrMapOvr>
+    <a:masterClrMapping/>
+  </p:clrMapOvr>
+</p:sld>
+</file>
+
+<file path=ppt/slides/slide26.xml><?xml version="1.0" encoding="utf-8"?>
+<p:sld xmlns:a="http://schemas.openxmlformats.org/drawingml/2006/main" xmlns:r="http://schemas.openxmlformats.org/officeDocument/2006/relationships" xmlns:p="http://schemas.openxmlformats.org/presentationml/2006/main">
+  <p:cSld>
+    <p:spTree>
+      <p:nvGrpSpPr>
+        <p:cNvPr id="1" name=""/>
+        <p:cNvGrpSpPr/>
+        <p:nvPr/>
+      </p:nvGrpSpPr>
+      <p:grpSpPr>
+        <a:xfrm>
+          <a:off x="0" y="0"/>
+          <a:ext cx="0" cy="0"/>
+          <a:chOff x="0" y="0"/>
+          <a:chExt cx="0" cy="0"/>
+        </a:xfrm>
+      </p:grpSpPr>
+      <p:sp>
+        <p:nvSpPr>
+          <p:cNvPr id="2" name="Title 1"/>
+          <p:cNvSpPr>
+            <a:spLocks noGrp="1"/>
+          </p:cNvSpPr>
+          <p:nvPr>
+            <p:ph type="title"/>
+          </p:nvPr>
+        </p:nvSpPr>
+        <p:spPr>
+          <a:xfrm>
+            <a:off x="838200" y="365126"/>
+            <a:ext cx="10515600" cy="757272"/>
+          </a:xfrm>
+        </p:spPr>
+        <p:txBody>
+          <a:bodyPr>
+            <a:normAutofit/>
+          </a:bodyPr>
+          <a:lstStyle/>
+          <a:p>
+            <a:r>
+              <a:rPr lang="en-US" sz="3600" dirty="0"/>
+              <a:t>Learning Objectives – Week 4</a:t>
+            </a:r>
+            <a:endParaRPr lang="en-US" sz="3600" b="1" i="1" u="sng" dirty="0"/>
+          </a:p>
+        </p:txBody>
+      </p:sp>
+      <p:sp>
+        <p:nvSpPr>
+          <p:cNvPr id="3" name="Content Placeholder 2"/>
+          <p:cNvSpPr>
+            <a:spLocks noGrp="1"/>
+          </p:cNvSpPr>
+          <p:nvPr>
+            <p:ph idx="1"/>
+          </p:nvPr>
+        </p:nvSpPr>
+        <p:spPr>
+          <a:xfrm>
+            <a:off x="838200" y="1122398"/>
+            <a:ext cx="10718950" cy="5463343"/>
+          </a:xfrm>
+        </p:spPr>
+        <p:txBody>
+          <a:bodyPr>
+            <a:normAutofit/>
+          </a:bodyPr>
+          <a:lstStyle/>
+          <a:p>
+            <a:pPr marL="457200" indent="-457200">
+              <a:buFont typeface="+mj-lt"/>
+              <a:buAutoNum type="arabicPeriod"/>
+            </a:pPr>
+            <a:r>
+              <a:rPr lang="en-US" sz="2000" dirty="0"/>
+              <a:t>Implement a menu system that enables the user to trigger a variety of actions in a familiar way</a:t>
+            </a:r>
+          </a:p>
+          <a:p>
+            <a:pPr marL="457200" indent="-457200">
+              <a:buFont typeface="+mj-lt"/>
+              <a:buAutoNum type="arabicPeriod"/>
+            </a:pPr>
+            <a:r>
+              <a:rPr lang="en-US" sz="2000" dirty="0"/>
+              <a:t>Implement code that responds to of events including: clicking the mouse, moving or dragging the mouse, and typing a key on the keyboard</a:t>
+            </a:r>
+          </a:p>
+          <a:p>
+            <a:pPr marL="457200" indent="-457200">
+              <a:buFont typeface="+mj-lt"/>
+              <a:buAutoNum type="arabicPeriod"/>
+            </a:pPr>
+            <a:r>
+              <a:rPr lang="en-US" sz="2000" dirty="0"/>
+              <a:t>Design multiple intuitive ways for a user to perform a particular task</a:t>
+            </a:r>
+          </a:p>
+          <a:p>
+            <a:pPr marL="457200" indent="-457200">
+              <a:buFont typeface="+mj-lt"/>
+              <a:buAutoNum type="arabicPeriod"/>
+            </a:pPr>
+            <a:r>
+              <a:rPr lang="en-US" sz="2000" dirty="0"/>
+              <a:t>Implement animation using a timer and a corresponding event handler</a:t>
+            </a:r>
+          </a:p>
+          <a:p>
+            <a:pPr marL="457200" indent="-457200">
+              <a:buFont typeface="+mj-lt"/>
+              <a:buAutoNum type="arabicPeriod"/>
+            </a:pPr>
+            <a:r>
+              <a:rPr lang="en-US" sz="2000" dirty="0"/>
+              <a:t>Create interactive applications that adhere to the Model-View-Controller pattern</a:t>
+            </a:r>
+          </a:p>
+          <a:p>
+            <a:pPr marL="457200" indent="-457200">
+              <a:buFont typeface="+mj-lt"/>
+              <a:buAutoNum type="arabicPeriod"/>
+            </a:pPr>
+            <a:r>
+              <a:rPr lang="en-US" sz="2000" dirty="0"/>
+              <a:t>Understand how Java achieves speedier input and output (IO) through a hierarchy file IO classes</a:t>
+            </a:r>
+          </a:p>
+          <a:p>
+            <a:pPr marL="457200" indent="-457200">
+              <a:buFont typeface="+mj-lt"/>
+              <a:buAutoNum type="arabicPeriod"/>
+            </a:pPr>
+            <a:r>
+              <a:rPr lang="en-US" sz="2000" dirty="0"/>
+              <a:t>Design and implement a controller class that outputs data to a text file</a:t>
+            </a:r>
+          </a:p>
+          <a:p>
+            <a:pPr marL="457200" indent="-457200">
+              <a:buFont typeface="+mj-lt"/>
+              <a:buAutoNum type="arabicPeriod"/>
+            </a:pPr>
+            <a:r>
+              <a:rPr lang="en-US" sz="2000" dirty="0"/>
+              <a:t>Design and implement a controller class that inputs data from a text file and builds a collection of objects from the data read data</a:t>
+            </a:r>
+          </a:p>
+        </p:txBody>
+      </p:sp>
+    </p:spTree>
+    <p:extLst>
+      <p:ext uri="{BB962C8B-B14F-4D97-AF65-F5344CB8AC3E}">
+        <p14:creationId xmlns:p14="http://schemas.microsoft.com/office/powerpoint/2010/main" val="3325651023"/>
+      </p:ext>
+    </p:extLst>
+  </p:cSld>
+  <p:clrMapOvr>
+    <a:masterClrMapping/>
+  </p:clrMapOvr>
+</p:sld>
+</file>
+
+<file path=ppt/slides/slide27.xml><?xml version="1.0" encoding="utf-8"?>
+<p:sld xmlns:a="http://schemas.openxmlformats.org/drawingml/2006/main" xmlns:r="http://schemas.openxmlformats.org/officeDocument/2006/relationships" xmlns:p="http://schemas.openxmlformats.org/presentationml/2006/main">
+  <p:cSld>
+    <p:spTree>
+      <p:nvGrpSpPr>
+        <p:cNvPr id="1" name=""/>
+        <p:cNvGrpSpPr/>
+        <p:nvPr/>
+      </p:nvGrpSpPr>
+      <p:grpSpPr>
+        <a:xfrm>
+          <a:off x="0" y="0"/>
+          <a:ext cx="0" cy="0"/>
+          <a:chOff x="0" y="0"/>
+          <a:chExt cx="0" cy="0"/>
+        </a:xfrm>
+      </p:grpSpPr>
+      <p:sp>
+        <p:nvSpPr>
+          <p:cNvPr id="2" name="Title 1"/>
+          <p:cNvSpPr>
+            <a:spLocks noGrp="1"/>
+          </p:cNvSpPr>
+          <p:nvPr>
+            <p:ph type="title"/>
+          </p:nvPr>
+        </p:nvSpPr>
+        <p:spPr>
+          <a:xfrm>
+            <a:off x="838200" y="365126"/>
+            <a:ext cx="10515600" cy="757272"/>
+          </a:xfrm>
+        </p:spPr>
+        <p:txBody>
+          <a:bodyPr>
+            <a:normAutofit/>
+          </a:bodyPr>
+          <a:lstStyle/>
+          <a:p>
+            <a:r>
+              <a:rPr lang="en-US" sz="3600" dirty="0"/>
+              <a:t>Learning Objectives – Week 4</a:t>
+            </a:r>
+            <a:endParaRPr lang="en-US" sz="3600" b="1" i="1" u="sng" dirty="0"/>
+          </a:p>
+        </p:txBody>
+      </p:sp>
+      <p:sp>
+        <p:nvSpPr>
+          <p:cNvPr id="3" name="Content Placeholder 2"/>
+          <p:cNvSpPr>
+            <a:spLocks noGrp="1"/>
+          </p:cNvSpPr>
+          <p:nvPr>
+            <p:ph idx="1"/>
+          </p:nvPr>
+        </p:nvSpPr>
+        <p:spPr>
+          <a:xfrm>
+            <a:off x="838200" y="1122398"/>
+            <a:ext cx="10718950" cy="5463343"/>
+          </a:xfrm>
+        </p:spPr>
+        <p:txBody>
+          <a:bodyPr>
+            <a:normAutofit/>
+          </a:bodyPr>
+          <a:lstStyle/>
+          <a:p>
+            <a:pPr marL="457200" indent="-457200">
+              <a:buFont typeface="+mj-lt"/>
+              <a:buAutoNum type="arabicPeriod"/>
+            </a:pPr>
+            <a:r>
+              <a:rPr lang="en-US" sz="2000" dirty="0">
+                <a:solidFill>
+                  <a:schemeClr val="bg1">
+                    <a:lumMod val="65000"/>
+                  </a:schemeClr>
+                </a:solidFill>
+              </a:rPr>
+              <a:t>Implement a menu system that enables the user to trigger a variety of actions in a familiar way</a:t>
+            </a:r>
+          </a:p>
+          <a:p>
+            <a:pPr marL="457200" indent="-457200">
+              <a:buFont typeface="+mj-lt"/>
+              <a:buAutoNum type="arabicPeriod"/>
+            </a:pPr>
+            <a:r>
+              <a:rPr lang="en-US" sz="2000" dirty="0">
+                <a:solidFill>
+                  <a:schemeClr val="bg1">
+                    <a:lumMod val="65000"/>
+                  </a:schemeClr>
+                </a:solidFill>
+              </a:rPr>
+              <a:t>Implement code that responds to of events including: </a:t>
+            </a:r>
+            <a:r>
+              <a:rPr lang="en-US" sz="2000" dirty="0"/>
+              <a:t>clicking the mouse, moving </a:t>
+            </a:r>
+            <a:r>
+              <a:rPr lang="en-US" sz="2000" dirty="0">
+                <a:solidFill>
+                  <a:schemeClr val="bg1">
+                    <a:lumMod val="65000"/>
+                  </a:schemeClr>
+                </a:solidFill>
+              </a:rPr>
+              <a:t>or dragging the mouse, and typing a key on the keyboard</a:t>
+            </a:r>
+          </a:p>
+          <a:p>
+            <a:pPr marL="457200" indent="-457200">
+              <a:buFont typeface="+mj-lt"/>
+              <a:buAutoNum type="arabicPeriod"/>
+            </a:pPr>
+            <a:r>
+              <a:rPr lang="en-US" sz="2000" dirty="0">
+                <a:solidFill>
+                  <a:schemeClr val="bg1">
+                    <a:lumMod val="65000"/>
+                  </a:schemeClr>
+                </a:solidFill>
+              </a:rPr>
+              <a:t>Design multiple intuitive ways for a user to perform a particular task</a:t>
+            </a:r>
+          </a:p>
+          <a:p>
+            <a:pPr marL="457200" indent="-457200">
+              <a:buFont typeface="+mj-lt"/>
+              <a:buAutoNum type="arabicPeriod"/>
+            </a:pPr>
+            <a:r>
+              <a:rPr lang="en-US" sz="2000" dirty="0"/>
+              <a:t>Implement animation using a timer and a corresponding event handler</a:t>
+            </a:r>
+          </a:p>
+          <a:p>
+            <a:pPr marL="457200" indent="-457200">
+              <a:buFont typeface="+mj-lt"/>
+              <a:buAutoNum type="arabicPeriod"/>
+            </a:pPr>
+            <a:r>
+              <a:rPr lang="en-US" sz="2000" dirty="0">
+                <a:solidFill>
+                  <a:schemeClr val="bg1">
+                    <a:lumMod val="65000"/>
+                  </a:schemeClr>
+                </a:solidFill>
+              </a:rPr>
+              <a:t>Create interactive applications that adhere to the Model-View-Controller pattern</a:t>
+            </a:r>
+          </a:p>
+          <a:p>
+            <a:pPr marL="457200" indent="-457200">
+              <a:buFont typeface="+mj-lt"/>
+              <a:buAutoNum type="arabicPeriod"/>
+            </a:pPr>
+            <a:r>
+              <a:rPr lang="en-US" sz="2000" dirty="0">
+                <a:solidFill>
+                  <a:schemeClr val="bg1">
+                    <a:lumMod val="65000"/>
+                  </a:schemeClr>
+                </a:solidFill>
+              </a:rPr>
+              <a:t>Understand how Java achieves speedier input and output (IO) through a hierarchy file IO classes</a:t>
+            </a:r>
+          </a:p>
+          <a:p>
+            <a:pPr marL="457200" indent="-457200">
+              <a:buFont typeface="+mj-lt"/>
+              <a:buAutoNum type="arabicPeriod"/>
+            </a:pPr>
+            <a:r>
+              <a:rPr lang="en-US" sz="2000" dirty="0">
+                <a:solidFill>
+                  <a:schemeClr val="bg1">
+                    <a:lumMod val="65000"/>
+                  </a:schemeClr>
+                </a:solidFill>
+              </a:rPr>
+              <a:t>Design and implement a controller class that outputs data to a text file</a:t>
+            </a:r>
+          </a:p>
+          <a:p>
+            <a:pPr marL="457200" indent="-457200">
+              <a:buFont typeface="+mj-lt"/>
+              <a:buAutoNum type="arabicPeriod"/>
+            </a:pPr>
+            <a:r>
+              <a:rPr lang="en-US" sz="2000" dirty="0">
+                <a:solidFill>
+                  <a:schemeClr val="bg1">
+                    <a:lumMod val="65000"/>
+                  </a:schemeClr>
+                </a:solidFill>
+              </a:rPr>
+              <a:t>Design and implement a controller class that inputs data from a text file and builds a collection of objects from the data read data</a:t>
+            </a:r>
+          </a:p>
+          <a:p>
+            <a:pPr marL="457200" indent="-457200">
+              <a:buFont typeface="+mj-lt"/>
+              <a:buAutoNum type="arabicPeriod"/>
+            </a:pPr>
+            <a:r>
+              <a:rPr lang="en-US" sz="2000" dirty="0"/>
+              <a:t>Review week 4 assignment as time allows</a:t>
+            </a:r>
+          </a:p>
+        </p:txBody>
+      </p:sp>
+    </p:spTree>
+    <p:extLst>
+      <p:ext uri="{BB962C8B-B14F-4D97-AF65-F5344CB8AC3E}">
+        <p14:creationId xmlns:p14="http://schemas.microsoft.com/office/powerpoint/2010/main" val="1999878722"/>
+      </p:ext>
+    </p:extLst>
+  </p:cSld>
+  <p:clrMapOvr>
+    <a:masterClrMapping/>
+  </p:clrMapOvr>
+</p:sld>
+</file>
+
+<file path=ppt/slides/slide28.xml><?xml version="1.0" encoding="utf-8"?>
+<p:sld xmlns:a="http://schemas.openxmlformats.org/drawingml/2006/main" xmlns:r="http://schemas.openxmlformats.org/officeDocument/2006/relationships" xmlns:p="http://schemas.openxmlformats.org/presentationml/2006/main">
+  <p:cSld>
+    <p:spTree>
+      <p:nvGrpSpPr>
+        <p:cNvPr id="1" name=""/>
+        <p:cNvGrpSpPr/>
+        <p:nvPr/>
+      </p:nvGrpSpPr>
+      <p:grpSpPr>
+        <a:xfrm>
+          <a:off x="0" y="0"/>
+          <a:ext cx="0" cy="0"/>
+          <a:chOff x="0" y="0"/>
+          <a:chExt cx="0" cy="0"/>
+        </a:xfrm>
+      </p:grpSpPr>
+      <p:sp>
+        <p:nvSpPr>
+          <p:cNvPr id="2" name="Title 1"/>
+          <p:cNvSpPr>
+            <a:spLocks noGrp="1"/>
+          </p:cNvSpPr>
+          <p:nvPr>
+            <p:ph type="title"/>
+          </p:nvPr>
+        </p:nvSpPr>
+        <p:spPr/>
+        <p:txBody>
+          <a:bodyPr>
+            <a:normAutofit/>
+          </a:bodyPr>
+          <a:lstStyle/>
+          <a:p>
+            <a:r>
+              <a:rPr lang="en-US" sz="3600" dirty="0"/>
+              <a:t>Mouse Clicking, Mouse Dragging, and Keystrokes</a:t>
+            </a:r>
+          </a:p>
+        </p:txBody>
+      </p:sp>
+      <p:sp>
+        <p:nvSpPr>
+          <p:cNvPr id="3" name="Content Placeholder 2"/>
+          <p:cNvSpPr>
+            <a:spLocks noGrp="1"/>
+          </p:cNvSpPr>
+          <p:nvPr>
+            <p:ph idx="1"/>
+          </p:nvPr>
+        </p:nvSpPr>
+        <p:spPr>
+          <a:xfrm>
+            <a:off x="838198" y="1525772"/>
+            <a:ext cx="10515601" cy="4651191"/>
+          </a:xfrm>
+        </p:spPr>
+        <p:txBody>
+          <a:bodyPr>
+            <a:normAutofit/>
+          </a:bodyPr>
+          <a:lstStyle/>
+          <a:p>
+            <a:pPr marL="0" indent="0">
+              <a:buNone/>
+            </a:pPr>
+            <a:r>
+              <a:rPr lang="en-US" sz="2000" dirty="0"/>
+              <a:t>Nearly all graphical applications respond to Mouse Clicking and Keystrokes. Many applications also implement special behavior for Mouse Dragging. With Java in order to respond to these events we implement ActionListeners including:</a:t>
+            </a:r>
+          </a:p>
+          <a:p>
+            <a:r>
+              <a:rPr lang="en-US" sz="2000" b="1" dirty="0"/>
+              <a:t>MouseListener: </a:t>
+            </a:r>
+            <a:r>
+              <a:rPr lang="en-US" sz="2000" dirty="0"/>
+              <a:t>Interface to implement to respond to Mouse Clicking</a:t>
+            </a:r>
+          </a:p>
+          <a:p>
+            <a:r>
+              <a:rPr lang="en-US" sz="2000" b="1" dirty="0"/>
+              <a:t>MouseMotionListener</a:t>
+            </a:r>
+            <a:r>
+              <a:rPr lang="en-US" sz="2000" dirty="0"/>
+              <a:t>: Interface to implement to respond to Mouse Dragging</a:t>
+            </a:r>
+          </a:p>
+          <a:p>
+            <a:r>
+              <a:rPr lang="en-US" sz="2000" b="1" dirty="0">
+                <a:solidFill>
+                  <a:schemeClr val="bg1">
+                    <a:lumMod val="65000"/>
+                  </a:schemeClr>
+                </a:solidFill>
+              </a:rPr>
+              <a:t>KeyListener: </a:t>
+            </a:r>
+            <a:r>
+              <a:rPr lang="en-US" sz="2000" dirty="0">
+                <a:solidFill>
+                  <a:schemeClr val="bg1">
+                    <a:lumMod val="65000"/>
+                  </a:schemeClr>
+                </a:solidFill>
+              </a:rPr>
+              <a:t>Interface to implement to respond to Keystrokes</a:t>
+            </a:r>
+          </a:p>
+        </p:txBody>
+      </p:sp>
+    </p:spTree>
+    <p:extLst>
+      <p:ext uri="{BB962C8B-B14F-4D97-AF65-F5344CB8AC3E}">
+        <p14:creationId xmlns:p14="http://schemas.microsoft.com/office/powerpoint/2010/main" val="2482432935"/>
+      </p:ext>
+    </p:extLst>
+  </p:cSld>
+  <p:clrMapOvr>
+    <a:masterClrMapping/>
+  </p:clrMapOvr>
+</p:sld>
+</file>
+
+<file path=ppt/slides/slide29.xml><?xml version="1.0" encoding="utf-8"?>
+<p:sld xmlns:a="http://schemas.openxmlformats.org/drawingml/2006/main" xmlns:r="http://schemas.openxmlformats.org/officeDocument/2006/relationships" xmlns:p="http://schemas.openxmlformats.org/presentationml/2006/main">
+  <p:cSld>
+    <p:spTree>
+      <p:nvGrpSpPr>
+        <p:cNvPr id="1" name=""/>
+        <p:cNvGrpSpPr/>
+        <p:nvPr/>
+      </p:nvGrpSpPr>
+      <p:grpSpPr>
+        <a:xfrm>
+          <a:off x="0" y="0"/>
+          <a:ext cx="0" cy="0"/>
+          <a:chOff x="0" y="0"/>
+          <a:chExt cx="0" cy="0"/>
+        </a:xfrm>
+      </p:grpSpPr>
+      <p:sp>
+        <p:nvSpPr>
+          <p:cNvPr id="2" name="Title 1"/>
+          <p:cNvSpPr>
+            <a:spLocks noGrp="1"/>
+          </p:cNvSpPr>
+          <p:nvPr>
+            <p:ph type="title"/>
+          </p:nvPr>
+        </p:nvSpPr>
+        <p:spPr/>
+        <p:txBody>
+          <a:bodyPr>
+            <a:normAutofit/>
+          </a:bodyPr>
+          <a:lstStyle/>
+          <a:p>
+            <a:r>
+              <a:rPr lang="en-US" sz="3600" dirty="0"/>
+              <a:t>MouseListener Interface</a:t>
+            </a:r>
+          </a:p>
+        </p:txBody>
+      </p:sp>
+      <p:sp>
+        <p:nvSpPr>
+          <p:cNvPr id="3" name="Content Placeholder 2"/>
+          <p:cNvSpPr>
+            <a:spLocks noGrp="1"/>
+          </p:cNvSpPr>
+          <p:nvPr>
+            <p:ph idx="1"/>
+          </p:nvPr>
+        </p:nvSpPr>
+        <p:spPr>
+          <a:xfrm>
+            <a:off x="838198" y="1525772"/>
+            <a:ext cx="10515601" cy="4651191"/>
+          </a:xfrm>
+        </p:spPr>
+        <p:txBody>
+          <a:bodyPr>
+            <a:normAutofit/>
+          </a:bodyPr>
+          <a:lstStyle/>
+          <a:p>
+            <a:pPr marL="0" indent="0">
+              <a:buNone/>
+            </a:pPr>
+            <a:r>
+              <a:rPr lang="en-US" sz="2000" dirty="0"/>
+              <a:t>The MouseListener interface requires five methods to be implemented:</a:t>
+            </a:r>
+            <a:endParaRPr lang="en-US" sz="2000" b="1" dirty="0"/>
+          </a:p>
+          <a:p>
+            <a:r>
+              <a:rPr lang="en-US" sz="2000" dirty="0"/>
+              <a:t>mouseClicked(MouseEvent e): Invoked when the mouse button has been clicked on a component</a:t>
+            </a:r>
+          </a:p>
+          <a:p>
+            <a:r>
+              <a:rPr lang="en-US" sz="2000" dirty="0"/>
+              <a:t>mouseEntered(MouseEvent e): Invoked when the mouse enters a component</a:t>
+            </a:r>
+          </a:p>
+          <a:p>
+            <a:r>
+              <a:rPr lang="en-US" sz="2000" dirty="0"/>
+              <a:t>mouseExited(MouseEvent e): Invoked when the mouse exits a component</a:t>
+            </a:r>
+          </a:p>
+          <a:p>
+            <a:r>
+              <a:rPr lang="en-US" sz="2000" dirty="0"/>
+              <a:t>mousePressed(MouseEvent e): Invoked when a mouse button has been pressed on a component</a:t>
+            </a:r>
+          </a:p>
+          <a:p>
+            <a:r>
+              <a:rPr lang="en-US" sz="2000" dirty="0"/>
+              <a:t>mouseReleased(MouseEvent e): Invoked when a mouse button has been released on a component</a:t>
+            </a:r>
+          </a:p>
+        </p:txBody>
+      </p:sp>
+    </p:spTree>
+    <p:extLst>
+      <p:ext uri="{BB962C8B-B14F-4D97-AF65-F5344CB8AC3E}">
+        <p14:creationId xmlns:p14="http://schemas.microsoft.com/office/powerpoint/2010/main" val="1339780233"/>
+      </p:ext>
+    </p:extLst>
+  </p:cSld>
+  <p:clrMapOvr>
+    <a:masterClrMapping/>
+  </p:clrMapOvr>
+</p:sld>
+</file>
+
 <file path=ppt/slides/slide3.xml><?xml version="1.0" encoding="utf-8"?>
 <p:sld xmlns:a="http://schemas.openxmlformats.org/drawingml/2006/main" xmlns:r="http://schemas.openxmlformats.org/officeDocument/2006/relationships" xmlns:p="http://schemas.openxmlformats.org/presentationml/2006/main">
   <p:cSld>
@@ -8097,6 +11213,1286 @@
     <p:extLst>
       <p:ext uri="{BB962C8B-B14F-4D97-AF65-F5344CB8AC3E}">
         <p14:creationId xmlns:p14="http://schemas.microsoft.com/office/powerpoint/2010/main" val="1448381274"/>
+      </p:ext>
+    </p:extLst>
+  </p:cSld>
+  <p:clrMapOvr>
+    <a:masterClrMapping/>
+  </p:clrMapOvr>
+</p:sld>
+</file>
+
+<file path=ppt/slides/slide30.xml><?xml version="1.0" encoding="utf-8"?>
+<p:sld xmlns:a="http://schemas.openxmlformats.org/drawingml/2006/main" xmlns:r="http://schemas.openxmlformats.org/officeDocument/2006/relationships" xmlns:p="http://schemas.openxmlformats.org/presentationml/2006/main">
+  <p:cSld>
+    <p:spTree>
+      <p:nvGrpSpPr>
+        <p:cNvPr id="1" name=""/>
+        <p:cNvGrpSpPr/>
+        <p:nvPr/>
+      </p:nvGrpSpPr>
+      <p:grpSpPr>
+        <a:xfrm>
+          <a:off x="0" y="0"/>
+          <a:ext cx="0" cy="0"/>
+          <a:chOff x="0" y="0"/>
+          <a:chExt cx="0" cy="0"/>
+        </a:xfrm>
+      </p:grpSpPr>
+      <p:sp>
+        <p:nvSpPr>
+          <p:cNvPr id="2" name="Title 1"/>
+          <p:cNvSpPr>
+            <a:spLocks noGrp="1"/>
+          </p:cNvSpPr>
+          <p:nvPr>
+            <p:ph type="title"/>
+          </p:nvPr>
+        </p:nvSpPr>
+        <p:spPr/>
+        <p:txBody>
+          <a:bodyPr>
+            <a:normAutofit/>
+          </a:bodyPr>
+          <a:lstStyle/>
+          <a:p>
+            <a:r>
+              <a:rPr lang="en-US" sz="3600" dirty="0"/>
+              <a:t>MouseMotionListener Interface</a:t>
+            </a:r>
+          </a:p>
+        </p:txBody>
+      </p:sp>
+      <p:sp>
+        <p:nvSpPr>
+          <p:cNvPr id="3" name="Content Placeholder 2"/>
+          <p:cNvSpPr>
+            <a:spLocks noGrp="1"/>
+          </p:cNvSpPr>
+          <p:nvPr>
+            <p:ph idx="1"/>
+          </p:nvPr>
+        </p:nvSpPr>
+        <p:spPr>
+          <a:xfrm>
+            <a:off x="838198" y="1525772"/>
+            <a:ext cx="10515601" cy="4651191"/>
+          </a:xfrm>
+        </p:spPr>
+        <p:txBody>
+          <a:bodyPr>
+            <a:normAutofit/>
+          </a:bodyPr>
+          <a:lstStyle/>
+          <a:p>
+            <a:pPr marL="0" indent="0">
+              <a:buNone/>
+            </a:pPr>
+            <a:r>
+              <a:rPr lang="en-US" sz="2000" dirty="0"/>
+              <a:t>The MouseMotionListener interface includes the following methods:</a:t>
+            </a:r>
+            <a:endParaRPr lang="en-US" sz="2000" b="1" dirty="0"/>
+          </a:p>
+          <a:p>
+            <a:r>
+              <a:rPr lang="en-US" sz="2000" dirty="0"/>
+              <a:t>mouseDragged(MouseEvent e): Invoked when a mouse button is pressed on a component and then dragged</a:t>
+            </a:r>
+          </a:p>
+          <a:p>
+            <a:r>
+              <a:rPr lang="en-US" sz="2000" dirty="0"/>
+              <a:t>mouseMoved(MouseEvent e): Invoked when the mouse cursor has been moved onto a component but no buttons have been pushed</a:t>
+            </a:r>
+          </a:p>
+        </p:txBody>
+      </p:sp>
+    </p:spTree>
+    <p:extLst>
+      <p:ext uri="{BB962C8B-B14F-4D97-AF65-F5344CB8AC3E}">
+        <p14:creationId xmlns:p14="http://schemas.microsoft.com/office/powerpoint/2010/main" val="3095009751"/>
+      </p:ext>
+    </p:extLst>
+  </p:cSld>
+  <p:clrMapOvr>
+    <a:masterClrMapping/>
+  </p:clrMapOvr>
+</p:sld>
+</file>
+
+<file path=ppt/slides/slide31.xml><?xml version="1.0" encoding="utf-8"?>
+<p:sld xmlns:a="http://schemas.openxmlformats.org/drawingml/2006/main" xmlns:r="http://schemas.openxmlformats.org/officeDocument/2006/relationships" xmlns:p="http://schemas.openxmlformats.org/presentationml/2006/main">
+  <p:cSld>
+    <p:spTree>
+      <p:nvGrpSpPr>
+        <p:cNvPr id="1" name=""/>
+        <p:cNvGrpSpPr/>
+        <p:nvPr/>
+      </p:nvGrpSpPr>
+      <p:grpSpPr>
+        <a:xfrm>
+          <a:off x="0" y="0"/>
+          <a:ext cx="0" cy="0"/>
+          <a:chOff x="0" y="0"/>
+          <a:chExt cx="0" cy="0"/>
+        </a:xfrm>
+      </p:grpSpPr>
+      <p:pic>
+        <p:nvPicPr>
+          <p:cNvPr id="3" name="Picture 2"/>
+          <p:cNvPicPr>
+            <a:picLocks noChangeAspect="1"/>
+          </p:cNvPicPr>
+          <p:nvPr/>
+        </p:nvPicPr>
+        <p:blipFill>
+          <a:blip r:embed="rId3"/>
+          <a:stretch>
+            <a:fillRect/>
+          </a:stretch>
+        </p:blipFill>
+        <p:spPr>
+          <a:xfrm>
+            <a:off x="838201" y="1441487"/>
+            <a:ext cx="5562600" cy="3729551"/>
+          </a:xfrm>
+          <a:prstGeom prst="rect">
+            <a:avLst/>
+          </a:prstGeom>
+        </p:spPr>
+      </p:pic>
+      <p:sp>
+        <p:nvSpPr>
+          <p:cNvPr id="2" name="Title 1"/>
+          <p:cNvSpPr>
+            <a:spLocks noGrp="1"/>
+          </p:cNvSpPr>
+          <p:nvPr>
+            <p:ph type="title"/>
+          </p:nvPr>
+        </p:nvSpPr>
+        <p:spPr/>
+        <p:txBody>
+          <a:bodyPr>
+            <a:normAutofit/>
+          </a:bodyPr>
+          <a:lstStyle/>
+          <a:p>
+            <a:r>
+              <a:rPr lang="en-US" sz="3600" dirty="0"/>
+              <a:t>OvalDraw Plus With Clicking and Dragging </a:t>
+            </a:r>
+          </a:p>
+        </p:txBody>
+      </p:sp>
+      <p:pic>
+        <p:nvPicPr>
+          <p:cNvPr id="4" name="Picture 3"/>
+          <p:cNvPicPr>
+            <a:picLocks noChangeAspect="1"/>
+          </p:cNvPicPr>
+          <p:nvPr/>
+        </p:nvPicPr>
+        <p:blipFill>
+          <a:blip r:embed="rId4"/>
+          <a:stretch>
+            <a:fillRect/>
+          </a:stretch>
+        </p:blipFill>
+        <p:spPr>
+          <a:xfrm>
+            <a:off x="5462855" y="2184990"/>
+            <a:ext cx="6169163" cy="4214733"/>
+          </a:xfrm>
+          <a:prstGeom prst="rect">
+            <a:avLst/>
+          </a:prstGeom>
+        </p:spPr>
+      </p:pic>
+    </p:spTree>
+    <p:extLst>
+      <p:ext uri="{BB962C8B-B14F-4D97-AF65-F5344CB8AC3E}">
+        <p14:creationId xmlns:p14="http://schemas.microsoft.com/office/powerpoint/2010/main" val="3913126346"/>
+      </p:ext>
+    </p:extLst>
+  </p:cSld>
+  <p:clrMapOvr>
+    <a:masterClrMapping/>
+  </p:clrMapOvr>
+</p:sld>
+</file>
+
+<file path=ppt/slides/slide32.xml><?xml version="1.0" encoding="utf-8"?>
+<p:sld xmlns:a="http://schemas.openxmlformats.org/drawingml/2006/main" xmlns:r="http://schemas.openxmlformats.org/officeDocument/2006/relationships" xmlns:p="http://schemas.openxmlformats.org/presentationml/2006/main">
+  <p:cSld>
+    <p:spTree>
+      <p:nvGrpSpPr>
+        <p:cNvPr id="1" name=""/>
+        <p:cNvGrpSpPr/>
+        <p:nvPr/>
+      </p:nvGrpSpPr>
+      <p:grpSpPr>
+        <a:xfrm>
+          <a:off x="0" y="0"/>
+          <a:ext cx="0" cy="0"/>
+          <a:chOff x="0" y="0"/>
+          <a:chExt cx="0" cy="0"/>
+        </a:xfrm>
+      </p:grpSpPr>
+      <p:sp>
+        <p:nvSpPr>
+          <p:cNvPr id="2" name="Title 1"/>
+          <p:cNvSpPr>
+            <a:spLocks noGrp="1"/>
+          </p:cNvSpPr>
+          <p:nvPr>
+            <p:ph type="title"/>
+          </p:nvPr>
+        </p:nvSpPr>
+        <p:spPr>
+          <a:xfrm>
+            <a:off x="838200" y="365126"/>
+            <a:ext cx="10515600" cy="757272"/>
+          </a:xfrm>
+        </p:spPr>
+        <p:txBody>
+          <a:bodyPr>
+            <a:normAutofit/>
+          </a:bodyPr>
+          <a:lstStyle/>
+          <a:p>
+            <a:r>
+              <a:rPr lang="en-US" sz="3600" dirty="0" err="1"/>
+              <a:t>OvalDraw</a:t>
+            </a:r>
+            <a:r>
+              <a:rPr lang="en-US" sz="3600" dirty="0"/>
+              <a:t> Plus Enhancements Steps</a:t>
+            </a:r>
+            <a:endParaRPr lang="en-US" sz="3600" b="1" i="1" u="sng" dirty="0"/>
+          </a:p>
+        </p:txBody>
+      </p:sp>
+      <p:sp>
+        <p:nvSpPr>
+          <p:cNvPr id="3" name="Content Placeholder 2"/>
+          <p:cNvSpPr>
+            <a:spLocks noGrp="1"/>
+          </p:cNvSpPr>
+          <p:nvPr>
+            <p:ph idx="1"/>
+          </p:nvPr>
+        </p:nvSpPr>
+        <p:spPr>
+          <a:xfrm>
+            <a:off x="838200" y="1122398"/>
+            <a:ext cx="10718950" cy="5463343"/>
+          </a:xfrm>
+        </p:spPr>
+        <p:txBody>
+          <a:bodyPr>
+            <a:normAutofit/>
+          </a:bodyPr>
+          <a:lstStyle/>
+          <a:p>
+            <a:pPr marL="457200" indent="-457200">
+              <a:buFont typeface="+mj-lt"/>
+              <a:buAutoNum type="arabicPeriod"/>
+            </a:pPr>
+            <a:r>
+              <a:rPr lang="en-US" sz="2000" dirty="0">
+                <a:solidFill>
+                  <a:schemeClr val="bg1">
+                    <a:lumMod val="65000"/>
+                  </a:schemeClr>
+                </a:solidFill>
+              </a:rPr>
+              <a:t>Clone our current </a:t>
+            </a:r>
+            <a:r>
+              <a:rPr lang="en-US" sz="2000" dirty="0" err="1">
+                <a:solidFill>
+                  <a:schemeClr val="bg1">
+                    <a:lumMod val="65000"/>
+                  </a:schemeClr>
+                </a:solidFill>
+              </a:rPr>
+              <a:t>Git</a:t>
+            </a:r>
+            <a:r>
+              <a:rPr lang="en-US" sz="2000" dirty="0">
+                <a:solidFill>
+                  <a:schemeClr val="bg1">
+                    <a:lumMod val="65000"/>
+                  </a:schemeClr>
+                </a:solidFill>
+              </a:rPr>
+              <a:t> repository</a:t>
+            </a:r>
+          </a:p>
+          <a:p>
+            <a:pPr marL="457200" indent="-457200">
+              <a:buFont typeface="+mj-lt"/>
+              <a:buAutoNum type="arabicPeriod"/>
+            </a:pPr>
+            <a:r>
+              <a:rPr lang="en-US" sz="2000" dirty="0">
+                <a:solidFill>
+                  <a:schemeClr val="bg1">
+                    <a:lumMod val="65000"/>
+                  </a:schemeClr>
+                </a:solidFill>
+              </a:rPr>
+              <a:t>Copy original files over to </a:t>
+            </a:r>
+            <a:r>
+              <a:rPr lang="en-US" sz="2000" dirty="0" err="1">
+                <a:solidFill>
+                  <a:schemeClr val="bg1">
+                    <a:lumMod val="65000"/>
+                  </a:schemeClr>
+                </a:solidFill>
+              </a:rPr>
+              <a:t>OvalDrawPlus</a:t>
+            </a:r>
+            <a:r>
+              <a:rPr lang="en-US" sz="2000" dirty="0">
+                <a:solidFill>
+                  <a:schemeClr val="bg1">
+                    <a:lumMod val="65000"/>
+                  </a:schemeClr>
+                </a:solidFill>
+              </a:rPr>
+              <a:t> folder</a:t>
+            </a:r>
+          </a:p>
+          <a:p>
+            <a:pPr marL="457200" indent="-457200">
+              <a:buFont typeface="+mj-lt"/>
+              <a:buAutoNum type="arabicPeriod"/>
+            </a:pPr>
+            <a:r>
+              <a:rPr lang="en-US" sz="2000" dirty="0"/>
+              <a:t>Compile library and </a:t>
+            </a:r>
+            <a:r>
+              <a:rPr lang="en-US" sz="2000" dirty="0" err="1"/>
+              <a:t>ShapeDraw</a:t>
+            </a:r>
+            <a:r>
+              <a:rPr lang="en-US" sz="2000" dirty="0"/>
+              <a:t> code</a:t>
+            </a:r>
+          </a:p>
+          <a:p>
+            <a:pPr marL="457200" indent="-457200">
+              <a:buFont typeface="+mj-lt"/>
+              <a:buAutoNum type="arabicPeriod"/>
+            </a:pPr>
+            <a:r>
+              <a:rPr lang="en-US" sz="2000" dirty="0"/>
+              <a:t>Quickly test application</a:t>
+            </a:r>
+          </a:p>
+          <a:p>
+            <a:pPr marL="457200" indent="-457200">
+              <a:buFont typeface="+mj-lt"/>
+              <a:buAutoNum type="arabicPeriod"/>
+            </a:pPr>
+            <a:r>
+              <a:rPr lang="en-US" sz="2000" dirty="0"/>
+              <a:t>Review </a:t>
+            </a:r>
+            <a:r>
+              <a:rPr lang="en-US" sz="2000" dirty="0" err="1"/>
+              <a:t>ShapeDraw</a:t>
+            </a:r>
+            <a:r>
+              <a:rPr lang="en-US" sz="2000" dirty="0"/>
+              <a:t> code… focus on </a:t>
+            </a:r>
+            <a:r>
+              <a:rPr lang="en-US" sz="2000" dirty="0" err="1"/>
+              <a:t>ShapeDrawPanel</a:t>
+            </a:r>
+            <a:endParaRPr lang="en-US" sz="2000" dirty="0"/>
+          </a:p>
+          <a:p>
+            <a:pPr marL="457200" indent="-457200">
+              <a:buFont typeface="+mj-lt"/>
+              <a:buAutoNum type="arabicPeriod"/>
+            </a:pPr>
+            <a:r>
+              <a:rPr lang="en-US" sz="2000" dirty="0"/>
+              <a:t>Minor code cleanup… and “compress” classes that we will not be looking at today</a:t>
+            </a:r>
+          </a:p>
+          <a:p>
+            <a:pPr marL="457200" indent="-457200">
+              <a:buFont typeface="+mj-lt"/>
+              <a:buAutoNum type="arabicPeriod"/>
+            </a:pPr>
+            <a:r>
+              <a:rPr lang="en-US" sz="2000" dirty="0"/>
+              <a:t>Implement </a:t>
+            </a:r>
+            <a:r>
+              <a:rPr lang="en-US" sz="2000" dirty="0" err="1"/>
+              <a:t>MouseListener</a:t>
+            </a:r>
+            <a:r>
+              <a:rPr lang="en-US" sz="2000" dirty="0"/>
+              <a:t> Interface</a:t>
+            </a:r>
+          </a:p>
+          <a:p>
+            <a:pPr marL="457200" indent="-457200">
+              <a:buFont typeface="+mj-lt"/>
+              <a:buAutoNum type="arabicPeriod"/>
+            </a:pPr>
+            <a:r>
+              <a:rPr lang="en-US" sz="2000" dirty="0"/>
+              <a:t>Implement </a:t>
+            </a:r>
+            <a:r>
+              <a:rPr lang="en-US" sz="2000" dirty="0" err="1"/>
+              <a:t>MouseMotionListener</a:t>
+            </a:r>
+            <a:r>
+              <a:rPr lang="en-US" sz="2000" dirty="0"/>
+              <a:t> Interface</a:t>
+            </a:r>
+          </a:p>
+          <a:p>
+            <a:pPr marL="457200" indent="-457200">
+              <a:buFont typeface="+mj-lt"/>
+              <a:buAutoNum type="arabicPeriod"/>
+            </a:pPr>
+            <a:r>
+              <a:rPr lang="en-US" sz="2000" dirty="0"/>
+              <a:t>Add random oval on click</a:t>
+            </a:r>
+          </a:p>
+          <a:p>
+            <a:pPr marL="457200" indent="-457200">
+              <a:buFont typeface="+mj-lt"/>
+              <a:buAutoNum type="arabicPeriod"/>
+            </a:pPr>
+            <a:r>
+              <a:rPr lang="en-US" sz="2000" dirty="0"/>
+              <a:t>Implement red circle on mouse drag… this is  challenging</a:t>
+            </a:r>
+          </a:p>
+          <a:p>
+            <a:pPr marL="457200" indent="-457200">
+              <a:buFont typeface="+mj-lt"/>
+              <a:buAutoNum type="arabicPeriod"/>
+            </a:pPr>
+            <a:r>
+              <a:rPr lang="en-US" sz="2000" dirty="0"/>
+              <a:t>Implement </a:t>
+            </a:r>
+            <a:r>
+              <a:rPr lang="en-US" sz="2000" dirty="0" err="1"/>
+              <a:t>FaceDraw</a:t>
+            </a:r>
+            <a:r>
+              <a:rPr lang="en-US" sz="2000" dirty="0"/>
+              <a:t> on click… and remove step nine’s random oval draw</a:t>
+            </a:r>
+          </a:p>
+          <a:p>
+            <a:pPr marL="457200" indent="-457200">
+              <a:buFont typeface="+mj-lt"/>
+              <a:buAutoNum type="arabicPeriod"/>
+            </a:pPr>
+            <a:r>
+              <a:rPr lang="en-US" sz="2000" dirty="0"/>
+              <a:t>Review, final question, and commit/push</a:t>
+            </a:r>
+          </a:p>
+        </p:txBody>
+      </p:sp>
+    </p:spTree>
+    <p:extLst>
+      <p:ext uri="{BB962C8B-B14F-4D97-AF65-F5344CB8AC3E}">
+        <p14:creationId xmlns:p14="http://schemas.microsoft.com/office/powerpoint/2010/main" val="618162355"/>
+      </p:ext>
+    </p:extLst>
+  </p:cSld>
+  <p:clrMapOvr>
+    <a:masterClrMapping/>
+  </p:clrMapOvr>
+</p:sld>
+</file>
+
+<file path=ppt/slides/slide33.xml><?xml version="1.0" encoding="utf-8"?>
+<p:sld xmlns:a="http://schemas.openxmlformats.org/drawingml/2006/main" xmlns:r="http://schemas.openxmlformats.org/officeDocument/2006/relationships" xmlns:p="http://schemas.openxmlformats.org/presentationml/2006/main">
+  <p:cSld>
+    <p:bg>
+      <p:bgPr>
+        <a:solidFill>
+          <a:schemeClr val="bg1">
+            <a:lumMod val="75000"/>
+          </a:schemeClr>
+        </a:solidFill>
+        <a:effectLst/>
+      </p:bgPr>
+    </p:bg>
+    <p:spTree>
+      <p:nvGrpSpPr>
+        <p:cNvPr id="1" name=""/>
+        <p:cNvGrpSpPr/>
+        <p:nvPr/>
+      </p:nvGrpSpPr>
+      <p:grpSpPr>
+        <a:xfrm>
+          <a:off x="0" y="0"/>
+          <a:ext cx="0" cy="0"/>
+          <a:chOff x="0" y="0"/>
+          <a:chExt cx="0" cy="0"/>
+        </a:xfrm>
+      </p:grpSpPr>
+      <p:sp>
+        <p:nvSpPr>
+          <p:cNvPr id="2" name="Title 1"/>
+          <p:cNvSpPr>
+            <a:spLocks noGrp="1"/>
+          </p:cNvSpPr>
+          <p:nvPr>
+            <p:ph type="ctrTitle"/>
+          </p:nvPr>
+        </p:nvSpPr>
+        <p:spPr>
+          <a:xfrm>
+            <a:off x="1524000" y="1122363"/>
+            <a:ext cx="9144000" cy="2387600"/>
+          </a:xfrm>
+        </p:spPr>
+        <p:txBody>
+          <a:bodyPr>
+            <a:normAutofit/>
+          </a:bodyPr>
+          <a:lstStyle/>
+          <a:p>
+            <a:r>
+              <a:rPr lang="en-US" sz="4800" dirty="0"/>
+              <a:t>Quick Break</a:t>
+            </a:r>
+          </a:p>
+        </p:txBody>
+      </p:sp>
+      <p:sp>
+        <p:nvSpPr>
+          <p:cNvPr id="3" name="Subtitle 2"/>
+          <p:cNvSpPr>
+            <a:spLocks noGrp="1"/>
+          </p:cNvSpPr>
+          <p:nvPr>
+            <p:ph type="subTitle" idx="1"/>
+          </p:nvPr>
+        </p:nvSpPr>
+        <p:spPr>
+          <a:xfrm>
+            <a:off x="1524000" y="3602038"/>
+            <a:ext cx="9144000" cy="2198022"/>
+          </a:xfrm>
+        </p:spPr>
+        <p:txBody>
+          <a:bodyPr>
+            <a:normAutofit/>
+          </a:bodyPr>
+          <a:lstStyle/>
+          <a:p>
+            <a:pPr algn="l"/>
+            <a:r>
+              <a:rPr lang="en-US" dirty="0"/>
+              <a:t>Course Number: CPSC-24500</a:t>
+            </a:r>
+          </a:p>
+          <a:p>
+            <a:pPr algn="l"/>
+            <a:r>
+              <a:rPr lang="en-US" dirty="0"/>
+              <a:t>Week: 4</a:t>
+            </a:r>
+          </a:p>
+          <a:p>
+            <a:pPr algn="l"/>
+            <a:r>
+              <a:rPr lang="en-US" dirty="0"/>
+              <a:t>Session: 3</a:t>
+            </a:r>
+          </a:p>
+          <a:p>
+            <a:pPr algn="l"/>
+            <a:r>
+              <a:rPr lang="en-US" dirty="0"/>
+              <a:t>Instructor: Eric Pogue</a:t>
+            </a:r>
+          </a:p>
+        </p:txBody>
+      </p:sp>
+    </p:spTree>
+    <p:extLst>
+      <p:ext uri="{BB962C8B-B14F-4D97-AF65-F5344CB8AC3E}">
+        <p14:creationId xmlns:p14="http://schemas.microsoft.com/office/powerpoint/2010/main" val="4213124879"/>
+      </p:ext>
+    </p:extLst>
+  </p:cSld>
+  <p:clrMapOvr>
+    <a:masterClrMapping/>
+  </p:clrMapOvr>
+</p:sld>
+</file>
+
+<file path=ppt/slides/slide34.xml><?xml version="1.0" encoding="utf-8"?>
+<p:sld xmlns:a="http://schemas.openxmlformats.org/drawingml/2006/main" xmlns:r="http://schemas.openxmlformats.org/officeDocument/2006/relationships" xmlns:p="http://schemas.openxmlformats.org/presentationml/2006/main">
+  <p:cSld>
+    <p:spTree>
+      <p:nvGrpSpPr>
+        <p:cNvPr id="1" name=""/>
+        <p:cNvGrpSpPr/>
+        <p:nvPr/>
+      </p:nvGrpSpPr>
+      <p:grpSpPr>
+        <a:xfrm>
+          <a:off x="0" y="0"/>
+          <a:ext cx="0" cy="0"/>
+          <a:chOff x="0" y="0"/>
+          <a:chExt cx="0" cy="0"/>
+        </a:xfrm>
+      </p:grpSpPr>
+      <p:sp>
+        <p:nvSpPr>
+          <p:cNvPr id="2" name="Title 1"/>
+          <p:cNvSpPr>
+            <a:spLocks noGrp="1"/>
+          </p:cNvSpPr>
+          <p:nvPr>
+            <p:ph type="title"/>
+          </p:nvPr>
+        </p:nvSpPr>
+        <p:spPr/>
+        <p:txBody>
+          <a:bodyPr>
+            <a:normAutofit/>
+          </a:bodyPr>
+          <a:lstStyle/>
+          <a:p>
+            <a:r>
+              <a:rPr lang="en-US" sz="3600" dirty="0"/>
+              <a:t>Timers</a:t>
+            </a:r>
+          </a:p>
+        </p:txBody>
+      </p:sp>
+      <p:sp>
+        <p:nvSpPr>
+          <p:cNvPr id="3" name="Content Placeholder 2"/>
+          <p:cNvSpPr>
+            <a:spLocks noGrp="1"/>
+          </p:cNvSpPr>
+          <p:nvPr>
+            <p:ph idx="1"/>
+          </p:nvPr>
+        </p:nvSpPr>
+        <p:spPr>
+          <a:xfrm>
+            <a:off x="838198" y="1525772"/>
+            <a:ext cx="6349411" cy="4651191"/>
+          </a:xfrm>
+        </p:spPr>
+        <p:txBody>
+          <a:bodyPr>
+            <a:normAutofit/>
+          </a:bodyPr>
+          <a:lstStyle/>
+          <a:p>
+            <a:pPr marL="0" indent="0">
+              <a:buNone/>
+            </a:pPr>
+            <a:r>
+              <a:rPr lang="en-US" sz="2000" dirty="0"/>
+              <a:t>Timers are pretty straight forward to implement:</a:t>
+            </a:r>
+            <a:endParaRPr lang="en-US" sz="2000" b="1" dirty="0"/>
+          </a:p>
+          <a:p>
+            <a:r>
+              <a:rPr lang="en-US" sz="2000" dirty="0"/>
+              <a:t>Implement the ActionListener Interface</a:t>
+            </a:r>
+          </a:p>
+          <a:p>
+            <a:r>
+              <a:rPr lang="en-US" sz="2000" dirty="0"/>
+              <a:t>Create a new timer passing in the object that implemented the ActionListener</a:t>
+            </a:r>
+          </a:p>
+        </p:txBody>
+      </p:sp>
+      <p:pic>
+        <p:nvPicPr>
+          <p:cNvPr id="4" name="Picture 3"/>
+          <p:cNvPicPr>
+            <a:picLocks noChangeAspect="1"/>
+          </p:cNvPicPr>
+          <p:nvPr/>
+        </p:nvPicPr>
+        <p:blipFill>
+          <a:blip r:embed="rId3"/>
+          <a:stretch>
+            <a:fillRect/>
+          </a:stretch>
+        </p:blipFill>
+        <p:spPr>
+          <a:xfrm>
+            <a:off x="7484656" y="1525772"/>
+            <a:ext cx="4114800" cy="2672583"/>
+          </a:xfrm>
+          <a:prstGeom prst="rect">
+            <a:avLst/>
+          </a:prstGeom>
+        </p:spPr>
+      </p:pic>
+    </p:spTree>
+    <p:extLst>
+      <p:ext uri="{BB962C8B-B14F-4D97-AF65-F5344CB8AC3E}">
+        <p14:creationId xmlns:p14="http://schemas.microsoft.com/office/powerpoint/2010/main" val="829396474"/>
+      </p:ext>
+    </p:extLst>
+  </p:cSld>
+  <p:clrMapOvr>
+    <a:masterClrMapping/>
+  </p:clrMapOvr>
+</p:sld>
+</file>
+
+<file path=ppt/slides/slide35.xml><?xml version="1.0" encoding="utf-8"?>
+<p:sld xmlns:a="http://schemas.openxmlformats.org/drawingml/2006/main" xmlns:r="http://schemas.openxmlformats.org/officeDocument/2006/relationships" xmlns:p="http://schemas.openxmlformats.org/presentationml/2006/main">
+  <p:cSld>
+    <p:spTree>
+      <p:nvGrpSpPr>
+        <p:cNvPr id="1" name=""/>
+        <p:cNvGrpSpPr/>
+        <p:nvPr/>
+      </p:nvGrpSpPr>
+      <p:grpSpPr>
+        <a:xfrm>
+          <a:off x="0" y="0"/>
+          <a:ext cx="0" cy="0"/>
+          <a:chOff x="0" y="0"/>
+          <a:chExt cx="0" cy="0"/>
+        </a:xfrm>
+      </p:grpSpPr>
+      <p:sp>
+        <p:nvSpPr>
+          <p:cNvPr id="2" name="Title 1"/>
+          <p:cNvSpPr>
+            <a:spLocks noGrp="1"/>
+          </p:cNvSpPr>
+          <p:nvPr>
+            <p:ph type="title"/>
+          </p:nvPr>
+        </p:nvSpPr>
+        <p:spPr>
+          <a:xfrm>
+            <a:off x="838200" y="365126"/>
+            <a:ext cx="10515600" cy="757272"/>
+          </a:xfrm>
+        </p:spPr>
+        <p:txBody>
+          <a:bodyPr>
+            <a:normAutofit/>
+          </a:bodyPr>
+          <a:lstStyle/>
+          <a:p>
+            <a:r>
+              <a:rPr lang="en-US" sz="3600" dirty="0" err="1"/>
+              <a:t>OvalDraw</a:t>
+            </a:r>
+            <a:r>
+              <a:rPr lang="en-US" sz="3600" dirty="0"/>
+              <a:t> Plus Timer and Animated Faces</a:t>
+            </a:r>
+            <a:endParaRPr lang="en-US" sz="3600" b="1" i="1" u="sng" dirty="0"/>
+          </a:p>
+        </p:txBody>
+      </p:sp>
+      <p:sp>
+        <p:nvSpPr>
+          <p:cNvPr id="3" name="Content Placeholder 2"/>
+          <p:cNvSpPr>
+            <a:spLocks noGrp="1"/>
+          </p:cNvSpPr>
+          <p:nvPr>
+            <p:ph idx="1"/>
+          </p:nvPr>
+        </p:nvSpPr>
+        <p:spPr>
+          <a:xfrm>
+            <a:off x="838200" y="1122398"/>
+            <a:ext cx="10718950" cy="5463343"/>
+          </a:xfrm>
+        </p:spPr>
+        <p:txBody>
+          <a:bodyPr>
+            <a:normAutofit/>
+          </a:bodyPr>
+          <a:lstStyle/>
+          <a:p>
+            <a:pPr marL="457200" indent="-457200">
+              <a:buFont typeface="+mj-lt"/>
+              <a:buAutoNum type="arabicPeriod"/>
+            </a:pPr>
+            <a:r>
+              <a:rPr lang="en-US" sz="2000" dirty="0"/>
+              <a:t>Implement ActionListener on </a:t>
+            </a:r>
+            <a:r>
+              <a:rPr lang="en-US" sz="2000" dirty="0" err="1"/>
+              <a:t>ShapeDrawPanel</a:t>
+            </a:r>
+            <a:endParaRPr lang="en-US" sz="2000" dirty="0"/>
+          </a:p>
+          <a:p>
+            <a:pPr marL="457200" indent="-457200">
+              <a:buFont typeface="+mj-lt"/>
+              <a:buAutoNum type="arabicPeriod"/>
+            </a:pPr>
+            <a:r>
+              <a:rPr lang="en-US" sz="2000" dirty="0"/>
+              <a:t>Implement Timer</a:t>
+            </a:r>
+          </a:p>
+          <a:p>
+            <a:pPr marL="457200" indent="-457200">
+              <a:buFont typeface="+mj-lt"/>
+              <a:buAutoNum type="arabicPeriod"/>
+            </a:pPr>
+            <a:r>
+              <a:rPr lang="en-US" sz="2000" dirty="0" err="1"/>
+              <a:t>Implent</a:t>
+            </a:r>
+            <a:r>
+              <a:rPr lang="en-US" sz="2000" dirty="0"/>
+              <a:t> </a:t>
+            </a:r>
+            <a:r>
+              <a:rPr lang="en-US" sz="2000" dirty="0" err="1"/>
+              <a:t>updateMouth</a:t>
+            </a:r>
+            <a:r>
+              <a:rPr lang="en-US" sz="2000" dirty="0"/>
+              <a:t> in </a:t>
+            </a:r>
+            <a:r>
+              <a:rPr lang="en-US" sz="2000" dirty="0" err="1"/>
+              <a:t>FaceDraw</a:t>
+            </a:r>
+            <a:endParaRPr lang="en-US" sz="2000" dirty="0"/>
+          </a:p>
+          <a:p>
+            <a:pPr marL="457200" indent="-457200">
+              <a:buFont typeface="+mj-lt"/>
+              <a:buAutoNum type="arabicPeriod"/>
+            </a:pPr>
+            <a:r>
+              <a:rPr lang="en-US" sz="2000" dirty="0"/>
+              <a:t>Implement </a:t>
+            </a:r>
+            <a:r>
+              <a:rPr lang="en-US" sz="2000" dirty="0" err="1"/>
+              <a:t>ArrayList</a:t>
+            </a:r>
+            <a:r>
+              <a:rPr lang="en-US" sz="2000" dirty="0"/>
+              <a:t> for </a:t>
+            </a:r>
+            <a:r>
+              <a:rPr lang="en-US" sz="2000" dirty="0" err="1"/>
+              <a:t>FaceDraw</a:t>
+            </a:r>
+            <a:r>
+              <a:rPr lang="en-US" sz="2000" dirty="0"/>
+              <a:t> objects</a:t>
+            </a:r>
+          </a:p>
+          <a:p>
+            <a:pPr marL="457200" indent="-457200">
+              <a:buFont typeface="+mj-lt"/>
+              <a:buAutoNum type="arabicPeriod"/>
+            </a:pPr>
+            <a:r>
+              <a:rPr lang="en-US" sz="2000" dirty="0"/>
+              <a:t>Update </a:t>
+            </a:r>
+            <a:r>
+              <a:rPr lang="en-US" sz="2000" dirty="0" err="1"/>
+              <a:t>FaceDraw</a:t>
+            </a:r>
+            <a:r>
+              <a:rPr lang="en-US" sz="2000" dirty="0"/>
+              <a:t> mouths and redraw</a:t>
+            </a:r>
+          </a:p>
+        </p:txBody>
+      </p:sp>
+    </p:spTree>
+    <p:extLst>
+      <p:ext uri="{BB962C8B-B14F-4D97-AF65-F5344CB8AC3E}">
+        <p14:creationId xmlns:p14="http://schemas.microsoft.com/office/powerpoint/2010/main" val="750607854"/>
+      </p:ext>
+    </p:extLst>
+  </p:cSld>
+  <p:clrMapOvr>
+    <a:masterClrMapping/>
+  </p:clrMapOvr>
+</p:sld>
+</file>
+
+<file path=ppt/slides/slide36.xml><?xml version="1.0" encoding="utf-8"?>
+<p:sld xmlns:a="http://schemas.openxmlformats.org/drawingml/2006/main" xmlns:r="http://schemas.openxmlformats.org/officeDocument/2006/relationships" xmlns:p="http://schemas.openxmlformats.org/presentationml/2006/main">
+  <p:cSld>
+    <p:spTree>
+      <p:nvGrpSpPr>
+        <p:cNvPr id="1" name=""/>
+        <p:cNvGrpSpPr/>
+        <p:nvPr/>
+      </p:nvGrpSpPr>
+      <p:grpSpPr>
+        <a:xfrm>
+          <a:off x="0" y="0"/>
+          <a:ext cx="0" cy="0"/>
+          <a:chOff x="0" y="0"/>
+          <a:chExt cx="0" cy="0"/>
+        </a:xfrm>
+      </p:grpSpPr>
+      <p:sp>
+        <p:nvSpPr>
+          <p:cNvPr id="2" name="Title 1"/>
+          <p:cNvSpPr>
+            <a:spLocks noGrp="1"/>
+          </p:cNvSpPr>
+          <p:nvPr>
+            <p:ph type="title"/>
+          </p:nvPr>
+        </p:nvSpPr>
+        <p:spPr>
+          <a:xfrm>
+            <a:off x="838200" y="365126"/>
+            <a:ext cx="10515600" cy="757272"/>
+          </a:xfrm>
+        </p:spPr>
+        <p:txBody>
+          <a:bodyPr>
+            <a:normAutofit/>
+          </a:bodyPr>
+          <a:lstStyle/>
+          <a:p>
+            <a:r>
+              <a:rPr lang="en-US" sz="3600" dirty="0"/>
+              <a:t>Learning Objectives – Week 4</a:t>
+            </a:r>
+            <a:endParaRPr lang="en-US" sz="3600" b="1" i="1" u="sng" dirty="0"/>
+          </a:p>
+        </p:txBody>
+      </p:sp>
+      <p:sp>
+        <p:nvSpPr>
+          <p:cNvPr id="3" name="Content Placeholder 2"/>
+          <p:cNvSpPr>
+            <a:spLocks noGrp="1"/>
+          </p:cNvSpPr>
+          <p:nvPr>
+            <p:ph idx="1"/>
+          </p:nvPr>
+        </p:nvSpPr>
+        <p:spPr>
+          <a:xfrm>
+            <a:off x="838200" y="1122398"/>
+            <a:ext cx="10718950" cy="5463343"/>
+          </a:xfrm>
+        </p:spPr>
+        <p:txBody>
+          <a:bodyPr>
+            <a:normAutofit/>
+          </a:bodyPr>
+          <a:lstStyle/>
+          <a:p>
+            <a:pPr marL="457200" indent="-457200">
+              <a:buFont typeface="+mj-lt"/>
+              <a:buAutoNum type="arabicPeriod"/>
+            </a:pPr>
+            <a:r>
+              <a:rPr lang="en-US" sz="2000" dirty="0">
+                <a:solidFill>
+                  <a:schemeClr val="bg1">
+                    <a:lumMod val="65000"/>
+                  </a:schemeClr>
+                </a:solidFill>
+              </a:rPr>
+              <a:t>Implement a menu system that enables the user to trigger a variety of actions in a familiar way</a:t>
+            </a:r>
+          </a:p>
+          <a:p>
+            <a:pPr marL="457200" indent="-457200">
+              <a:buFont typeface="+mj-lt"/>
+              <a:buAutoNum type="arabicPeriod"/>
+            </a:pPr>
+            <a:r>
+              <a:rPr lang="en-US" sz="2000" dirty="0">
+                <a:solidFill>
+                  <a:schemeClr val="bg1">
+                    <a:lumMod val="65000"/>
+                  </a:schemeClr>
+                </a:solidFill>
+              </a:rPr>
+              <a:t>Implement code that responds to of events including: </a:t>
+            </a:r>
+            <a:r>
+              <a:rPr lang="en-US" sz="2000" dirty="0"/>
+              <a:t>clicking the mouse, moving </a:t>
+            </a:r>
+            <a:r>
+              <a:rPr lang="en-US" sz="2000" dirty="0">
+                <a:solidFill>
+                  <a:schemeClr val="bg1">
+                    <a:lumMod val="65000"/>
+                  </a:schemeClr>
+                </a:solidFill>
+              </a:rPr>
+              <a:t>or dragging the mouse, and typing a key on the keyboard</a:t>
+            </a:r>
+          </a:p>
+          <a:p>
+            <a:pPr marL="457200" indent="-457200">
+              <a:buFont typeface="+mj-lt"/>
+              <a:buAutoNum type="arabicPeriod"/>
+            </a:pPr>
+            <a:r>
+              <a:rPr lang="en-US" sz="2000" dirty="0">
+                <a:solidFill>
+                  <a:schemeClr val="bg1">
+                    <a:lumMod val="65000"/>
+                  </a:schemeClr>
+                </a:solidFill>
+              </a:rPr>
+              <a:t>Design multiple intuitive ways for a user to perform a particular task</a:t>
+            </a:r>
+          </a:p>
+          <a:p>
+            <a:pPr marL="457200" indent="-457200">
+              <a:buFont typeface="+mj-lt"/>
+              <a:buAutoNum type="arabicPeriod"/>
+            </a:pPr>
+            <a:r>
+              <a:rPr lang="en-US" sz="2000" dirty="0"/>
+              <a:t>Implement animation using a timer and a corresponding event handler</a:t>
+            </a:r>
+          </a:p>
+          <a:p>
+            <a:pPr marL="457200" indent="-457200">
+              <a:buFont typeface="+mj-lt"/>
+              <a:buAutoNum type="arabicPeriod"/>
+            </a:pPr>
+            <a:r>
+              <a:rPr lang="en-US" sz="2000" dirty="0">
+                <a:solidFill>
+                  <a:schemeClr val="bg1">
+                    <a:lumMod val="65000"/>
+                  </a:schemeClr>
+                </a:solidFill>
+              </a:rPr>
+              <a:t>Create interactive applications that adhere to the Model-View-Controller pattern</a:t>
+            </a:r>
+          </a:p>
+          <a:p>
+            <a:pPr marL="457200" indent="-457200">
+              <a:buFont typeface="+mj-lt"/>
+              <a:buAutoNum type="arabicPeriod"/>
+            </a:pPr>
+            <a:r>
+              <a:rPr lang="en-US" sz="2000" dirty="0">
+                <a:solidFill>
+                  <a:schemeClr val="bg1">
+                    <a:lumMod val="65000"/>
+                  </a:schemeClr>
+                </a:solidFill>
+              </a:rPr>
+              <a:t>Understand how Java achieves speedier input and output (IO) through a hierarchy file IO classes</a:t>
+            </a:r>
+          </a:p>
+          <a:p>
+            <a:pPr marL="457200" indent="-457200">
+              <a:buFont typeface="+mj-lt"/>
+              <a:buAutoNum type="arabicPeriod"/>
+            </a:pPr>
+            <a:r>
+              <a:rPr lang="en-US" sz="2000" dirty="0">
+                <a:solidFill>
+                  <a:schemeClr val="bg1">
+                    <a:lumMod val="65000"/>
+                  </a:schemeClr>
+                </a:solidFill>
+              </a:rPr>
+              <a:t>Design and implement a controller class that outputs data to a text file</a:t>
+            </a:r>
+          </a:p>
+          <a:p>
+            <a:pPr marL="457200" indent="-457200">
+              <a:buFont typeface="+mj-lt"/>
+              <a:buAutoNum type="arabicPeriod"/>
+            </a:pPr>
+            <a:r>
+              <a:rPr lang="en-US" sz="2000" dirty="0">
+                <a:solidFill>
+                  <a:schemeClr val="bg1">
+                    <a:lumMod val="65000"/>
+                  </a:schemeClr>
+                </a:solidFill>
+              </a:rPr>
+              <a:t>Design and implement a controller class that inputs data from a text file and builds a collection of objects from the data read data</a:t>
+            </a:r>
+          </a:p>
+          <a:p>
+            <a:pPr marL="457200" indent="-457200">
+              <a:buFont typeface="+mj-lt"/>
+              <a:buAutoNum type="arabicPeriod"/>
+            </a:pPr>
+            <a:r>
+              <a:rPr lang="en-US" sz="2000" dirty="0"/>
+              <a:t>Review week 4 assignment as time allows</a:t>
+            </a:r>
+          </a:p>
+        </p:txBody>
+      </p:sp>
+    </p:spTree>
+    <p:extLst>
+      <p:ext uri="{BB962C8B-B14F-4D97-AF65-F5344CB8AC3E}">
+        <p14:creationId xmlns:p14="http://schemas.microsoft.com/office/powerpoint/2010/main" val="662407524"/>
+      </p:ext>
+    </p:extLst>
+  </p:cSld>
+  <p:clrMapOvr>
+    <a:masterClrMapping/>
+  </p:clrMapOvr>
+</p:sld>
+</file>
+
+<file path=ppt/slides/slide37.xml><?xml version="1.0" encoding="utf-8"?>
+<p:sld xmlns:a="http://schemas.openxmlformats.org/drawingml/2006/main" xmlns:r="http://schemas.openxmlformats.org/officeDocument/2006/relationships" xmlns:p="http://schemas.openxmlformats.org/presentationml/2006/main">
+  <p:cSld>
+    <p:bg>
+      <p:bgPr>
+        <a:solidFill>
+          <a:schemeClr val="bg1">
+            <a:lumMod val="75000"/>
+          </a:schemeClr>
+        </a:solidFill>
+        <a:effectLst/>
+      </p:bgPr>
+    </p:bg>
+    <p:spTree>
+      <p:nvGrpSpPr>
+        <p:cNvPr id="1" name=""/>
+        <p:cNvGrpSpPr/>
+        <p:nvPr/>
+      </p:nvGrpSpPr>
+      <p:grpSpPr>
+        <a:xfrm>
+          <a:off x="0" y="0"/>
+          <a:ext cx="0" cy="0"/>
+          <a:chOff x="0" y="0"/>
+          <a:chExt cx="0" cy="0"/>
+        </a:xfrm>
+      </p:grpSpPr>
+      <p:sp>
+        <p:nvSpPr>
+          <p:cNvPr id="2" name="Title 1"/>
+          <p:cNvSpPr>
+            <a:spLocks noGrp="1"/>
+          </p:cNvSpPr>
+          <p:nvPr>
+            <p:ph type="ctrTitle"/>
+          </p:nvPr>
+        </p:nvSpPr>
+        <p:spPr>
+          <a:xfrm>
+            <a:off x="1524000" y="1122363"/>
+            <a:ext cx="9144000" cy="2387600"/>
+          </a:xfrm>
+        </p:spPr>
+        <p:txBody>
+          <a:bodyPr>
+            <a:normAutofit/>
+          </a:bodyPr>
+          <a:lstStyle/>
+          <a:p>
+            <a:r>
+              <a:rPr lang="en-US" sz="4800" dirty="0"/>
+              <a:t>End of Session</a:t>
+            </a:r>
+          </a:p>
+        </p:txBody>
+      </p:sp>
+      <p:sp>
+        <p:nvSpPr>
+          <p:cNvPr id="3" name="Subtitle 2"/>
+          <p:cNvSpPr>
+            <a:spLocks noGrp="1"/>
+          </p:cNvSpPr>
+          <p:nvPr>
+            <p:ph type="subTitle" idx="1"/>
+          </p:nvPr>
+        </p:nvSpPr>
+        <p:spPr>
+          <a:xfrm>
+            <a:off x="1524000" y="3602038"/>
+            <a:ext cx="9144000" cy="2198022"/>
+          </a:xfrm>
+        </p:spPr>
+        <p:txBody>
+          <a:bodyPr>
+            <a:normAutofit/>
+          </a:bodyPr>
+          <a:lstStyle/>
+          <a:p>
+            <a:pPr algn="l"/>
+            <a:r>
+              <a:rPr lang="en-US" dirty="0"/>
+              <a:t>Course Number: CPSC-24500</a:t>
+            </a:r>
+          </a:p>
+          <a:p>
+            <a:pPr algn="l"/>
+            <a:r>
+              <a:rPr lang="en-US" dirty="0"/>
+              <a:t>Week: 4</a:t>
+            </a:r>
+          </a:p>
+          <a:p>
+            <a:pPr algn="l"/>
+            <a:r>
+              <a:rPr lang="en-US" dirty="0"/>
+              <a:t>Session: 3</a:t>
+            </a:r>
+          </a:p>
+          <a:p>
+            <a:pPr algn="l"/>
+            <a:r>
+              <a:rPr lang="en-US" dirty="0"/>
+              <a:t>Instructor: Eric Pogue</a:t>
+            </a:r>
+          </a:p>
+        </p:txBody>
+      </p:sp>
+    </p:spTree>
+    <p:extLst>
+      <p:ext uri="{BB962C8B-B14F-4D97-AF65-F5344CB8AC3E}">
+        <p14:creationId xmlns:p14="http://schemas.microsoft.com/office/powerpoint/2010/main" val="3769067329"/>
       </p:ext>
     </p:extLst>
   </p:cSld>
@@ -9422,6 +13818,21 @@
 </file>
 
 <file path=customXml/item1.xml><?xml version="1.0" encoding="utf-8"?>
+<?mso-contentType ?>
+<FormTemplates xmlns="http://schemas.microsoft.com/sharepoint/v3/contenttype/forms">
+  <Display>DocumentLibraryForm</Display>
+  <Edit>DocumentLibraryForm</Edit>
+  <New>DocumentLibraryForm</New>
+</FormTemplates>
+</file>
+
+<file path=customXml/item2.xml><?xml version="1.0" encoding="utf-8"?>
+<p:properties xmlns:p="http://schemas.microsoft.com/office/2006/metadata/properties" xmlns:xsi="http://www.w3.org/2001/XMLSchema-instance" xmlns:pc="http://schemas.microsoft.com/office/infopath/2007/PartnerControls">
+  <documentManagement/>
+</p:properties>
+</file>
+
+<file path=customXml/item3.xml><?xml version="1.0" encoding="utf-8"?>
 <ct:contentTypeSchema xmlns:ct="http://schemas.microsoft.com/office/2006/metadata/contentType" xmlns:ma="http://schemas.microsoft.com/office/2006/metadata/properties/metaAttributes" ct:_="" ma:_="" ma:contentTypeName="Document" ma:contentTypeID="0x0101004E7FF26E314236448B954F3A97640002" ma:contentTypeVersion="0" ma:contentTypeDescription="Create a new document." ma:contentTypeScope="" ma:versionID="dcd134f7ef3b1aa8a267b1d1a9f0b332">
   <xsd:schema xmlns:xsd="http://www.w3.org/2001/XMLSchema" xmlns:xs="http://www.w3.org/2001/XMLSchema" xmlns:p="http://schemas.microsoft.com/office/2006/metadata/properties" targetNamespace="http://schemas.microsoft.com/office/2006/metadata/properties" ma:root="true" ma:fieldsID="fad425956ca267ea5e6d723b3f3bd6f1">
     <xsd:element name="properties">
@@ -9535,22 +13946,30 @@
 </ct:contentTypeSchema>
 </file>
 
-<file path=customXml/item2.xml><?xml version="1.0" encoding="utf-8"?>
-<p:properties xmlns:p="http://schemas.microsoft.com/office/2006/metadata/properties" xmlns:xsi="http://www.w3.org/2001/XMLSchema-instance" xmlns:pc="http://schemas.microsoft.com/office/infopath/2007/PartnerControls">
-  <documentManagement/>
-</p:properties>
+<file path=customXml/itemProps1.xml><?xml version="1.0" encoding="utf-8"?>
+<ds:datastoreItem xmlns:ds="http://schemas.openxmlformats.org/officeDocument/2006/customXml" ds:itemID="{87FD8B20-B89A-4B23-9329-175195DD4D8A}">
+  <ds:schemaRefs>
+    <ds:schemaRef ds:uri="http://schemas.microsoft.com/sharepoint/v3/contenttype/forms"/>
+  </ds:schemaRefs>
+</ds:datastoreItem>
 </file>
 
-<file path=customXml/item3.xml><?xml version="1.0" encoding="utf-8"?>
-<?mso-contentType ?>
-<FormTemplates xmlns="http://schemas.microsoft.com/sharepoint/v3/contenttype/forms">
-  <Display>DocumentLibraryForm</Display>
-  <Edit>DocumentLibraryForm</Edit>
-  <New>DocumentLibraryForm</New>
-</FormTemplates>
+<file path=customXml/itemProps2.xml><?xml version="1.0" encoding="utf-8"?>
+<ds:datastoreItem xmlns:ds="http://schemas.openxmlformats.org/officeDocument/2006/customXml" ds:itemID="{3473EA1A-2744-48E8-B2A3-4F89C0FC849C}">
+  <ds:schemaRefs>
+    <ds:schemaRef ds:uri="http://purl.org/dc/elements/1.1/"/>
+    <ds:schemaRef ds:uri="http://schemas.microsoft.com/office/2006/metadata/properties"/>
+    <ds:schemaRef ds:uri="http://purl.org/dc/terms/"/>
+    <ds:schemaRef ds:uri="http://schemas.openxmlformats.org/package/2006/metadata/core-properties"/>
+    <ds:schemaRef ds:uri="http://schemas.microsoft.com/office/2006/documentManagement/types"/>
+    <ds:schemaRef ds:uri="http://schemas.microsoft.com/office/infopath/2007/PartnerControls"/>
+    <ds:schemaRef ds:uri="http://www.w3.org/XML/1998/namespace"/>
+    <ds:schemaRef ds:uri="http://purl.org/dc/dcmitype/"/>
+  </ds:schemaRefs>
+</ds:datastoreItem>
 </file>
 
-<file path=customXml/itemProps1.xml><?xml version="1.0" encoding="utf-8"?>
+<file path=customXml/itemProps3.xml><?xml version="1.0" encoding="utf-8"?>
 <ds:datastoreItem xmlns:ds="http://schemas.openxmlformats.org/officeDocument/2006/customXml" ds:itemID="{A906A71E-D2C6-4CAA-8E79-10C504BC5F58}">
   <ds:schemaRefs>
     <ds:schemaRef ds:uri="http://schemas.microsoft.com/office/2006/metadata/contentType"/>
@@ -9564,27 +13983,4 @@
     <ds:schemaRef ds:uri="http://schemas.microsoft.com/office/infopath/2007/PartnerControls"/>
   </ds:schemaRefs>
 </ds:datastoreItem>
-</file>
-
-<file path=customXml/itemProps2.xml><?xml version="1.0" encoding="utf-8"?>
-<ds:datastoreItem xmlns:ds="http://schemas.openxmlformats.org/officeDocument/2006/customXml" ds:itemID="{3473EA1A-2744-48E8-B2A3-4F89C0FC849C}">
-  <ds:schemaRefs>
-    <ds:schemaRef ds:uri="http://purl.org/dc/terms/"/>
-    <ds:schemaRef ds:uri="http://schemas.openxmlformats.org/package/2006/metadata/core-properties"/>
-    <ds:schemaRef ds:uri="http://purl.org/dc/dcmitype/"/>
-    <ds:schemaRef ds:uri="http://schemas.microsoft.com/office/infopath/2007/PartnerControls"/>
-    <ds:schemaRef ds:uri="http://schemas.microsoft.com/office/2006/documentManagement/types"/>
-    <ds:schemaRef ds:uri="http://schemas.microsoft.com/office/2006/metadata/properties"/>
-    <ds:schemaRef ds:uri="http://www.w3.org/XML/1998/namespace"/>
-    <ds:schemaRef ds:uri="http://purl.org/dc/elements/1.1/"/>
-  </ds:schemaRefs>
-</ds:datastoreItem>
-</file>
-
-<file path=customXml/itemProps3.xml><?xml version="1.0" encoding="utf-8"?>
-<ds:datastoreItem xmlns:ds="http://schemas.openxmlformats.org/officeDocument/2006/customXml" ds:itemID="{87FD8B20-B89A-4B23-9329-175195DD4D8A}">
-  <ds:schemaRefs>
-    <ds:schemaRef ds:uri="http://schemas.microsoft.com/sharepoint/v3/contenttype/forms"/>
-  </ds:schemaRefs>
-</ds:datastoreItem>
 </file>
</xml_diff>